<commit_message>
Added 'A look at containers' section to presentation.
</commit_message>
<xml_diff>
--- a/presentation/presentation.pptx
+++ b/presentation/presentation.pptx
@@ -5,7 +5,7 @@
     <p:sldMasterId id="2147483648" r:id="rId1"/>
   </p:sldMasterIdLst>
   <p:notesMasterIdLst>
-    <p:notesMasterId r:id="rId24"/>
+    <p:notesMasterId r:id="rId25"/>
   </p:notesMasterIdLst>
   <p:sldIdLst>
     <p:sldId id="258" r:id="rId2"/>
@@ -30,6 +30,7 @@
     <p:sldId id="281" r:id="rId21"/>
     <p:sldId id="282" r:id="rId22"/>
     <p:sldId id="283" r:id="rId23"/>
+    <p:sldId id="284" r:id="rId24"/>
   </p:sldIdLst>
   <p:sldSz cx="12192000" cy="6858000"/>
   <p:notesSz cx="6858000" cy="9144000"/>
@@ -175,6 +176,7 @@
           <p14:sldIdLst>
             <p14:sldId id="282"/>
             <p14:sldId id="283"/>
+            <p14:sldId id="284"/>
           </p14:sldIdLst>
         </p14:section>
         <p14:section name="A Look at Some Concerns" id="{BBBC4B94-5C39-44E3-86B7-9871E92F1E29}">
@@ -20084,12 +20086,59 @@
           <a:p>
             <a:r>
               <a:rPr lang="en-US" dirty="0"/>
-              <a:t>A Virtual Box That Packages Applications With Dependent Components </a:t>
+              <a:t>A Virtual Box That Packages Applications With Dependent Components and Services</a:t>
             </a:r>
+          </a:p>
+          <a:p>
             <a:r>
-              <a:rPr lang="en-US"/>
-              <a:t>and Services</a:t>
+              <a:rPr lang="en-US" dirty="0"/>
+              <a:t>Implements a high-level API to provide lightweight isolation</a:t>
             </a:r>
+          </a:p>
+          <a:p>
+            <a:r>
+              <a:rPr lang="en-US" dirty="0"/>
+              <a:t>Works on the kernel’s functionality to ensure isolation of:</a:t>
+            </a:r>
+          </a:p>
+          <a:p>
+            <a:pPr lvl="1"/>
+            <a:r>
+              <a:rPr lang="en-US" dirty="0"/>
+              <a:t>CPU</a:t>
+            </a:r>
+          </a:p>
+          <a:p>
+            <a:pPr lvl="1"/>
+            <a:r>
+              <a:rPr lang="en-US" dirty="0"/>
+              <a:t>Memory</a:t>
+            </a:r>
+          </a:p>
+          <a:p>
+            <a:pPr lvl="1"/>
+            <a:r>
+              <a:rPr lang="en-US" dirty="0"/>
+              <a:t>Block I/O</a:t>
+            </a:r>
+          </a:p>
+          <a:p>
+            <a:pPr lvl="1"/>
+            <a:r>
+              <a:rPr lang="en-US" dirty="0"/>
+              <a:t>Network</a:t>
+            </a:r>
+          </a:p>
+          <a:p>
+            <a:pPr lvl="1"/>
+            <a:r>
+              <a:rPr lang="en-US" dirty="0"/>
+              <a:t>More</a:t>
+            </a:r>
+          </a:p>
+          <a:p>
+            <a:pPr lvl="1"/>
+            <a:endParaRPr lang="en-US" dirty="0"/>
           </a:p>
         </p:txBody>
       </p:sp>
@@ -20103,6 +20152,1163 @@
   <p:clrMapOvr>
     <a:masterClrMapping/>
   </p:clrMapOvr>
+  <p:timing>
+    <p:tnLst>
+      <p:par>
+        <p:cTn id="1" dur="indefinite" restart="never" nodeType="tmRoot">
+          <p:childTnLst>
+            <p:seq concurrent="1" nextAc="seek">
+              <p:cTn id="2" dur="indefinite" nodeType="mainSeq">
+                <p:childTnLst>
+                  <p:par>
+                    <p:cTn id="3" fill="hold">
+                      <p:stCondLst>
+                        <p:cond delay="indefinite"/>
+                      </p:stCondLst>
+                      <p:childTnLst>
+                        <p:par>
+                          <p:cTn id="4" fill="hold">
+                            <p:stCondLst>
+                              <p:cond delay="0"/>
+                            </p:stCondLst>
+                            <p:childTnLst>
+                              <p:par>
+                                <p:cTn id="5" presetID="10" presetClass="entr" presetSubtype="0" fill="hold" grpId="0" nodeType="clickEffect">
+                                  <p:stCondLst>
+                                    <p:cond delay="0"/>
+                                  </p:stCondLst>
+                                  <p:childTnLst>
+                                    <p:set>
+                                      <p:cBhvr>
+                                        <p:cTn id="6" dur="1" fill="hold">
+                                          <p:stCondLst>
+                                            <p:cond delay="0"/>
+                                          </p:stCondLst>
+                                        </p:cTn>
+                                        <p:tgtEl>
+                                          <p:spTgt spid="3">
+                                            <p:txEl>
+                                              <p:pRg st="0" end="0"/>
+                                            </p:txEl>
+                                          </p:spTgt>
+                                        </p:tgtEl>
+                                        <p:attrNameLst>
+                                          <p:attrName>style.visibility</p:attrName>
+                                        </p:attrNameLst>
+                                      </p:cBhvr>
+                                      <p:to>
+                                        <p:strVal val="visible"/>
+                                      </p:to>
+                                    </p:set>
+                                    <p:animEffect transition="in" filter="fade">
+                                      <p:cBhvr>
+                                        <p:cTn id="7" dur="500"/>
+                                        <p:tgtEl>
+                                          <p:spTgt spid="3">
+                                            <p:txEl>
+                                              <p:pRg st="0" end="0"/>
+                                            </p:txEl>
+                                          </p:spTgt>
+                                        </p:tgtEl>
+                                      </p:cBhvr>
+                                    </p:animEffect>
+                                  </p:childTnLst>
+                                </p:cTn>
+                              </p:par>
+                            </p:childTnLst>
+                          </p:cTn>
+                        </p:par>
+                      </p:childTnLst>
+                    </p:cTn>
+                  </p:par>
+                  <p:par>
+                    <p:cTn id="8" fill="hold">
+                      <p:stCondLst>
+                        <p:cond delay="indefinite"/>
+                      </p:stCondLst>
+                      <p:childTnLst>
+                        <p:par>
+                          <p:cTn id="9" fill="hold">
+                            <p:stCondLst>
+                              <p:cond delay="0"/>
+                            </p:stCondLst>
+                            <p:childTnLst>
+                              <p:par>
+                                <p:cTn id="10" presetID="10" presetClass="entr" presetSubtype="0" fill="hold" grpId="0" nodeType="clickEffect">
+                                  <p:stCondLst>
+                                    <p:cond delay="0"/>
+                                  </p:stCondLst>
+                                  <p:childTnLst>
+                                    <p:set>
+                                      <p:cBhvr>
+                                        <p:cTn id="11" dur="1" fill="hold">
+                                          <p:stCondLst>
+                                            <p:cond delay="0"/>
+                                          </p:stCondLst>
+                                        </p:cTn>
+                                        <p:tgtEl>
+                                          <p:spTgt spid="3">
+                                            <p:txEl>
+                                              <p:pRg st="1" end="1"/>
+                                            </p:txEl>
+                                          </p:spTgt>
+                                        </p:tgtEl>
+                                        <p:attrNameLst>
+                                          <p:attrName>style.visibility</p:attrName>
+                                        </p:attrNameLst>
+                                      </p:cBhvr>
+                                      <p:to>
+                                        <p:strVal val="visible"/>
+                                      </p:to>
+                                    </p:set>
+                                    <p:animEffect transition="in" filter="fade">
+                                      <p:cBhvr>
+                                        <p:cTn id="12" dur="500"/>
+                                        <p:tgtEl>
+                                          <p:spTgt spid="3">
+                                            <p:txEl>
+                                              <p:pRg st="1" end="1"/>
+                                            </p:txEl>
+                                          </p:spTgt>
+                                        </p:tgtEl>
+                                      </p:cBhvr>
+                                    </p:animEffect>
+                                  </p:childTnLst>
+                                </p:cTn>
+                              </p:par>
+                            </p:childTnLst>
+                          </p:cTn>
+                        </p:par>
+                      </p:childTnLst>
+                    </p:cTn>
+                  </p:par>
+                  <p:par>
+                    <p:cTn id="13" fill="hold">
+                      <p:stCondLst>
+                        <p:cond delay="indefinite"/>
+                      </p:stCondLst>
+                      <p:childTnLst>
+                        <p:par>
+                          <p:cTn id="14" fill="hold">
+                            <p:stCondLst>
+                              <p:cond delay="0"/>
+                            </p:stCondLst>
+                            <p:childTnLst>
+                              <p:par>
+                                <p:cTn id="15" presetID="10" presetClass="entr" presetSubtype="0" fill="hold" grpId="0" nodeType="clickEffect">
+                                  <p:stCondLst>
+                                    <p:cond delay="0"/>
+                                  </p:stCondLst>
+                                  <p:childTnLst>
+                                    <p:set>
+                                      <p:cBhvr>
+                                        <p:cTn id="16" dur="1" fill="hold">
+                                          <p:stCondLst>
+                                            <p:cond delay="0"/>
+                                          </p:stCondLst>
+                                        </p:cTn>
+                                        <p:tgtEl>
+                                          <p:spTgt spid="3">
+                                            <p:txEl>
+                                              <p:pRg st="2" end="2"/>
+                                            </p:txEl>
+                                          </p:spTgt>
+                                        </p:tgtEl>
+                                        <p:attrNameLst>
+                                          <p:attrName>style.visibility</p:attrName>
+                                        </p:attrNameLst>
+                                      </p:cBhvr>
+                                      <p:to>
+                                        <p:strVal val="visible"/>
+                                      </p:to>
+                                    </p:set>
+                                    <p:animEffect transition="in" filter="fade">
+                                      <p:cBhvr>
+                                        <p:cTn id="17" dur="500"/>
+                                        <p:tgtEl>
+                                          <p:spTgt spid="3">
+                                            <p:txEl>
+                                              <p:pRg st="2" end="2"/>
+                                            </p:txEl>
+                                          </p:spTgt>
+                                        </p:tgtEl>
+                                      </p:cBhvr>
+                                    </p:animEffect>
+                                  </p:childTnLst>
+                                </p:cTn>
+                              </p:par>
+                              <p:par>
+                                <p:cTn id="18" presetID="10" presetClass="entr" presetSubtype="0" fill="hold" grpId="0" nodeType="withEffect">
+                                  <p:stCondLst>
+                                    <p:cond delay="0"/>
+                                  </p:stCondLst>
+                                  <p:childTnLst>
+                                    <p:set>
+                                      <p:cBhvr>
+                                        <p:cTn id="19" dur="1" fill="hold">
+                                          <p:stCondLst>
+                                            <p:cond delay="0"/>
+                                          </p:stCondLst>
+                                        </p:cTn>
+                                        <p:tgtEl>
+                                          <p:spTgt spid="3">
+                                            <p:txEl>
+                                              <p:pRg st="3" end="3"/>
+                                            </p:txEl>
+                                          </p:spTgt>
+                                        </p:tgtEl>
+                                        <p:attrNameLst>
+                                          <p:attrName>style.visibility</p:attrName>
+                                        </p:attrNameLst>
+                                      </p:cBhvr>
+                                      <p:to>
+                                        <p:strVal val="visible"/>
+                                      </p:to>
+                                    </p:set>
+                                    <p:animEffect transition="in" filter="fade">
+                                      <p:cBhvr>
+                                        <p:cTn id="20" dur="500"/>
+                                        <p:tgtEl>
+                                          <p:spTgt spid="3">
+                                            <p:txEl>
+                                              <p:pRg st="3" end="3"/>
+                                            </p:txEl>
+                                          </p:spTgt>
+                                        </p:tgtEl>
+                                      </p:cBhvr>
+                                    </p:animEffect>
+                                  </p:childTnLst>
+                                </p:cTn>
+                              </p:par>
+                              <p:par>
+                                <p:cTn id="21" presetID="10" presetClass="entr" presetSubtype="0" fill="hold" grpId="0" nodeType="withEffect">
+                                  <p:stCondLst>
+                                    <p:cond delay="0"/>
+                                  </p:stCondLst>
+                                  <p:childTnLst>
+                                    <p:set>
+                                      <p:cBhvr>
+                                        <p:cTn id="22" dur="1" fill="hold">
+                                          <p:stCondLst>
+                                            <p:cond delay="0"/>
+                                          </p:stCondLst>
+                                        </p:cTn>
+                                        <p:tgtEl>
+                                          <p:spTgt spid="3">
+                                            <p:txEl>
+                                              <p:pRg st="4" end="4"/>
+                                            </p:txEl>
+                                          </p:spTgt>
+                                        </p:tgtEl>
+                                        <p:attrNameLst>
+                                          <p:attrName>style.visibility</p:attrName>
+                                        </p:attrNameLst>
+                                      </p:cBhvr>
+                                      <p:to>
+                                        <p:strVal val="visible"/>
+                                      </p:to>
+                                    </p:set>
+                                    <p:animEffect transition="in" filter="fade">
+                                      <p:cBhvr>
+                                        <p:cTn id="23" dur="500"/>
+                                        <p:tgtEl>
+                                          <p:spTgt spid="3">
+                                            <p:txEl>
+                                              <p:pRg st="4" end="4"/>
+                                            </p:txEl>
+                                          </p:spTgt>
+                                        </p:tgtEl>
+                                      </p:cBhvr>
+                                    </p:animEffect>
+                                  </p:childTnLst>
+                                </p:cTn>
+                              </p:par>
+                              <p:par>
+                                <p:cTn id="24" presetID="10" presetClass="entr" presetSubtype="0" fill="hold" grpId="0" nodeType="withEffect">
+                                  <p:stCondLst>
+                                    <p:cond delay="0"/>
+                                  </p:stCondLst>
+                                  <p:childTnLst>
+                                    <p:set>
+                                      <p:cBhvr>
+                                        <p:cTn id="25" dur="1" fill="hold">
+                                          <p:stCondLst>
+                                            <p:cond delay="0"/>
+                                          </p:stCondLst>
+                                        </p:cTn>
+                                        <p:tgtEl>
+                                          <p:spTgt spid="3">
+                                            <p:txEl>
+                                              <p:pRg st="5" end="5"/>
+                                            </p:txEl>
+                                          </p:spTgt>
+                                        </p:tgtEl>
+                                        <p:attrNameLst>
+                                          <p:attrName>style.visibility</p:attrName>
+                                        </p:attrNameLst>
+                                      </p:cBhvr>
+                                      <p:to>
+                                        <p:strVal val="visible"/>
+                                      </p:to>
+                                    </p:set>
+                                    <p:animEffect transition="in" filter="fade">
+                                      <p:cBhvr>
+                                        <p:cTn id="26" dur="500"/>
+                                        <p:tgtEl>
+                                          <p:spTgt spid="3">
+                                            <p:txEl>
+                                              <p:pRg st="5" end="5"/>
+                                            </p:txEl>
+                                          </p:spTgt>
+                                        </p:tgtEl>
+                                      </p:cBhvr>
+                                    </p:animEffect>
+                                  </p:childTnLst>
+                                </p:cTn>
+                              </p:par>
+                              <p:par>
+                                <p:cTn id="27" presetID="10" presetClass="entr" presetSubtype="0" fill="hold" grpId="0" nodeType="withEffect">
+                                  <p:stCondLst>
+                                    <p:cond delay="0"/>
+                                  </p:stCondLst>
+                                  <p:childTnLst>
+                                    <p:set>
+                                      <p:cBhvr>
+                                        <p:cTn id="28" dur="1" fill="hold">
+                                          <p:stCondLst>
+                                            <p:cond delay="0"/>
+                                          </p:stCondLst>
+                                        </p:cTn>
+                                        <p:tgtEl>
+                                          <p:spTgt spid="3">
+                                            <p:txEl>
+                                              <p:pRg st="6" end="6"/>
+                                            </p:txEl>
+                                          </p:spTgt>
+                                        </p:tgtEl>
+                                        <p:attrNameLst>
+                                          <p:attrName>style.visibility</p:attrName>
+                                        </p:attrNameLst>
+                                      </p:cBhvr>
+                                      <p:to>
+                                        <p:strVal val="visible"/>
+                                      </p:to>
+                                    </p:set>
+                                    <p:animEffect transition="in" filter="fade">
+                                      <p:cBhvr>
+                                        <p:cTn id="29" dur="500"/>
+                                        <p:tgtEl>
+                                          <p:spTgt spid="3">
+                                            <p:txEl>
+                                              <p:pRg st="6" end="6"/>
+                                            </p:txEl>
+                                          </p:spTgt>
+                                        </p:tgtEl>
+                                      </p:cBhvr>
+                                    </p:animEffect>
+                                  </p:childTnLst>
+                                </p:cTn>
+                              </p:par>
+                              <p:par>
+                                <p:cTn id="30" presetID="10" presetClass="entr" presetSubtype="0" fill="hold" grpId="0" nodeType="withEffect">
+                                  <p:stCondLst>
+                                    <p:cond delay="0"/>
+                                  </p:stCondLst>
+                                  <p:childTnLst>
+                                    <p:set>
+                                      <p:cBhvr>
+                                        <p:cTn id="31" dur="1" fill="hold">
+                                          <p:stCondLst>
+                                            <p:cond delay="0"/>
+                                          </p:stCondLst>
+                                        </p:cTn>
+                                        <p:tgtEl>
+                                          <p:spTgt spid="3">
+                                            <p:txEl>
+                                              <p:pRg st="7" end="7"/>
+                                            </p:txEl>
+                                          </p:spTgt>
+                                        </p:tgtEl>
+                                        <p:attrNameLst>
+                                          <p:attrName>style.visibility</p:attrName>
+                                        </p:attrNameLst>
+                                      </p:cBhvr>
+                                      <p:to>
+                                        <p:strVal val="visible"/>
+                                      </p:to>
+                                    </p:set>
+                                    <p:animEffect transition="in" filter="fade">
+                                      <p:cBhvr>
+                                        <p:cTn id="32" dur="500"/>
+                                        <p:tgtEl>
+                                          <p:spTgt spid="3">
+                                            <p:txEl>
+                                              <p:pRg st="7" end="7"/>
+                                            </p:txEl>
+                                          </p:spTgt>
+                                        </p:tgtEl>
+                                      </p:cBhvr>
+                                    </p:animEffect>
+                                  </p:childTnLst>
+                                </p:cTn>
+                              </p:par>
+                            </p:childTnLst>
+                          </p:cTn>
+                        </p:par>
+                      </p:childTnLst>
+                    </p:cTn>
+                  </p:par>
+                </p:childTnLst>
+              </p:cTn>
+              <p:prevCondLst>
+                <p:cond evt="onPrev" delay="0">
+                  <p:tgtEl>
+                    <p:sldTgt/>
+                  </p:tgtEl>
+                </p:cond>
+              </p:prevCondLst>
+              <p:nextCondLst>
+                <p:cond evt="onNext" delay="0">
+                  <p:tgtEl>
+                    <p:sldTgt/>
+                  </p:tgtEl>
+                </p:cond>
+              </p:nextCondLst>
+            </p:seq>
+          </p:childTnLst>
+        </p:cTn>
+      </p:par>
+    </p:tnLst>
+    <p:bldLst>
+      <p:bldP spid="3" grpId="0" build="p"/>
+    </p:bldLst>
+  </p:timing>
+</p:sld>
+</file>
+
+<file path=ppt/slides/slide23.xml><?xml version="1.0" encoding="utf-8"?>
+<p:sld xmlns:a="http://schemas.openxmlformats.org/drawingml/2006/main" xmlns:r="http://schemas.openxmlformats.org/officeDocument/2006/relationships" xmlns:p="http://schemas.openxmlformats.org/presentationml/2006/main">
+  <p:cSld>
+    <p:spTree>
+      <p:nvGrpSpPr>
+        <p:cNvPr id="1" name=""/>
+        <p:cNvGrpSpPr/>
+        <p:nvPr/>
+      </p:nvGrpSpPr>
+      <p:grpSpPr>
+        <a:xfrm>
+          <a:off x="0" y="0"/>
+          <a:ext cx="0" cy="0"/>
+          <a:chOff x="0" y="0"/>
+          <a:chExt cx="0" cy="0"/>
+        </a:xfrm>
+      </p:grpSpPr>
+      <p:sp>
+        <p:nvSpPr>
+          <p:cNvPr id="2" name="Title 1">
+            <a:extLst>
+              <a:ext uri="{FF2B5EF4-FFF2-40B4-BE49-F238E27FC236}">
+                <a16:creationId xmlns:a16="http://schemas.microsoft.com/office/drawing/2014/main" id="{26AFA8D6-8CF9-4D6D-AC30-A5504074897A}"/>
+              </a:ext>
+            </a:extLst>
+          </p:cNvPr>
+          <p:cNvSpPr>
+            <a:spLocks noGrp="1"/>
+          </p:cNvSpPr>
+          <p:nvPr>
+            <p:ph type="title"/>
+          </p:nvPr>
+        </p:nvSpPr>
+        <p:spPr/>
+        <p:txBody>
+          <a:bodyPr/>
+          <a:lstStyle/>
+          <a:p>
+            <a:r>
+              <a:rPr lang="en-US" dirty="0"/>
+              <a:t>Container Advantages</a:t>
+            </a:r>
+          </a:p>
+        </p:txBody>
+      </p:sp>
+      <p:sp>
+        <p:nvSpPr>
+          <p:cNvPr id="3" name="Content Placeholder 2">
+            <a:extLst>
+              <a:ext uri="{FF2B5EF4-FFF2-40B4-BE49-F238E27FC236}">
+                <a16:creationId xmlns:a16="http://schemas.microsoft.com/office/drawing/2014/main" id="{51892F45-8456-4EAF-BC73-F78EF9921B1C}"/>
+              </a:ext>
+            </a:extLst>
+          </p:cNvPr>
+          <p:cNvSpPr>
+            <a:spLocks noGrp="1"/>
+          </p:cNvSpPr>
+          <p:nvPr>
+            <p:ph idx="1"/>
+          </p:nvPr>
+        </p:nvSpPr>
+        <p:spPr>
+          <a:xfrm>
+            <a:off x="581192" y="2180496"/>
+            <a:ext cx="11029615" cy="4161938"/>
+          </a:xfrm>
+        </p:spPr>
+        <p:txBody>
+          <a:bodyPr>
+            <a:normAutofit/>
+          </a:bodyPr>
+          <a:lstStyle/>
+          <a:p>
+            <a:r>
+              <a:rPr lang="en-US" dirty="0"/>
+              <a:t>True Isolation of Resources</a:t>
+            </a:r>
+          </a:p>
+          <a:p>
+            <a:r>
+              <a:rPr lang="en-US" dirty="0"/>
+              <a:t>Truly identical application packaging</a:t>
+            </a:r>
+          </a:p>
+          <a:p>
+            <a:r>
+              <a:rPr lang="en-US" dirty="0"/>
+              <a:t>Automated application deployment</a:t>
+            </a:r>
+          </a:p>
+          <a:p>
+            <a:r>
+              <a:rPr lang="en-US" dirty="0"/>
+              <a:t>Rapid deployment</a:t>
+            </a:r>
+          </a:p>
+          <a:p>
+            <a:r>
+              <a:rPr lang="en-US" dirty="0"/>
+              <a:t>Extremely low redundancy / Simplified portability</a:t>
+            </a:r>
+          </a:p>
+          <a:p>
+            <a:r>
+              <a:rPr lang="en-US" dirty="0"/>
+              <a:t>Minimum runtime requirements</a:t>
+            </a:r>
+          </a:p>
+          <a:p>
+            <a:r>
+              <a:rPr lang="en-US" dirty="0"/>
+              <a:t>Minimum resource requirements</a:t>
+            </a:r>
+          </a:p>
+          <a:p>
+            <a:r>
+              <a:rPr lang="en-US" dirty="0"/>
+              <a:t>Excellent management</a:t>
+            </a:r>
+          </a:p>
+          <a:p>
+            <a:r>
+              <a:rPr lang="en-US" dirty="0"/>
+              <a:t>Simplified portability</a:t>
+            </a:r>
+          </a:p>
+          <a:p>
+            <a:endParaRPr lang="en-US" dirty="0"/>
+          </a:p>
+        </p:txBody>
+      </p:sp>
+    </p:spTree>
+    <p:extLst>
+      <p:ext uri="{BB962C8B-B14F-4D97-AF65-F5344CB8AC3E}">
+        <p14:creationId xmlns:p14="http://schemas.microsoft.com/office/powerpoint/2010/main" val="1468609087"/>
+      </p:ext>
+    </p:extLst>
+  </p:cSld>
+  <p:clrMapOvr>
+    <a:masterClrMapping/>
+  </p:clrMapOvr>
+  <p:timing>
+    <p:tnLst>
+      <p:par>
+        <p:cTn id="1" dur="indefinite" restart="never" nodeType="tmRoot">
+          <p:childTnLst>
+            <p:seq concurrent="1" nextAc="seek">
+              <p:cTn id="2" dur="indefinite" nodeType="mainSeq">
+                <p:childTnLst>
+                  <p:par>
+                    <p:cTn id="3" fill="hold">
+                      <p:stCondLst>
+                        <p:cond delay="indefinite"/>
+                      </p:stCondLst>
+                      <p:childTnLst>
+                        <p:par>
+                          <p:cTn id="4" fill="hold">
+                            <p:stCondLst>
+                              <p:cond delay="0"/>
+                            </p:stCondLst>
+                            <p:childTnLst>
+                              <p:par>
+                                <p:cTn id="5" presetID="10" presetClass="entr" presetSubtype="0" fill="hold" grpId="0" nodeType="clickEffect">
+                                  <p:stCondLst>
+                                    <p:cond delay="0"/>
+                                  </p:stCondLst>
+                                  <p:childTnLst>
+                                    <p:set>
+                                      <p:cBhvr>
+                                        <p:cTn id="6" dur="1" fill="hold">
+                                          <p:stCondLst>
+                                            <p:cond delay="0"/>
+                                          </p:stCondLst>
+                                        </p:cTn>
+                                        <p:tgtEl>
+                                          <p:spTgt spid="3">
+                                            <p:txEl>
+                                              <p:pRg st="0" end="0"/>
+                                            </p:txEl>
+                                          </p:spTgt>
+                                        </p:tgtEl>
+                                        <p:attrNameLst>
+                                          <p:attrName>style.visibility</p:attrName>
+                                        </p:attrNameLst>
+                                      </p:cBhvr>
+                                      <p:to>
+                                        <p:strVal val="visible"/>
+                                      </p:to>
+                                    </p:set>
+                                    <p:animEffect transition="in" filter="fade">
+                                      <p:cBhvr>
+                                        <p:cTn id="7" dur="500"/>
+                                        <p:tgtEl>
+                                          <p:spTgt spid="3">
+                                            <p:txEl>
+                                              <p:pRg st="0" end="0"/>
+                                            </p:txEl>
+                                          </p:spTgt>
+                                        </p:tgtEl>
+                                      </p:cBhvr>
+                                    </p:animEffect>
+                                  </p:childTnLst>
+                                </p:cTn>
+                              </p:par>
+                            </p:childTnLst>
+                          </p:cTn>
+                        </p:par>
+                      </p:childTnLst>
+                    </p:cTn>
+                  </p:par>
+                  <p:par>
+                    <p:cTn id="8" fill="hold">
+                      <p:stCondLst>
+                        <p:cond delay="indefinite"/>
+                      </p:stCondLst>
+                      <p:childTnLst>
+                        <p:par>
+                          <p:cTn id="9" fill="hold">
+                            <p:stCondLst>
+                              <p:cond delay="0"/>
+                            </p:stCondLst>
+                            <p:childTnLst>
+                              <p:par>
+                                <p:cTn id="10" presetID="10" presetClass="entr" presetSubtype="0" fill="hold" grpId="0" nodeType="clickEffect">
+                                  <p:stCondLst>
+                                    <p:cond delay="0"/>
+                                  </p:stCondLst>
+                                  <p:childTnLst>
+                                    <p:set>
+                                      <p:cBhvr>
+                                        <p:cTn id="11" dur="1" fill="hold">
+                                          <p:stCondLst>
+                                            <p:cond delay="0"/>
+                                          </p:stCondLst>
+                                        </p:cTn>
+                                        <p:tgtEl>
+                                          <p:spTgt spid="3">
+                                            <p:txEl>
+                                              <p:pRg st="1" end="1"/>
+                                            </p:txEl>
+                                          </p:spTgt>
+                                        </p:tgtEl>
+                                        <p:attrNameLst>
+                                          <p:attrName>style.visibility</p:attrName>
+                                        </p:attrNameLst>
+                                      </p:cBhvr>
+                                      <p:to>
+                                        <p:strVal val="visible"/>
+                                      </p:to>
+                                    </p:set>
+                                    <p:animEffect transition="in" filter="fade">
+                                      <p:cBhvr>
+                                        <p:cTn id="12" dur="500"/>
+                                        <p:tgtEl>
+                                          <p:spTgt spid="3">
+                                            <p:txEl>
+                                              <p:pRg st="1" end="1"/>
+                                            </p:txEl>
+                                          </p:spTgt>
+                                        </p:tgtEl>
+                                      </p:cBhvr>
+                                    </p:animEffect>
+                                  </p:childTnLst>
+                                </p:cTn>
+                              </p:par>
+                            </p:childTnLst>
+                          </p:cTn>
+                        </p:par>
+                      </p:childTnLst>
+                    </p:cTn>
+                  </p:par>
+                  <p:par>
+                    <p:cTn id="13" fill="hold">
+                      <p:stCondLst>
+                        <p:cond delay="indefinite"/>
+                      </p:stCondLst>
+                      <p:childTnLst>
+                        <p:par>
+                          <p:cTn id="14" fill="hold">
+                            <p:stCondLst>
+                              <p:cond delay="0"/>
+                            </p:stCondLst>
+                            <p:childTnLst>
+                              <p:par>
+                                <p:cTn id="15" presetID="10" presetClass="entr" presetSubtype="0" fill="hold" grpId="0" nodeType="clickEffect">
+                                  <p:stCondLst>
+                                    <p:cond delay="0"/>
+                                  </p:stCondLst>
+                                  <p:childTnLst>
+                                    <p:set>
+                                      <p:cBhvr>
+                                        <p:cTn id="16" dur="1" fill="hold">
+                                          <p:stCondLst>
+                                            <p:cond delay="0"/>
+                                          </p:stCondLst>
+                                        </p:cTn>
+                                        <p:tgtEl>
+                                          <p:spTgt spid="3">
+                                            <p:txEl>
+                                              <p:pRg st="2" end="2"/>
+                                            </p:txEl>
+                                          </p:spTgt>
+                                        </p:tgtEl>
+                                        <p:attrNameLst>
+                                          <p:attrName>style.visibility</p:attrName>
+                                        </p:attrNameLst>
+                                      </p:cBhvr>
+                                      <p:to>
+                                        <p:strVal val="visible"/>
+                                      </p:to>
+                                    </p:set>
+                                    <p:animEffect transition="in" filter="fade">
+                                      <p:cBhvr>
+                                        <p:cTn id="17" dur="500"/>
+                                        <p:tgtEl>
+                                          <p:spTgt spid="3">
+                                            <p:txEl>
+                                              <p:pRg st="2" end="2"/>
+                                            </p:txEl>
+                                          </p:spTgt>
+                                        </p:tgtEl>
+                                      </p:cBhvr>
+                                    </p:animEffect>
+                                  </p:childTnLst>
+                                </p:cTn>
+                              </p:par>
+                            </p:childTnLst>
+                          </p:cTn>
+                        </p:par>
+                      </p:childTnLst>
+                    </p:cTn>
+                  </p:par>
+                  <p:par>
+                    <p:cTn id="18" fill="hold">
+                      <p:stCondLst>
+                        <p:cond delay="indefinite"/>
+                      </p:stCondLst>
+                      <p:childTnLst>
+                        <p:par>
+                          <p:cTn id="19" fill="hold">
+                            <p:stCondLst>
+                              <p:cond delay="0"/>
+                            </p:stCondLst>
+                            <p:childTnLst>
+                              <p:par>
+                                <p:cTn id="20" presetID="10" presetClass="entr" presetSubtype="0" fill="hold" grpId="0" nodeType="clickEffect">
+                                  <p:stCondLst>
+                                    <p:cond delay="0"/>
+                                  </p:stCondLst>
+                                  <p:childTnLst>
+                                    <p:set>
+                                      <p:cBhvr>
+                                        <p:cTn id="21" dur="1" fill="hold">
+                                          <p:stCondLst>
+                                            <p:cond delay="0"/>
+                                          </p:stCondLst>
+                                        </p:cTn>
+                                        <p:tgtEl>
+                                          <p:spTgt spid="3">
+                                            <p:txEl>
+                                              <p:pRg st="3" end="3"/>
+                                            </p:txEl>
+                                          </p:spTgt>
+                                        </p:tgtEl>
+                                        <p:attrNameLst>
+                                          <p:attrName>style.visibility</p:attrName>
+                                        </p:attrNameLst>
+                                      </p:cBhvr>
+                                      <p:to>
+                                        <p:strVal val="visible"/>
+                                      </p:to>
+                                    </p:set>
+                                    <p:animEffect transition="in" filter="fade">
+                                      <p:cBhvr>
+                                        <p:cTn id="22" dur="500"/>
+                                        <p:tgtEl>
+                                          <p:spTgt spid="3">
+                                            <p:txEl>
+                                              <p:pRg st="3" end="3"/>
+                                            </p:txEl>
+                                          </p:spTgt>
+                                        </p:tgtEl>
+                                      </p:cBhvr>
+                                    </p:animEffect>
+                                  </p:childTnLst>
+                                </p:cTn>
+                              </p:par>
+                            </p:childTnLst>
+                          </p:cTn>
+                        </p:par>
+                      </p:childTnLst>
+                    </p:cTn>
+                  </p:par>
+                  <p:par>
+                    <p:cTn id="23" fill="hold">
+                      <p:stCondLst>
+                        <p:cond delay="indefinite"/>
+                      </p:stCondLst>
+                      <p:childTnLst>
+                        <p:par>
+                          <p:cTn id="24" fill="hold">
+                            <p:stCondLst>
+                              <p:cond delay="0"/>
+                            </p:stCondLst>
+                            <p:childTnLst>
+                              <p:par>
+                                <p:cTn id="25" presetID="10" presetClass="entr" presetSubtype="0" fill="hold" grpId="0" nodeType="clickEffect">
+                                  <p:stCondLst>
+                                    <p:cond delay="0"/>
+                                  </p:stCondLst>
+                                  <p:childTnLst>
+                                    <p:set>
+                                      <p:cBhvr>
+                                        <p:cTn id="26" dur="1" fill="hold">
+                                          <p:stCondLst>
+                                            <p:cond delay="0"/>
+                                          </p:stCondLst>
+                                        </p:cTn>
+                                        <p:tgtEl>
+                                          <p:spTgt spid="3">
+                                            <p:txEl>
+                                              <p:pRg st="4" end="4"/>
+                                            </p:txEl>
+                                          </p:spTgt>
+                                        </p:tgtEl>
+                                        <p:attrNameLst>
+                                          <p:attrName>style.visibility</p:attrName>
+                                        </p:attrNameLst>
+                                      </p:cBhvr>
+                                      <p:to>
+                                        <p:strVal val="visible"/>
+                                      </p:to>
+                                    </p:set>
+                                    <p:animEffect transition="in" filter="fade">
+                                      <p:cBhvr>
+                                        <p:cTn id="27" dur="500"/>
+                                        <p:tgtEl>
+                                          <p:spTgt spid="3">
+                                            <p:txEl>
+                                              <p:pRg st="4" end="4"/>
+                                            </p:txEl>
+                                          </p:spTgt>
+                                        </p:tgtEl>
+                                      </p:cBhvr>
+                                    </p:animEffect>
+                                  </p:childTnLst>
+                                </p:cTn>
+                              </p:par>
+                            </p:childTnLst>
+                          </p:cTn>
+                        </p:par>
+                      </p:childTnLst>
+                    </p:cTn>
+                  </p:par>
+                  <p:par>
+                    <p:cTn id="28" fill="hold">
+                      <p:stCondLst>
+                        <p:cond delay="indefinite"/>
+                      </p:stCondLst>
+                      <p:childTnLst>
+                        <p:par>
+                          <p:cTn id="29" fill="hold">
+                            <p:stCondLst>
+                              <p:cond delay="0"/>
+                            </p:stCondLst>
+                            <p:childTnLst>
+                              <p:par>
+                                <p:cTn id="30" presetID="10" presetClass="entr" presetSubtype="0" fill="hold" grpId="0" nodeType="clickEffect">
+                                  <p:stCondLst>
+                                    <p:cond delay="0"/>
+                                  </p:stCondLst>
+                                  <p:childTnLst>
+                                    <p:set>
+                                      <p:cBhvr>
+                                        <p:cTn id="31" dur="1" fill="hold">
+                                          <p:stCondLst>
+                                            <p:cond delay="0"/>
+                                          </p:stCondLst>
+                                        </p:cTn>
+                                        <p:tgtEl>
+                                          <p:spTgt spid="3">
+                                            <p:txEl>
+                                              <p:pRg st="5" end="5"/>
+                                            </p:txEl>
+                                          </p:spTgt>
+                                        </p:tgtEl>
+                                        <p:attrNameLst>
+                                          <p:attrName>style.visibility</p:attrName>
+                                        </p:attrNameLst>
+                                      </p:cBhvr>
+                                      <p:to>
+                                        <p:strVal val="visible"/>
+                                      </p:to>
+                                    </p:set>
+                                    <p:animEffect transition="in" filter="fade">
+                                      <p:cBhvr>
+                                        <p:cTn id="32" dur="500"/>
+                                        <p:tgtEl>
+                                          <p:spTgt spid="3">
+                                            <p:txEl>
+                                              <p:pRg st="5" end="5"/>
+                                            </p:txEl>
+                                          </p:spTgt>
+                                        </p:tgtEl>
+                                      </p:cBhvr>
+                                    </p:animEffect>
+                                  </p:childTnLst>
+                                </p:cTn>
+                              </p:par>
+                            </p:childTnLst>
+                          </p:cTn>
+                        </p:par>
+                      </p:childTnLst>
+                    </p:cTn>
+                  </p:par>
+                  <p:par>
+                    <p:cTn id="33" fill="hold">
+                      <p:stCondLst>
+                        <p:cond delay="indefinite"/>
+                      </p:stCondLst>
+                      <p:childTnLst>
+                        <p:par>
+                          <p:cTn id="34" fill="hold">
+                            <p:stCondLst>
+                              <p:cond delay="0"/>
+                            </p:stCondLst>
+                            <p:childTnLst>
+                              <p:par>
+                                <p:cTn id="35" presetID="10" presetClass="entr" presetSubtype="0" fill="hold" grpId="0" nodeType="clickEffect">
+                                  <p:stCondLst>
+                                    <p:cond delay="0"/>
+                                  </p:stCondLst>
+                                  <p:childTnLst>
+                                    <p:set>
+                                      <p:cBhvr>
+                                        <p:cTn id="36" dur="1" fill="hold">
+                                          <p:stCondLst>
+                                            <p:cond delay="0"/>
+                                          </p:stCondLst>
+                                        </p:cTn>
+                                        <p:tgtEl>
+                                          <p:spTgt spid="3">
+                                            <p:txEl>
+                                              <p:pRg st="6" end="6"/>
+                                            </p:txEl>
+                                          </p:spTgt>
+                                        </p:tgtEl>
+                                        <p:attrNameLst>
+                                          <p:attrName>style.visibility</p:attrName>
+                                        </p:attrNameLst>
+                                      </p:cBhvr>
+                                      <p:to>
+                                        <p:strVal val="visible"/>
+                                      </p:to>
+                                    </p:set>
+                                    <p:animEffect transition="in" filter="fade">
+                                      <p:cBhvr>
+                                        <p:cTn id="37" dur="500"/>
+                                        <p:tgtEl>
+                                          <p:spTgt spid="3">
+                                            <p:txEl>
+                                              <p:pRg st="6" end="6"/>
+                                            </p:txEl>
+                                          </p:spTgt>
+                                        </p:tgtEl>
+                                      </p:cBhvr>
+                                    </p:animEffect>
+                                  </p:childTnLst>
+                                </p:cTn>
+                              </p:par>
+                            </p:childTnLst>
+                          </p:cTn>
+                        </p:par>
+                      </p:childTnLst>
+                    </p:cTn>
+                  </p:par>
+                  <p:par>
+                    <p:cTn id="38" fill="hold">
+                      <p:stCondLst>
+                        <p:cond delay="indefinite"/>
+                      </p:stCondLst>
+                      <p:childTnLst>
+                        <p:par>
+                          <p:cTn id="39" fill="hold">
+                            <p:stCondLst>
+                              <p:cond delay="0"/>
+                            </p:stCondLst>
+                            <p:childTnLst>
+                              <p:par>
+                                <p:cTn id="40" presetID="10" presetClass="entr" presetSubtype="0" fill="hold" grpId="0" nodeType="clickEffect">
+                                  <p:stCondLst>
+                                    <p:cond delay="0"/>
+                                  </p:stCondLst>
+                                  <p:childTnLst>
+                                    <p:set>
+                                      <p:cBhvr>
+                                        <p:cTn id="41" dur="1" fill="hold">
+                                          <p:stCondLst>
+                                            <p:cond delay="0"/>
+                                          </p:stCondLst>
+                                        </p:cTn>
+                                        <p:tgtEl>
+                                          <p:spTgt spid="3">
+                                            <p:txEl>
+                                              <p:pRg st="7" end="7"/>
+                                            </p:txEl>
+                                          </p:spTgt>
+                                        </p:tgtEl>
+                                        <p:attrNameLst>
+                                          <p:attrName>style.visibility</p:attrName>
+                                        </p:attrNameLst>
+                                      </p:cBhvr>
+                                      <p:to>
+                                        <p:strVal val="visible"/>
+                                      </p:to>
+                                    </p:set>
+                                    <p:animEffect transition="in" filter="fade">
+                                      <p:cBhvr>
+                                        <p:cTn id="42" dur="500"/>
+                                        <p:tgtEl>
+                                          <p:spTgt spid="3">
+                                            <p:txEl>
+                                              <p:pRg st="7" end="7"/>
+                                            </p:txEl>
+                                          </p:spTgt>
+                                        </p:tgtEl>
+                                      </p:cBhvr>
+                                    </p:animEffect>
+                                  </p:childTnLst>
+                                </p:cTn>
+                              </p:par>
+                            </p:childTnLst>
+                          </p:cTn>
+                        </p:par>
+                      </p:childTnLst>
+                    </p:cTn>
+                  </p:par>
+                  <p:par>
+                    <p:cTn id="43" fill="hold">
+                      <p:stCondLst>
+                        <p:cond delay="indefinite"/>
+                      </p:stCondLst>
+                      <p:childTnLst>
+                        <p:par>
+                          <p:cTn id="44" fill="hold">
+                            <p:stCondLst>
+                              <p:cond delay="0"/>
+                            </p:stCondLst>
+                            <p:childTnLst>
+                              <p:par>
+                                <p:cTn id="45" presetID="10" presetClass="entr" presetSubtype="0" fill="hold" grpId="0" nodeType="clickEffect">
+                                  <p:stCondLst>
+                                    <p:cond delay="0"/>
+                                  </p:stCondLst>
+                                  <p:childTnLst>
+                                    <p:set>
+                                      <p:cBhvr>
+                                        <p:cTn id="46" dur="1" fill="hold">
+                                          <p:stCondLst>
+                                            <p:cond delay="0"/>
+                                          </p:stCondLst>
+                                        </p:cTn>
+                                        <p:tgtEl>
+                                          <p:spTgt spid="3">
+                                            <p:txEl>
+                                              <p:pRg st="8" end="8"/>
+                                            </p:txEl>
+                                          </p:spTgt>
+                                        </p:tgtEl>
+                                        <p:attrNameLst>
+                                          <p:attrName>style.visibility</p:attrName>
+                                        </p:attrNameLst>
+                                      </p:cBhvr>
+                                      <p:to>
+                                        <p:strVal val="visible"/>
+                                      </p:to>
+                                    </p:set>
+                                    <p:animEffect transition="in" filter="fade">
+                                      <p:cBhvr>
+                                        <p:cTn id="47" dur="500"/>
+                                        <p:tgtEl>
+                                          <p:spTgt spid="3">
+                                            <p:txEl>
+                                              <p:pRg st="8" end="8"/>
+                                            </p:txEl>
+                                          </p:spTgt>
+                                        </p:tgtEl>
+                                      </p:cBhvr>
+                                    </p:animEffect>
+                                  </p:childTnLst>
+                                </p:cTn>
+                              </p:par>
+                            </p:childTnLst>
+                          </p:cTn>
+                        </p:par>
+                      </p:childTnLst>
+                    </p:cTn>
+                  </p:par>
+                </p:childTnLst>
+              </p:cTn>
+              <p:prevCondLst>
+                <p:cond evt="onPrev" delay="0">
+                  <p:tgtEl>
+                    <p:sldTgt/>
+                  </p:tgtEl>
+                </p:cond>
+              </p:prevCondLst>
+              <p:nextCondLst>
+                <p:cond evt="onNext" delay="0">
+                  <p:tgtEl>
+                    <p:sldTgt/>
+                  </p:tgtEl>
+                </p:cond>
+              </p:nextCondLst>
+            </p:seq>
+          </p:childTnLst>
+        </p:cTn>
+      </p:par>
+    </p:tnLst>
+    <p:bldLst>
+      <p:bldP spid="3" grpId="0" build="p"/>
+    </p:bldLst>
+  </p:timing>
 </p:sld>
 </file>
 

</xml_diff>

<commit_message>
Finished up the containers details section.
</commit_message>
<xml_diff>
--- a/presentation/presentation.pptx
+++ b/presentation/presentation.pptx
@@ -5,7 +5,7 @@
     <p:sldMasterId id="2147483648" r:id="rId1"/>
   </p:sldMasterIdLst>
   <p:notesMasterIdLst>
-    <p:notesMasterId r:id="rId25"/>
+    <p:notesMasterId r:id="rId29"/>
   </p:notesMasterIdLst>
   <p:sldIdLst>
     <p:sldId id="258" r:id="rId2"/>
@@ -31,6 +31,10 @@
     <p:sldId id="282" r:id="rId22"/>
     <p:sldId id="283" r:id="rId23"/>
     <p:sldId id="284" r:id="rId24"/>
+    <p:sldId id="285" r:id="rId25"/>
+    <p:sldId id="287" r:id="rId26"/>
+    <p:sldId id="286" r:id="rId27"/>
+    <p:sldId id="288" r:id="rId28"/>
   </p:sldIdLst>
   <p:sldSz cx="12192000" cy="6858000"/>
   <p:notesSz cx="6858000" cy="9144000"/>
@@ -177,6 +181,10 @@
             <p14:sldId id="282"/>
             <p14:sldId id="283"/>
             <p14:sldId id="284"/>
+            <p14:sldId id="285"/>
+            <p14:sldId id="287"/>
+            <p14:sldId id="286"/>
+            <p14:sldId id="288"/>
           </p14:sldIdLst>
         </p14:section>
         <p14:section name="A Look at Some Concerns" id="{BBBC4B94-5C39-44E3-86B7-9871E92F1E29}">
@@ -21312,6 +21320,2253 @@
 </p:sld>
 </file>
 
+<file path=ppt/slides/slide24.xml><?xml version="1.0" encoding="utf-8"?>
+<p:sld xmlns:a="http://schemas.openxmlformats.org/drawingml/2006/main" xmlns:r="http://schemas.openxmlformats.org/officeDocument/2006/relationships" xmlns:p="http://schemas.openxmlformats.org/presentationml/2006/main">
+  <p:cSld>
+    <p:spTree>
+      <p:nvGrpSpPr>
+        <p:cNvPr id="1" name=""/>
+        <p:cNvGrpSpPr/>
+        <p:nvPr/>
+      </p:nvGrpSpPr>
+      <p:grpSpPr>
+        <a:xfrm>
+          <a:off x="0" y="0"/>
+          <a:ext cx="0" cy="0"/>
+          <a:chOff x="0" y="0"/>
+          <a:chExt cx="0" cy="0"/>
+        </a:xfrm>
+      </p:grpSpPr>
+      <p:sp>
+        <p:nvSpPr>
+          <p:cNvPr id="2" name="Title 1">
+            <a:extLst>
+              <a:ext uri="{FF2B5EF4-FFF2-40B4-BE49-F238E27FC236}">
+                <a16:creationId xmlns:a16="http://schemas.microsoft.com/office/drawing/2014/main" id="{26AFA8D6-8CF9-4D6D-AC30-A5504074897A}"/>
+              </a:ext>
+            </a:extLst>
+          </p:cNvPr>
+          <p:cNvSpPr>
+            <a:spLocks noGrp="1"/>
+          </p:cNvSpPr>
+          <p:nvPr>
+            <p:ph type="title"/>
+          </p:nvPr>
+        </p:nvSpPr>
+        <p:spPr/>
+        <p:txBody>
+          <a:bodyPr/>
+          <a:lstStyle/>
+          <a:p>
+            <a:r>
+              <a:rPr lang="en-US" dirty="0"/>
+              <a:t>Containers and Development</a:t>
+            </a:r>
+          </a:p>
+        </p:txBody>
+      </p:sp>
+      <p:sp>
+        <p:nvSpPr>
+          <p:cNvPr id="3" name="Content Placeholder 2">
+            <a:extLst>
+              <a:ext uri="{FF2B5EF4-FFF2-40B4-BE49-F238E27FC236}">
+                <a16:creationId xmlns:a16="http://schemas.microsoft.com/office/drawing/2014/main" id="{51892F45-8456-4EAF-BC73-F78EF9921B1C}"/>
+              </a:ext>
+            </a:extLst>
+          </p:cNvPr>
+          <p:cNvSpPr>
+            <a:spLocks noGrp="1"/>
+          </p:cNvSpPr>
+          <p:nvPr>
+            <p:ph idx="1"/>
+          </p:nvPr>
+        </p:nvSpPr>
+        <p:spPr>
+          <a:xfrm>
+            <a:off x="581192" y="2180496"/>
+            <a:ext cx="11029615" cy="4161938"/>
+          </a:xfrm>
+        </p:spPr>
+        <p:txBody>
+          <a:bodyPr>
+            <a:normAutofit/>
+          </a:bodyPr>
+          <a:lstStyle/>
+          <a:p>
+            <a:r>
+              <a:rPr lang="en-US" dirty="0"/>
+              <a:t>No need to install and manage dependencies (I’ll demonstrate this)</a:t>
+            </a:r>
+          </a:p>
+          <a:p>
+            <a:r>
+              <a:rPr lang="en-US" dirty="0"/>
+              <a:t>Dependencies and their configuration </a:t>
+            </a:r>
+            <a:r>
+              <a:rPr lang="en-US" i="1" dirty="0"/>
+              <a:t>are part of source code</a:t>
+            </a:r>
+            <a:endParaRPr lang="en-US" dirty="0"/>
+          </a:p>
+          <a:p>
+            <a:pPr lvl="1"/>
+            <a:r>
+              <a:rPr lang="en-US" dirty="0"/>
+              <a:t>This means everything behaves the same for everyone.  </a:t>
+            </a:r>
+            <a:r>
+              <a:rPr lang="en-US" b="1" dirty="0">
+                <a:solidFill>
+                  <a:srgbClr val="FF0000"/>
+                </a:solidFill>
+              </a:rPr>
+              <a:t>This is critically important</a:t>
+            </a:r>
+            <a:endParaRPr lang="en-US" dirty="0"/>
+          </a:p>
+          <a:p>
+            <a:pPr lvl="1"/>
+            <a:r>
+              <a:rPr lang="en-US" dirty="0"/>
+              <a:t>When a developer solves a dependency problem, everyone gets it immediately</a:t>
+            </a:r>
+          </a:p>
+          <a:p>
+            <a:r>
+              <a:rPr lang="en-US" dirty="0"/>
+              <a:t>Resources for dependencies are only consumed when running the application.  For example on Evolve we run:</a:t>
+            </a:r>
+          </a:p>
+          <a:p>
+            <a:pPr lvl="1"/>
+            <a:r>
+              <a:rPr lang="en-US" dirty="0"/>
+              <a:t>Erlang</a:t>
+            </a:r>
+          </a:p>
+          <a:p>
+            <a:pPr lvl="1"/>
+            <a:r>
+              <a:rPr lang="en-US" dirty="0"/>
+              <a:t>RabbitMQ</a:t>
+            </a:r>
+          </a:p>
+          <a:p>
+            <a:pPr lvl="1"/>
+            <a:r>
+              <a:rPr lang="en-US" dirty="0"/>
+              <a:t>SQL Server</a:t>
+            </a:r>
+          </a:p>
+        </p:txBody>
+      </p:sp>
+    </p:spTree>
+    <p:extLst>
+      <p:ext uri="{BB962C8B-B14F-4D97-AF65-F5344CB8AC3E}">
+        <p14:creationId xmlns:p14="http://schemas.microsoft.com/office/powerpoint/2010/main" val="707627004"/>
+      </p:ext>
+    </p:extLst>
+  </p:cSld>
+  <p:clrMapOvr>
+    <a:masterClrMapping/>
+  </p:clrMapOvr>
+  <p:timing>
+    <p:tnLst>
+      <p:par>
+        <p:cTn id="1" dur="indefinite" restart="never" nodeType="tmRoot">
+          <p:childTnLst>
+            <p:seq concurrent="1" nextAc="seek">
+              <p:cTn id="2" dur="indefinite" nodeType="mainSeq">
+                <p:childTnLst>
+                  <p:par>
+                    <p:cTn id="3" fill="hold">
+                      <p:stCondLst>
+                        <p:cond delay="indefinite"/>
+                      </p:stCondLst>
+                      <p:childTnLst>
+                        <p:par>
+                          <p:cTn id="4" fill="hold">
+                            <p:stCondLst>
+                              <p:cond delay="0"/>
+                            </p:stCondLst>
+                            <p:childTnLst>
+                              <p:par>
+                                <p:cTn id="5" presetID="10" presetClass="entr" presetSubtype="0" fill="hold" grpId="0" nodeType="clickEffect">
+                                  <p:stCondLst>
+                                    <p:cond delay="0"/>
+                                  </p:stCondLst>
+                                  <p:childTnLst>
+                                    <p:set>
+                                      <p:cBhvr>
+                                        <p:cTn id="6" dur="1" fill="hold">
+                                          <p:stCondLst>
+                                            <p:cond delay="0"/>
+                                          </p:stCondLst>
+                                        </p:cTn>
+                                        <p:tgtEl>
+                                          <p:spTgt spid="3">
+                                            <p:txEl>
+                                              <p:pRg st="0" end="0"/>
+                                            </p:txEl>
+                                          </p:spTgt>
+                                        </p:tgtEl>
+                                        <p:attrNameLst>
+                                          <p:attrName>style.visibility</p:attrName>
+                                        </p:attrNameLst>
+                                      </p:cBhvr>
+                                      <p:to>
+                                        <p:strVal val="visible"/>
+                                      </p:to>
+                                    </p:set>
+                                    <p:animEffect transition="in" filter="fade">
+                                      <p:cBhvr>
+                                        <p:cTn id="7" dur="500"/>
+                                        <p:tgtEl>
+                                          <p:spTgt spid="3">
+                                            <p:txEl>
+                                              <p:pRg st="0" end="0"/>
+                                            </p:txEl>
+                                          </p:spTgt>
+                                        </p:tgtEl>
+                                      </p:cBhvr>
+                                    </p:animEffect>
+                                  </p:childTnLst>
+                                </p:cTn>
+                              </p:par>
+                            </p:childTnLst>
+                          </p:cTn>
+                        </p:par>
+                      </p:childTnLst>
+                    </p:cTn>
+                  </p:par>
+                  <p:par>
+                    <p:cTn id="8" fill="hold">
+                      <p:stCondLst>
+                        <p:cond delay="indefinite"/>
+                      </p:stCondLst>
+                      <p:childTnLst>
+                        <p:par>
+                          <p:cTn id="9" fill="hold">
+                            <p:stCondLst>
+                              <p:cond delay="0"/>
+                            </p:stCondLst>
+                            <p:childTnLst>
+                              <p:par>
+                                <p:cTn id="10" presetID="10" presetClass="entr" presetSubtype="0" fill="hold" grpId="0" nodeType="clickEffect">
+                                  <p:stCondLst>
+                                    <p:cond delay="0"/>
+                                  </p:stCondLst>
+                                  <p:childTnLst>
+                                    <p:set>
+                                      <p:cBhvr>
+                                        <p:cTn id="11" dur="1" fill="hold">
+                                          <p:stCondLst>
+                                            <p:cond delay="0"/>
+                                          </p:stCondLst>
+                                        </p:cTn>
+                                        <p:tgtEl>
+                                          <p:spTgt spid="3">
+                                            <p:txEl>
+                                              <p:pRg st="1" end="1"/>
+                                            </p:txEl>
+                                          </p:spTgt>
+                                        </p:tgtEl>
+                                        <p:attrNameLst>
+                                          <p:attrName>style.visibility</p:attrName>
+                                        </p:attrNameLst>
+                                      </p:cBhvr>
+                                      <p:to>
+                                        <p:strVal val="visible"/>
+                                      </p:to>
+                                    </p:set>
+                                    <p:animEffect transition="in" filter="fade">
+                                      <p:cBhvr>
+                                        <p:cTn id="12" dur="500"/>
+                                        <p:tgtEl>
+                                          <p:spTgt spid="3">
+                                            <p:txEl>
+                                              <p:pRg st="1" end="1"/>
+                                            </p:txEl>
+                                          </p:spTgt>
+                                        </p:tgtEl>
+                                      </p:cBhvr>
+                                    </p:animEffect>
+                                  </p:childTnLst>
+                                </p:cTn>
+                              </p:par>
+                              <p:par>
+                                <p:cTn id="13" presetID="10" presetClass="entr" presetSubtype="0" fill="hold" grpId="0" nodeType="withEffect">
+                                  <p:stCondLst>
+                                    <p:cond delay="0"/>
+                                  </p:stCondLst>
+                                  <p:childTnLst>
+                                    <p:set>
+                                      <p:cBhvr>
+                                        <p:cTn id="14" dur="1" fill="hold">
+                                          <p:stCondLst>
+                                            <p:cond delay="0"/>
+                                          </p:stCondLst>
+                                        </p:cTn>
+                                        <p:tgtEl>
+                                          <p:spTgt spid="3">
+                                            <p:txEl>
+                                              <p:pRg st="2" end="2"/>
+                                            </p:txEl>
+                                          </p:spTgt>
+                                        </p:tgtEl>
+                                        <p:attrNameLst>
+                                          <p:attrName>style.visibility</p:attrName>
+                                        </p:attrNameLst>
+                                      </p:cBhvr>
+                                      <p:to>
+                                        <p:strVal val="visible"/>
+                                      </p:to>
+                                    </p:set>
+                                    <p:animEffect transition="in" filter="fade">
+                                      <p:cBhvr>
+                                        <p:cTn id="15" dur="500"/>
+                                        <p:tgtEl>
+                                          <p:spTgt spid="3">
+                                            <p:txEl>
+                                              <p:pRg st="2" end="2"/>
+                                            </p:txEl>
+                                          </p:spTgt>
+                                        </p:tgtEl>
+                                      </p:cBhvr>
+                                    </p:animEffect>
+                                  </p:childTnLst>
+                                </p:cTn>
+                              </p:par>
+                              <p:par>
+                                <p:cTn id="16" presetID="10" presetClass="entr" presetSubtype="0" fill="hold" grpId="0" nodeType="withEffect">
+                                  <p:stCondLst>
+                                    <p:cond delay="0"/>
+                                  </p:stCondLst>
+                                  <p:childTnLst>
+                                    <p:set>
+                                      <p:cBhvr>
+                                        <p:cTn id="17" dur="1" fill="hold">
+                                          <p:stCondLst>
+                                            <p:cond delay="0"/>
+                                          </p:stCondLst>
+                                        </p:cTn>
+                                        <p:tgtEl>
+                                          <p:spTgt spid="3">
+                                            <p:txEl>
+                                              <p:pRg st="3" end="3"/>
+                                            </p:txEl>
+                                          </p:spTgt>
+                                        </p:tgtEl>
+                                        <p:attrNameLst>
+                                          <p:attrName>style.visibility</p:attrName>
+                                        </p:attrNameLst>
+                                      </p:cBhvr>
+                                      <p:to>
+                                        <p:strVal val="visible"/>
+                                      </p:to>
+                                    </p:set>
+                                    <p:animEffect transition="in" filter="fade">
+                                      <p:cBhvr>
+                                        <p:cTn id="18" dur="500"/>
+                                        <p:tgtEl>
+                                          <p:spTgt spid="3">
+                                            <p:txEl>
+                                              <p:pRg st="3" end="3"/>
+                                            </p:txEl>
+                                          </p:spTgt>
+                                        </p:tgtEl>
+                                      </p:cBhvr>
+                                    </p:animEffect>
+                                  </p:childTnLst>
+                                </p:cTn>
+                              </p:par>
+                            </p:childTnLst>
+                          </p:cTn>
+                        </p:par>
+                      </p:childTnLst>
+                    </p:cTn>
+                  </p:par>
+                  <p:par>
+                    <p:cTn id="19" fill="hold">
+                      <p:stCondLst>
+                        <p:cond delay="indefinite"/>
+                      </p:stCondLst>
+                      <p:childTnLst>
+                        <p:par>
+                          <p:cTn id="20" fill="hold">
+                            <p:stCondLst>
+                              <p:cond delay="0"/>
+                            </p:stCondLst>
+                            <p:childTnLst>
+                              <p:par>
+                                <p:cTn id="21" presetID="10" presetClass="entr" presetSubtype="0" fill="hold" grpId="0" nodeType="clickEffect">
+                                  <p:stCondLst>
+                                    <p:cond delay="0"/>
+                                  </p:stCondLst>
+                                  <p:childTnLst>
+                                    <p:set>
+                                      <p:cBhvr>
+                                        <p:cTn id="22" dur="1" fill="hold">
+                                          <p:stCondLst>
+                                            <p:cond delay="0"/>
+                                          </p:stCondLst>
+                                        </p:cTn>
+                                        <p:tgtEl>
+                                          <p:spTgt spid="3">
+                                            <p:txEl>
+                                              <p:pRg st="4" end="4"/>
+                                            </p:txEl>
+                                          </p:spTgt>
+                                        </p:tgtEl>
+                                        <p:attrNameLst>
+                                          <p:attrName>style.visibility</p:attrName>
+                                        </p:attrNameLst>
+                                      </p:cBhvr>
+                                      <p:to>
+                                        <p:strVal val="visible"/>
+                                      </p:to>
+                                    </p:set>
+                                    <p:animEffect transition="in" filter="fade">
+                                      <p:cBhvr>
+                                        <p:cTn id="23" dur="500"/>
+                                        <p:tgtEl>
+                                          <p:spTgt spid="3">
+                                            <p:txEl>
+                                              <p:pRg st="4" end="4"/>
+                                            </p:txEl>
+                                          </p:spTgt>
+                                        </p:tgtEl>
+                                      </p:cBhvr>
+                                    </p:animEffect>
+                                  </p:childTnLst>
+                                </p:cTn>
+                              </p:par>
+                              <p:par>
+                                <p:cTn id="24" presetID="10" presetClass="entr" presetSubtype="0" fill="hold" grpId="0" nodeType="withEffect">
+                                  <p:stCondLst>
+                                    <p:cond delay="0"/>
+                                  </p:stCondLst>
+                                  <p:childTnLst>
+                                    <p:set>
+                                      <p:cBhvr>
+                                        <p:cTn id="25" dur="1" fill="hold">
+                                          <p:stCondLst>
+                                            <p:cond delay="0"/>
+                                          </p:stCondLst>
+                                        </p:cTn>
+                                        <p:tgtEl>
+                                          <p:spTgt spid="3">
+                                            <p:txEl>
+                                              <p:pRg st="5" end="5"/>
+                                            </p:txEl>
+                                          </p:spTgt>
+                                        </p:tgtEl>
+                                        <p:attrNameLst>
+                                          <p:attrName>style.visibility</p:attrName>
+                                        </p:attrNameLst>
+                                      </p:cBhvr>
+                                      <p:to>
+                                        <p:strVal val="visible"/>
+                                      </p:to>
+                                    </p:set>
+                                    <p:animEffect transition="in" filter="fade">
+                                      <p:cBhvr>
+                                        <p:cTn id="26" dur="500"/>
+                                        <p:tgtEl>
+                                          <p:spTgt spid="3">
+                                            <p:txEl>
+                                              <p:pRg st="5" end="5"/>
+                                            </p:txEl>
+                                          </p:spTgt>
+                                        </p:tgtEl>
+                                      </p:cBhvr>
+                                    </p:animEffect>
+                                  </p:childTnLst>
+                                </p:cTn>
+                              </p:par>
+                              <p:par>
+                                <p:cTn id="27" presetID="10" presetClass="entr" presetSubtype="0" fill="hold" grpId="0" nodeType="withEffect">
+                                  <p:stCondLst>
+                                    <p:cond delay="0"/>
+                                  </p:stCondLst>
+                                  <p:childTnLst>
+                                    <p:set>
+                                      <p:cBhvr>
+                                        <p:cTn id="28" dur="1" fill="hold">
+                                          <p:stCondLst>
+                                            <p:cond delay="0"/>
+                                          </p:stCondLst>
+                                        </p:cTn>
+                                        <p:tgtEl>
+                                          <p:spTgt spid="3">
+                                            <p:txEl>
+                                              <p:pRg st="6" end="6"/>
+                                            </p:txEl>
+                                          </p:spTgt>
+                                        </p:tgtEl>
+                                        <p:attrNameLst>
+                                          <p:attrName>style.visibility</p:attrName>
+                                        </p:attrNameLst>
+                                      </p:cBhvr>
+                                      <p:to>
+                                        <p:strVal val="visible"/>
+                                      </p:to>
+                                    </p:set>
+                                    <p:animEffect transition="in" filter="fade">
+                                      <p:cBhvr>
+                                        <p:cTn id="29" dur="500"/>
+                                        <p:tgtEl>
+                                          <p:spTgt spid="3">
+                                            <p:txEl>
+                                              <p:pRg st="6" end="6"/>
+                                            </p:txEl>
+                                          </p:spTgt>
+                                        </p:tgtEl>
+                                      </p:cBhvr>
+                                    </p:animEffect>
+                                  </p:childTnLst>
+                                </p:cTn>
+                              </p:par>
+                              <p:par>
+                                <p:cTn id="30" presetID="10" presetClass="entr" presetSubtype="0" fill="hold" grpId="0" nodeType="withEffect">
+                                  <p:stCondLst>
+                                    <p:cond delay="0"/>
+                                  </p:stCondLst>
+                                  <p:childTnLst>
+                                    <p:set>
+                                      <p:cBhvr>
+                                        <p:cTn id="31" dur="1" fill="hold">
+                                          <p:stCondLst>
+                                            <p:cond delay="0"/>
+                                          </p:stCondLst>
+                                        </p:cTn>
+                                        <p:tgtEl>
+                                          <p:spTgt spid="3">
+                                            <p:txEl>
+                                              <p:pRg st="7" end="7"/>
+                                            </p:txEl>
+                                          </p:spTgt>
+                                        </p:tgtEl>
+                                        <p:attrNameLst>
+                                          <p:attrName>style.visibility</p:attrName>
+                                        </p:attrNameLst>
+                                      </p:cBhvr>
+                                      <p:to>
+                                        <p:strVal val="visible"/>
+                                      </p:to>
+                                    </p:set>
+                                    <p:animEffect transition="in" filter="fade">
+                                      <p:cBhvr>
+                                        <p:cTn id="32" dur="500"/>
+                                        <p:tgtEl>
+                                          <p:spTgt spid="3">
+                                            <p:txEl>
+                                              <p:pRg st="7" end="7"/>
+                                            </p:txEl>
+                                          </p:spTgt>
+                                        </p:tgtEl>
+                                      </p:cBhvr>
+                                    </p:animEffect>
+                                  </p:childTnLst>
+                                </p:cTn>
+                              </p:par>
+                            </p:childTnLst>
+                          </p:cTn>
+                        </p:par>
+                      </p:childTnLst>
+                    </p:cTn>
+                  </p:par>
+                </p:childTnLst>
+              </p:cTn>
+              <p:prevCondLst>
+                <p:cond evt="onPrev" delay="0">
+                  <p:tgtEl>
+                    <p:sldTgt/>
+                  </p:tgtEl>
+                </p:cond>
+              </p:prevCondLst>
+              <p:nextCondLst>
+                <p:cond evt="onNext" delay="0">
+                  <p:tgtEl>
+                    <p:sldTgt/>
+                  </p:tgtEl>
+                </p:cond>
+              </p:nextCondLst>
+            </p:seq>
+          </p:childTnLst>
+        </p:cTn>
+      </p:par>
+    </p:tnLst>
+    <p:bldLst>
+      <p:bldP spid="3" grpId="0" build="p"/>
+    </p:bldLst>
+  </p:timing>
+</p:sld>
+</file>
+
+<file path=ppt/slides/slide25.xml><?xml version="1.0" encoding="utf-8"?>
+<p:sld xmlns:a="http://schemas.openxmlformats.org/drawingml/2006/main" xmlns:r="http://schemas.openxmlformats.org/officeDocument/2006/relationships" xmlns:p="http://schemas.openxmlformats.org/presentationml/2006/main">
+  <p:cSld>
+    <p:spTree>
+      <p:nvGrpSpPr>
+        <p:cNvPr id="1" name=""/>
+        <p:cNvGrpSpPr/>
+        <p:nvPr/>
+      </p:nvGrpSpPr>
+      <p:grpSpPr>
+        <a:xfrm>
+          <a:off x="0" y="0"/>
+          <a:ext cx="0" cy="0"/>
+          <a:chOff x="0" y="0"/>
+          <a:chExt cx="0" cy="0"/>
+        </a:xfrm>
+      </p:grpSpPr>
+      <p:sp>
+        <p:nvSpPr>
+          <p:cNvPr id="2" name="Title 1">
+            <a:extLst>
+              <a:ext uri="{FF2B5EF4-FFF2-40B4-BE49-F238E27FC236}">
+                <a16:creationId xmlns:a16="http://schemas.microsoft.com/office/drawing/2014/main" id="{26AFA8D6-8CF9-4D6D-AC30-A5504074897A}"/>
+              </a:ext>
+            </a:extLst>
+          </p:cNvPr>
+          <p:cNvSpPr>
+            <a:spLocks noGrp="1"/>
+          </p:cNvSpPr>
+          <p:nvPr>
+            <p:ph type="title"/>
+          </p:nvPr>
+        </p:nvSpPr>
+        <p:spPr/>
+        <p:txBody>
+          <a:bodyPr/>
+          <a:lstStyle/>
+          <a:p>
+            <a:r>
+              <a:rPr lang="en-US" dirty="0"/>
+              <a:t>Containers and Development (Continued)</a:t>
+            </a:r>
+          </a:p>
+        </p:txBody>
+      </p:sp>
+      <p:sp>
+        <p:nvSpPr>
+          <p:cNvPr id="3" name="Content Placeholder 2">
+            <a:extLst>
+              <a:ext uri="{FF2B5EF4-FFF2-40B4-BE49-F238E27FC236}">
+                <a16:creationId xmlns:a16="http://schemas.microsoft.com/office/drawing/2014/main" id="{51892F45-8456-4EAF-BC73-F78EF9921B1C}"/>
+              </a:ext>
+            </a:extLst>
+          </p:cNvPr>
+          <p:cNvSpPr>
+            <a:spLocks noGrp="1"/>
+          </p:cNvSpPr>
+          <p:nvPr>
+            <p:ph idx="1"/>
+          </p:nvPr>
+        </p:nvSpPr>
+        <p:spPr>
+          <a:xfrm>
+            <a:off x="581192" y="2180496"/>
+            <a:ext cx="11029615" cy="4161938"/>
+          </a:xfrm>
+        </p:spPr>
+        <p:txBody>
+          <a:bodyPr>
+            <a:normAutofit/>
+          </a:bodyPr>
+          <a:lstStyle/>
+          <a:p>
+            <a:r>
+              <a:rPr lang="en-US" dirty="0"/>
+              <a:t>Provides a true “all in one” environment to the developer, without manual intervention</a:t>
+            </a:r>
+          </a:p>
+          <a:p>
+            <a:r>
+              <a:rPr lang="en-US" dirty="0"/>
+              <a:t>The local environment can be </a:t>
+            </a:r>
+            <a:r>
+              <a:rPr lang="en-US" i="1" dirty="0"/>
+              <a:t>extremely</a:t>
+            </a:r>
+            <a:r>
+              <a:rPr lang="en-US" dirty="0"/>
+              <a:t> similar to downstream environments</a:t>
+            </a:r>
+          </a:p>
+          <a:p>
+            <a:r>
+              <a:rPr lang="en-US" dirty="0"/>
+              <a:t>When adding features or bugfixes, you can debug inside the </a:t>
+            </a:r>
+            <a:r>
+              <a:rPr lang="en-US" dirty="0" err="1"/>
+              <a:t>containerResources</a:t>
+            </a:r>
+            <a:r>
+              <a:rPr lang="en-US" dirty="0"/>
+              <a:t> are only consumed when running the application</a:t>
+            </a:r>
+          </a:p>
+          <a:p>
+            <a:endParaRPr lang="en-US" dirty="0"/>
+          </a:p>
+        </p:txBody>
+      </p:sp>
+    </p:spTree>
+    <p:extLst>
+      <p:ext uri="{BB962C8B-B14F-4D97-AF65-F5344CB8AC3E}">
+        <p14:creationId xmlns:p14="http://schemas.microsoft.com/office/powerpoint/2010/main" val="862020846"/>
+      </p:ext>
+    </p:extLst>
+  </p:cSld>
+  <p:clrMapOvr>
+    <a:masterClrMapping/>
+  </p:clrMapOvr>
+  <p:timing>
+    <p:tnLst>
+      <p:par>
+        <p:cTn id="1" dur="indefinite" restart="never" nodeType="tmRoot">
+          <p:childTnLst>
+            <p:seq concurrent="1" nextAc="seek">
+              <p:cTn id="2" dur="indefinite" nodeType="mainSeq">
+                <p:childTnLst>
+                  <p:par>
+                    <p:cTn id="3" fill="hold">
+                      <p:stCondLst>
+                        <p:cond delay="indefinite"/>
+                      </p:stCondLst>
+                      <p:childTnLst>
+                        <p:par>
+                          <p:cTn id="4" fill="hold">
+                            <p:stCondLst>
+                              <p:cond delay="0"/>
+                            </p:stCondLst>
+                            <p:childTnLst>
+                              <p:par>
+                                <p:cTn id="5" presetID="10" presetClass="entr" presetSubtype="0" fill="hold" grpId="0" nodeType="clickEffect">
+                                  <p:stCondLst>
+                                    <p:cond delay="0"/>
+                                  </p:stCondLst>
+                                  <p:childTnLst>
+                                    <p:set>
+                                      <p:cBhvr>
+                                        <p:cTn id="6" dur="1" fill="hold">
+                                          <p:stCondLst>
+                                            <p:cond delay="0"/>
+                                          </p:stCondLst>
+                                        </p:cTn>
+                                        <p:tgtEl>
+                                          <p:spTgt spid="3">
+                                            <p:txEl>
+                                              <p:pRg st="0" end="0"/>
+                                            </p:txEl>
+                                          </p:spTgt>
+                                        </p:tgtEl>
+                                        <p:attrNameLst>
+                                          <p:attrName>style.visibility</p:attrName>
+                                        </p:attrNameLst>
+                                      </p:cBhvr>
+                                      <p:to>
+                                        <p:strVal val="visible"/>
+                                      </p:to>
+                                    </p:set>
+                                    <p:animEffect transition="in" filter="fade">
+                                      <p:cBhvr>
+                                        <p:cTn id="7" dur="500"/>
+                                        <p:tgtEl>
+                                          <p:spTgt spid="3">
+                                            <p:txEl>
+                                              <p:pRg st="0" end="0"/>
+                                            </p:txEl>
+                                          </p:spTgt>
+                                        </p:tgtEl>
+                                      </p:cBhvr>
+                                    </p:animEffect>
+                                  </p:childTnLst>
+                                </p:cTn>
+                              </p:par>
+                            </p:childTnLst>
+                          </p:cTn>
+                        </p:par>
+                      </p:childTnLst>
+                    </p:cTn>
+                  </p:par>
+                  <p:par>
+                    <p:cTn id="8" fill="hold">
+                      <p:stCondLst>
+                        <p:cond delay="indefinite"/>
+                      </p:stCondLst>
+                      <p:childTnLst>
+                        <p:par>
+                          <p:cTn id="9" fill="hold">
+                            <p:stCondLst>
+                              <p:cond delay="0"/>
+                            </p:stCondLst>
+                            <p:childTnLst>
+                              <p:par>
+                                <p:cTn id="10" presetID="10" presetClass="entr" presetSubtype="0" fill="hold" grpId="0" nodeType="clickEffect">
+                                  <p:stCondLst>
+                                    <p:cond delay="0"/>
+                                  </p:stCondLst>
+                                  <p:childTnLst>
+                                    <p:set>
+                                      <p:cBhvr>
+                                        <p:cTn id="11" dur="1" fill="hold">
+                                          <p:stCondLst>
+                                            <p:cond delay="0"/>
+                                          </p:stCondLst>
+                                        </p:cTn>
+                                        <p:tgtEl>
+                                          <p:spTgt spid="3">
+                                            <p:txEl>
+                                              <p:pRg st="1" end="1"/>
+                                            </p:txEl>
+                                          </p:spTgt>
+                                        </p:tgtEl>
+                                        <p:attrNameLst>
+                                          <p:attrName>style.visibility</p:attrName>
+                                        </p:attrNameLst>
+                                      </p:cBhvr>
+                                      <p:to>
+                                        <p:strVal val="visible"/>
+                                      </p:to>
+                                    </p:set>
+                                    <p:animEffect transition="in" filter="fade">
+                                      <p:cBhvr>
+                                        <p:cTn id="12" dur="500"/>
+                                        <p:tgtEl>
+                                          <p:spTgt spid="3">
+                                            <p:txEl>
+                                              <p:pRg st="1" end="1"/>
+                                            </p:txEl>
+                                          </p:spTgt>
+                                        </p:tgtEl>
+                                      </p:cBhvr>
+                                    </p:animEffect>
+                                  </p:childTnLst>
+                                </p:cTn>
+                              </p:par>
+                            </p:childTnLst>
+                          </p:cTn>
+                        </p:par>
+                      </p:childTnLst>
+                    </p:cTn>
+                  </p:par>
+                  <p:par>
+                    <p:cTn id="13" fill="hold">
+                      <p:stCondLst>
+                        <p:cond delay="indefinite"/>
+                      </p:stCondLst>
+                      <p:childTnLst>
+                        <p:par>
+                          <p:cTn id="14" fill="hold">
+                            <p:stCondLst>
+                              <p:cond delay="0"/>
+                            </p:stCondLst>
+                            <p:childTnLst>
+                              <p:par>
+                                <p:cTn id="15" presetID="10" presetClass="entr" presetSubtype="0" fill="hold" grpId="0" nodeType="clickEffect">
+                                  <p:stCondLst>
+                                    <p:cond delay="0"/>
+                                  </p:stCondLst>
+                                  <p:childTnLst>
+                                    <p:set>
+                                      <p:cBhvr>
+                                        <p:cTn id="16" dur="1" fill="hold">
+                                          <p:stCondLst>
+                                            <p:cond delay="0"/>
+                                          </p:stCondLst>
+                                        </p:cTn>
+                                        <p:tgtEl>
+                                          <p:spTgt spid="3">
+                                            <p:txEl>
+                                              <p:pRg st="2" end="2"/>
+                                            </p:txEl>
+                                          </p:spTgt>
+                                        </p:tgtEl>
+                                        <p:attrNameLst>
+                                          <p:attrName>style.visibility</p:attrName>
+                                        </p:attrNameLst>
+                                      </p:cBhvr>
+                                      <p:to>
+                                        <p:strVal val="visible"/>
+                                      </p:to>
+                                    </p:set>
+                                    <p:animEffect transition="in" filter="fade">
+                                      <p:cBhvr>
+                                        <p:cTn id="17" dur="500"/>
+                                        <p:tgtEl>
+                                          <p:spTgt spid="3">
+                                            <p:txEl>
+                                              <p:pRg st="2" end="2"/>
+                                            </p:txEl>
+                                          </p:spTgt>
+                                        </p:tgtEl>
+                                      </p:cBhvr>
+                                    </p:animEffect>
+                                  </p:childTnLst>
+                                </p:cTn>
+                              </p:par>
+                            </p:childTnLst>
+                          </p:cTn>
+                        </p:par>
+                      </p:childTnLst>
+                    </p:cTn>
+                  </p:par>
+                </p:childTnLst>
+              </p:cTn>
+              <p:prevCondLst>
+                <p:cond evt="onPrev" delay="0">
+                  <p:tgtEl>
+                    <p:sldTgt/>
+                  </p:tgtEl>
+                </p:cond>
+              </p:prevCondLst>
+              <p:nextCondLst>
+                <p:cond evt="onNext" delay="0">
+                  <p:tgtEl>
+                    <p:sldTgt/>
+                  </p:tgtEl>
+                </p:cond>
+              </p:nextCondLst>
+            </p:seq>
+          </p:childTnLst>
+        </p:cTn>
+      </p:par>
+    </p:tnLst>
+    <p:bldLst>
+      <p:bldP spid="3" grpId="0" build="p"/>
+    </p:bldLst>
+  </p:timing>
+</p:sld>
+</file>
+
+<file path=ppt/slides/slide26.xml><?xml version="1.0" encoding="utf-8"?>
+<p:sld xmlns:a="http://schemas.openxmlformats.org/drawingml/2006/main" xmlns:r="http://schemas.openxmlformats.org/officeDocument/2006/relationships" xmlns:p="http://schemas.openxmlformats.org/presentationml/2006/main">
+  <p:cSld>
+    <p:spTree>
+      <p:nvGrpSpPr>
+        <p:cNvPr id="1" name=""/>
+        <p:cNvGrpSpPr/>
+        <p:nvPr/>
+      </p:nvGrpSpPr>
+      <p:grpSpPr>
+        <a:xfrm>
+          <a:off x="0" y="0"/>
+          <a:ext cx="0" cy="0"/>
+          <a:chOff x="0" y="0"/>
+          <a:chExt cx="0" cy="0"/>
+        </a:xfrm>
+      </p:grpSpPr>
+      <p:sp>
+        <p:nvSpPr>
+          <p:cNvPr id="2" name="Title 1">
+            <a:extLst>
+              <a:ext uri="{FF2B5EF4-FFF2-40B4-BE49-F238E27FC236}">
+                <a16:creationId xmlns:a16="http://schemas.microsoft.com/office/drawing/2014/main" id="{26AFA8D6-8CF9-4D6D-AC30-A5504074897A}"/>
+              </a:ext>
+            </a:extLst>
+          </p:cNvPr>
+          <p:cNvSpPr>
+            <a:spLocks noGrp="1"/>
+          </p:cNvSpPr>
+          <p:nvPr>
+            <p:ph type="title"/>
+          </p:nvPr>
+        </p:nvSpPr>
+        <p:spPr/>
+        <p:txBody>
+          <a:bodyPr/>
+          <a:lstStyle/>
+          <a:p>
+            <a:r>
+              <a:rPr lang="en-US" dirty="0"/>
+              <a:t>Containers and </a:t>
+            </a:r>
+            <a:r>
+              <a:rPr lang="en-US" dirty="0" err="1"/>
+              <a:t>Devops</a:t>
+            </a:r>
+            <a:r>
+              <a:rPr lang="en-US" dirty="0"/>
+              <a:t> / Release Management</a:t>
+            </a:r>
+          </a:p>
+        </p:txBody>
+      </p:sp>
+      <p:sp>
+        <p:nvSpPr>
+          <p:cNvPr id="3" name="Content Placeholder 2">
+            <a:extLst>
+              <a:ext uri="{FF2B5EF4-FFF2-40B4-BE49-F238E27FC236}">
+                <a16:creationId xmlns:a16="http://schemas.microsoft.com/office/drawing/2014/main" id="{51892F45-8456-4EAF-BC73-F78EF9921B1C}"/>
+              </a:ext>
+            </a:extLst>
+          </p:cNvPr>
+          <p:cNvSpPr>
+            <a:spLocks noGrp="1"/>
+          </p:cNvSpPr>
+          <p:nvPr>
+            <p:ph idx="1"/>
+          </p:nvPr>
+        </p:nvSpPr>
+        <p:spPr>
+          <a:xfrm>
+            <a:off x="581192" y="2180496"/>
+            <a:ext cx="11029615" cy="4161938"/>
+          </a:xfrm>
+        </p:spPr>
+        <p:txBody>
+          <a:bodyPr>
+            <a:normAutofit/>
+          </a:bodyPr>
+          <a:lstStyle/>
+          <a:p>
+            <a:r>
+              <a:rPr lang="en-US" dirty="0"/>
+              <a:t>The result of our build goes in a container registry.</a:t>
+            </a:r>
+          </a:p>
+          <a:p>
+            <a:r>
+              <a:rPr lang="en-US" dirty="0"/>
+              <a:t>Deployment is </a:t>
+            </a:r>
+            <a:r>
+              <a:rPr lang="en-US" i="1" dirty="0"/>
+              <a:t>extremely</a:t>
+            </a:r>
+            <a:r>
+              <a:rPr lang="en-US" dirty="0"/>
+              <a:t> fast.</a:t>
+            </a:r>
+          </a:p>
+          <a:p>
+            <a:r>
+              <a:rPr lang="en-US" dirty="0"/>
+              <a:t>Startup is </a:t>
+            </a:r>
+            <a:r>
+              <a:rPr lang="en-US" i="1" dirty="0"/>
+              <a:t>extremely</a:t>
+            </a:r>
+            <a:r>
+              <a:rPr lang="en-US" dirty="0"/>
+              <a:t> fast.</a:t>
+            </a:r>
+          </a:p>
+          <a:p>
+            <a:r>
+              <a:rPr lang="en-US" dirty="0"/>
+              <a:t>The container is 100% consistent in all environments.</a:t>
+            </a:r>
+          </a:p>
+          <a:p>
+            <a:r>
+              <a:rPr lang="en-US" dirty="0"/>
+              <a:t>Only configuration needs to change.</a:t>
+            </a:r>
+          </a:p>
+          <a:p>
+            <a:pPr lvl="1"/>
+            <a:r>
+              <a:rPr lang="en-US" dirty="0"/>
+              <a:t>This is only done when building containers from images.</a:t>
+            </a:r>
+          </a:p>
+          <a:p>
+            <a:r>
+              <a:rPr lang="en-US" dirty="0"/>
+              <a:t>Server density can be extremely high.</a:t>
+            </a:r>
+          </a:p>
+          <a:p>
+            <a:r>
+              <a:rPr lang="en-US" dirty="0"/>
+              <a:t>Reduced cost of hardware and OS licensing</a:t>
+            </a:r>
+          </a:p>
+          <a:p>
+            <a:r>
+              <a:rPr lang="en-US" dirty="0"/>
+              <a:t>Reduced maintenance burden</a:t>
+            </a:r>
+          </a:p>
+          <a:p>
+            <a:r>
+              <a:rPr lang="en-US" dirty="0"/>
+              <a:t>Much more rapid iterations</a:t>
+            </a:r>
+          </a:p>
+        </p:txBody>
+      </p:sp>
+    </p:spTree>
+    <p:extLst>
+      <p:ext uri="{BB962C8B-B14F-4D97-AF65-F5344CB8AC3E}">
+        <p14:creationId xmlns:p14="http://schemas.microsoft.com/office/powerpoint/2010/main" val="2111260394"/>
+      </p:ext>
+    </p:extLst>
+  </p:cSld>
+  <p:clrMapOvr>
+    <a:masterClrMapping/>
+  </p:clrMapOvr>
+  <p:timing>
+    <p:tnLst>
+      <p:par>
+        <p:cTn id="1" dur="indefinite" restart="never" nodeType="tmRoot">
+          <p:childTnLst>
+            <p:seq concurrent="1" nextAc="seek">
+              <p:cTn id="2" dur="indefinite" nodeType="mainSeq">
+                <p:childTnLst>
+                  <p:par>
+                    <p:cTn id="3" fill="hold">
+                      <p:stCondLst>
+                        <p:cond delay="indefinite"/>
+                      </p:stCondLst>
+                      <p:childTnLst>
+                        <p:par>
+                          <p:cTn id="4" fill="hold">
+                            <p:stCondLst>
+                              <p:cond delay="0"/>
+                            </p:stCondLst>
+                            <p:childTnLst>
+                              <p:par>
+                                <p:cTn id="5" presetID="10" presetClass="entr" presetSubtype="0" fill="hold" grpId="0" nodeType="clickEffect">
+                                  <p:stCondLst>
+                                    <p:cond delay="0"/>
+                                  </p:stCondLst>
+                                  <p:childTnLst>
+                                    <p:set>
+                                      <p:cBhvr>
+                                        <p:cTn id="6" dur="1" fill="hold">
+                                          <p:stCondLst>
+                                            <p:cond delay="0"/>
+                                          </p:stCondLst>
+                                        </p:cTn>
+                                        <p:tgtEl>
+                                          <p:spTgt spid="3">
+                                            <p:txEl>
+                                              <p:pRg st="0" end="0"/>
+                                            </p:txEl>
+                                          </p:spTgt>
+                                        </p:tgtEl>
+                                        <p:attrNameLst>
+                                          <p:attrName>style.visibility</p:attrName>
+                                        </p:attrNameLst>
+                                      </p:cBhvr>
+                                      <p:to>
+                                        <p:strVal val="visible"/>
+                                      </p:to>
+                                    </p:set>
+                                    <p:animEffect transition="in" filter="fade">
+                                      <p:cBhvr>
+                                        <p:cTn id="7" dur="500"/>
+                                        <p:tgtEl>
+                                          <p:spTgt spid="3">
+                                            <p:txEl>
+                                              <p:pRg st="0" end="0"/>
+                                            </p:txEl>
+                                          </p:spTgt>
+                                        </p:tgtEl>
+                                      </p:cBhvr>
+                                    </p:animEffect>
+                                  </p:childTnLst>
+                                </p:cTn>
+                              </p:par>
+                            </p:childTnLst>
+                          </p:cTn>
+                        </p:par>
+                      </p:childTnLst>
+                    </p:cTn>
+                  </p:par>
+                  <p:par>
+                    <p:cTn id="8" fill="hold">
+                      <p:stCondLst>
+                        <p:cond delay="indefinite"/>
+                      </p:stCondLst>
+                      <p:childTnLst>
+                        <p:par>
+                          <p:cTn id="9" fill="hold">
+                            <p:stCondLst>
+                              <p:cond delay="0"/>
+                            </p:stCondLst>
+                            <p:childTnLst>
+                              <p:par>
+                                <p:cTn id="10" presetID="10" presetClass="entr" presetSubtype="0" fill="hold" grpId="0" nodeType="clickEffect">
+                                  <p:stCondLst>
+                                    <p:cond delay="0"/>
+                                  </p:stCondLst>
+                                  <p:childTnLst>
+                                    <p:set>
+                                      <p:cBhvr>
+                                        <p:cTn id="11" dur="1" fill="hold">
+                                          <p:stCondLst>
+                                            <p:cond delay="0"/>
+                                          </p:stCondLst>
+                                        </p:cTn>
+                                        <p:tgtEl>
+                                          <p:spTgt spid="3">
+                                            <p:txEl>
+                                              <p:pRg st="1" end="1"/>
+                                            </p:txEl>
+                                          </p:spTgt>
+                                        </p:tgtEl>
+                                        <p:attrNameLst>
+                                          <p:attrName>style.visibility</p:attrName>
+                                        </p:attrNameLst>
+                                      </p:cBhvr>
+                                      <p:to>
+                                        <p:strVal val="visible"/>
+                                      </p:to>
+                                    </p:set>
+                                    <p:animEffect transition="in" filter="fade">
+                                      <p:cBhvr>
+                                        <p:cTn id="12" dur="500"/>
+                                        <p:tgtEl>
+                                          <p:spTgt spid="3">
+                                            <p:txEl>
+                                              <p:pRg st="1" end="1"/>
+                                            </p:txEl>
+                                          </p:spTgt>
+                                        </p:tgtEl>
+                                      </p:cBhvr>
+                                    </p:animEffect>
+                                  </p:childTnLst>
+                                </p:cTn>
+                              </p:par>
+                            </p:childTnLst>
+                          </p:cTn>
+                        </p:par>
+                      </p:childTnLst>
+                    </p:cTn>
+                  </p:par>
+                  <p:par>
+                    <p:cTn id="13" fill="hold">
+                      <p:stCondLst>
+                        <p:cond delay="indefinite"/>
+                      </p:stCondLst>
+                      <p:childTnLst>
+                        <p:par>
+                          <p:cTn id="14" fill="hold">
+                            <p:stCondLst>
+                              <p:cond delay="0"/>
+                            </p:stCondLst>
+                            <p:childTnLst>
+                              <p:par>
+                                <p:cTn id="15" presetID="10" presetClass="entr" presetSubtype="0" fill="hold" grpId="0" nodeType="clickEffect">
+                                  <p:stCondLst>
+                                    <p:cond delay="0"/>
+                                  </p:stCondLst>
+                                  <p:childTnLst>
+                                    <p:set>
+                                      <p:cBhvr>
+                                        <p:cTn id="16" dur="1" fill="hold">
+                                          <p:stCondLst>
+                                            <p:cond delay="0"/>
+                                          </p:stCondLst>
+                                        </p:cTn>
+                                        <p:tgtEl>
+                                          <p:spTgt spid="3">
+                                            <p:txEl>
+                                              <p:pRg st="2" end="2"/>
+                                            </p:txEl>
+                                          </p:spTgt>
+                                        </p:tgtEl>
+                                        <p:attrNameLst>
+                                          <p:attrName>style.visibility</p:attrName>
+                                        </p:attrNameLst>
+                                      </p:cBhvr>
+                                      <p:to>
+                                        <p:strVal val="visible"/>
+                                      </p:to>
+                                    </p:set>
+                                    <p:animEffect transition="in" filter="fade">
+                                      <p:cBhvr>
+                                        <p:cTn id="17" dur="500"/>
+                                        <p:tgtEl>
+                                          <p:spTgt spid="3">
+                                            <p:txEl>
+                                              <p:pRg st="2" end="2"/>
+                                            </p:txEl>
+                                          </p:spTgt>
+                                        </p:tgtEl>
+                                      </p:cBhvr>
+                                    </p:animEffect>
+                                  </p:childTnLst>
+                                </p:cTn>
+                              </p:par>
+                            </p:childTnLst>
+                          </p:cTn>
+                        </p:par>
+                      </p:childTnLst>
+                    </p:cTn>
+                  </p:par>
+                  <p:par>
+                    <p:cTn id="18" fill="hold">
+                      <p:stCondLst>
+                        <p:cond delay="indefinite"/>
+                      </p:stCondLst>
+                      <p:childTnLst>
+                        <p:par>
+                          <p:cTn id="19" fill="hold">
+                            <p:stCondLst>
+                              <p:cond delay="0"/>
+                            </p:stCondLst>
+                            <p:childTnLst>
+                              <p:par>
+                                <p:cTn id="20" presetID="10" presetClass="entr" presetSubtype="0" fill="hold" grpId="0" nodeType="clickEffect">
+                                  <p:stCondLst>
+                                    <p:cond delay="0"/>
+                                  </p:stCondLst>
+                                  <p:childTnLst>
+                                    <p:set>
+                                      <p:cBhvr>
+                                        <p:cTn id="21" dur="1" fill="hold">
+                                          <p:stCondLst>
+                                            <p:cond delay="0"/>
+                                          </p:stCondLst>
+                                        </p:cTn>
+                                        <p:tgtEl>
+                                          <p:spTgt spid="3">
+                                            <p:txEl>
+                                              <p:pRg st="3" end="3"/>
+                                            </p:txEl>
+                                          </p:spTgt>
+                                        </p:tgtEl>
+                                        <p:attrNameLst>
+                                          <p:attrName>style.visibility</p:attrName>
+                                        </p:attrNameLst>
+                                      </p:cBhvr>
+                                      <p:to>
+                                        <p:strVal val="visible"/>
+                                      </p:to>
+                                    </p:set>
+                                    <p:animEffect transition="in" filter="fade">
+                                      <p:cBhvr>
+                                        <p:cTn id="22" dur="500"/>
+                                        <p:tgtEl>
+                                          <p:spTgt spid="3">
+                                            <p:txEl>
+                                              <p:pRg st="3" end="3"/>
+                                            </p:txEl>
+                                          </p:spTgt>
+                                        </p:tgtEl>
+                                      </p:cBhvr>
+                                    </p:animEffect>
+                                  </p:childTnLst>
+                                </p:cTn>
+                              </p:par>
+                            </p:childTnLst>
+                          </p:cTn>
+                        </p:par>
+                      </p:childTnLst>
+                    </p:cTn>
+                  </p:par>
+                  <p:par>
+                    <p:cTn id="23" fill="hold">
+                      <p:stCondLst>
+                        <p:cond delay="indefinite"/>
+                      </p:stCondLst>
+                      <p:childTnLst>
+                        <p:par>
+                          <p:cTn id="24" fill="hold">
+                            <p:stCondLst>
+                              <p:cond delay="0"/>
+                            </p:stCondLst>
+                            <p:childTnLst>
+                              <p:par>
+                                <p:cTn id="25" presetID="10" presetClass="entr" presetSubtype="0" fill="hold" grpId="0" nodeType="clickEffect">
+                                  <p:stCondLst>
+                                    <p:cond delay="0"/>
+                                  </p:stCondLst>
+                                  <p:childTnLst>
+                                    <p:set>
+                                      <p:cBhvr>
+                                        <p:cTn id="26" dur="1" fill="hold">
+                                          <p:stCondLst>
+                                            <p:cond delay="0"/>
+                                          </p:stCondLst>
+                                        </p:cTn>
+                                        <p:tgtEl>
+                                          <p:spTgt spid="3">
+                                            <p:txEl>
+                                              <p:pRg st="4" end="4"/>
+                                            </p:txEl>
+                                          </p:spTgt>
+                                        </p:tgtEl>
+                                        <p:attrNameLst>
+                                          <p:attrName>style.visibility</p:attrName>
+                                        </p:attrNameLst>
+                                      </p:cBhvr>
+                                      <p:to>
+                                        <p:strVal val="visible"/>
+                                      </p:to>
+                                    </p:set>
+                                    <p:animEffect transition="in" filter="fade">
+                                      <p:cBhvr>
+                                        <p:cTn id="27" dur="500"/>
+                                        <p:tgtEl>
+                                          <p:spTgt spid="3">
+                                            <p:txEl>
+                                              <p:pRg st="4" end="4"/>
+                                            </p:txEl>
+                                          </p:spTgt>
+                                        </p:tgtEl>
+                                      </p:cBhvr>
+                                    </p:animEffect>
+                                  </p:childTnLst>
+                                </p:cTn>
+                              </p:par>
+                              <p:par>
+                                <p:cTn id="28" presetID="10" presetClass="entr" presetSubtype="0" fill="hold" grpId="0" nodeType="withEffect">
+                                  <p:stCondLst>
+                                    <p:cond delay="0"/>
+                                  </p:stCondLst>
+                                  <p:childTnLst>
+                                    <p:set>
+                                      <p:cBhvr>
+                                        <p:cTn id="29" dur="1" fill="hold">
+                                          <p:stCondLst>
+                                            <p:cond delay="0"/>
+                                          </p:stCondLst>
+                                        </p:cTn>
+                                        <p:tgtEl>
+                                          <p:spTgt spid="3">
+                                            <p:txEl>
+                                              <p:pRg st="5" end="5"/>
+                                            </p:txEl>
+                                          </p:spTgt>
+                                        </p:tgtEl>
+                                        <p:attrNameLst>
+                                          <p:attrName>style.visibility</p:attrName>
+                                        </p:attrNameLst>
+                                      </p:cBhvr>
+                                      <p:to>
+                                        <p:strVal val="visible"/>
+                                      </p:to>
+                                    </p:set>
+                                    <p:animEffect transition="in" filter="fade">
+                                      <p:cBhvr>
+                                        <p:cTn id="30" dur="500"/>
+                                        <p:tgtEl>
+                                          <p:spTgt spid="3">
+                                            <p:txEl>
+                                              <p:pRg st="5" end="5"/>
+                                            </p:txEl>
+                                          </p:spTgt>
+                                        </p:tgtEl>
+                                      </p:cBhvr>
+                                    </p:animEffect>
+                                  </p:childTnLst>
+                                </p:cTn>
+                              </p:par>
+                            </p:childTnLst>
+                          </p:cTn>
+                        </p:par>
+                      </p:childTnLst>
+                    </p:cTn>
+                  </p:par>
+                  <p:par>
+                    <p:cTn id="31" fill="hold">
+                      <p:stCondLst>
+                        <p:cond delay="indefinite"/>
+                      </p:stCondLst>
+                      <p:childTnLst>
+                        <p:par>
+                          <p:cTn id="32" fill="hold">
+                            <p:stCondLst>
+                              <p:cond delay="0"/>
+                            </p:stCondLst>
+                            <p:childTnLst>
+                              <p:par>
+                                <p:cTn id="33" presetID="10" presetClass="entr" presetSubtype="0" fill="hold" grpId="0" nodeType="clickEffect">
+                                  <p:stCondLst>
+                                    <p:cond delay="0"/>
+                                  </p:stCondLst>
+                                  <p:childTnLst>
+                                    <p:set>
+                                      <p:cBhvr>
+                                        <p:cTn id="34" dur="1" fill="hold">
+                                          <p:stCondLst>
+                                            <p:cond delay="0"/>
+                                          </p:stCondLst>
+                                        </p:cTn>
+                                        <p:tgtEl>
+                                          <p:spTgt spid="3">
+                                            <p:txEl>
+                                              <p:pRg st="6" end="6"/>
+                                            </p:txEl>
+                                          </p:spTgt>
+                                        </p:tgtEl>
+                                        <p:attrNameLst>
+                                          <p:attrName>style.visibility</p:attrName>
+                                        </p:attrNameLst>
+                                      </p:cBhvr>
+                                      <p:to>
+                                        <p:strVal val="visible"/>
+                                      </p:to>
+                                    </p:set>
+                                    <p:animEffect transition="in" filter="fade">
+                                      <p:cBhvr>
+                                        <p:cTn id="35" dur="500"/>
+                                        <p:tgtEl>
+                                          <p:spTgt spid="3">
+                                            <p:txEl>
+                                              <p:pRg st="6" end="6"/>
+                                            </p:txEl>
+                                          </p:spTgt>
+                                        </p:tgtEl>
+                                      </p:cBhvr>
+                                    </p:animEffect>
+                                  </p:childTnLst>
+                                </p:cTn>
+                              </p:par>
+                            </p:childTnLst>
+                          </p:cTn>
+                        </p:par>
+                      </p:childTnLst>
+                    </p:cTn>
+                  </p:par>
+                  <p:par>
+                    <p:cTn id="36" fill="hold">
+                      <p:stCondLst>
+                        <p:cond delay="indefinite"/>
+                      </p:stCondLst>
+                      <p:childTnLst>
+                        <p:par>
+                          <p:cTn id="37" fill="hold">
+                            <p:stCondLst>
+                              <p:cond delay="0"/>
+                            </p:stCondLst>
+                            <p:childTnLst>
+                              <p:par>
+                                <p:cTn id="38" presetID="10" presetClass="entr" presetSubtype="0" fill="hold" grpId="0" nodeType="clickEffect">
+                                  <p:stCondLst>
+                                    <p:cond delay="0"/>
+                                  </p:stCondLst>
+                                  <p:childTnLst>
+                                    <p:set>
+                                      <p:cBhvr>
+                                        <p:cTn id="39" dur="1" fill="hold">
+                                          <p:stCondLst>
+                                            <p:cond delay="0"/>
+                                          </p:stCondLst>
+                                        </p:cTn>
+                                        <p:tgtEl>
+                                          <p:spTgt spid="3">
+                                            <p:txEl>
+                                              <p:pRg st="7" end="7"/>
+                                            </p:txEl>
+                                          </p:spTgt>
+                                        </p:tgtEl>
+                                        <p:attrNameLst>
+                                          <p:attrName>style.visibility</p:attrName>
+                                        </p:attrNameLst>
+                                      </p:cBhvr>
+                                      <p:to>
+                                        <p:strVal val="visible"/>
+                                      </p:to>
+                                    </p:set>
+                                    <p:animEffect transition="in" filter="fade">
+                                      <p:cBhvr>
+                                        <p:cTn id="40" dur="500"/>
+                                        <p:tgtEl>
+                                          <p:spTgt spid="3">
+                                            <p:txEl>
+                                              <p:pRg st="7" end="7"/>
+                                            </p:txEl>
+                                          </p:spTgt>
+                                        </p:tgtEl>
+                                      </p:cBhvr>
+                                    </p:animEffect>
+                                  </p:childTnLst>
+                                </p:cTn>
+                              </p:par>
+                            </p:childTnLst>
+                          </p:cTn>
+                        </p:par>
+                      </p:childTnLst>
+                    </p:cTn>
+                  </p:par>
+                  <p:par>
+                    <p:cTn id="41" fill="hold">
+                      <p:stCondLst>
+                        <p:cond delay="indefinite"/>
+                      </p:stCondLst>
+                      <p:childTnLst>
+                        <p:par>
+                          <p:cTn id="42" fill="hold">
+                            <p:stCondLst>
+                              <p:cond delay="0"/>
+                            </p:stCondLst>
+                            <p:childTnLst>
+                              <p:par>
+                                <p:cTn id="43" presetID="10" presetClass="entr" presetSubtype="0" fill="hold" grpId="0" nodeType="clickEffect">
+                                  <p:stCondLst>
+                                    <p:cond delay="0"/>
+                                  </p:stCondLst>
+                                  <p:childTnLst>
+                                    <p:set>
+                                      <p:cBhvr>
+                                        <p:cTn id="44" dur="1" fill="hold">
+                                          <p:stCondLst>
+                                            <p:cond delay="0"/>
+                                          </p:stCondLst>
+                                        </p:cTn>
+                                        <p:tgtEl>
+                                          <p:spTgt spid="3">
+                                            <p:txEl>
+                                              <p:pRg st="8" end="8"/>
+                                            </p:txEl>
+                                          </p:spTgt>
+                                        </p:tgtEl>
+                                        <p:attrNameLst>
+                                          <p:attrName>style.visibility</p:attrName>
+                                        </p:attrNameLst>
+                                      </p:cBhvr>
+                                      <p:to>
+                                        <p:strVal val="visible"/>
+                                      </p:to>
+                                    </p:set>
+                                    <p:animEffect transition="in" filter="fade">
+                                      <p:cBhvr>
+                                        <p:cTn id="45" dur="500"/>
+                                        <p:tgtEl>
+                                          <p:spTgt spid="3">
+                                            <p:txEl>
+                                              <p:pRg st="8" end="8"/>
+                                            </p:txEl>
+                                          </p:spTgt>
+                                        </p:tgtEl>
+                                      </p:cBhvr>
+                                    </p:animEffect>
+                                  </p:childTnLst>
+                                </p:cTn>
+                              </p:par>
+                            </p:childTnLst>
+                          </p:cTn>
+                        </p:par>
+                      </p:childTnLst>
+                    </p:cTn>
+                  </p:par>
+                  <p:par>
+                    <p:cTn id="46" fill="hold">
+                      <p:stCondLst>
+                        <p:cond delay="indefinite"/>
+                      </p:stCondLst>
+                      <p:childTnLst>
+                        <p:par>
+                          <p:cTn id="47" fill="hold">
+                            <p:stCondLst>
+                              <p:cond delay="0"/>
+                            </p:stCondLst>
+                            <p:childTnLst>
+                              <p:par>
+                                <p:cTn id="48" presetID="10" presetClass="entr" presetSubtype="0" fill="hold" grpId="0" nodeType="clickEffect">
+                                  <p:stCondLst>
+                                    <p:cond delay="0"/>
+                                  </p:stCondLst>
+                                  <p:childTnLst>
+                                    <p:set>
+                                      <p:cBhvr>
+                                        <p:cTn id="49" dur="1" fill="hold">
+                                          <p:stCondLst>
+                                            <p:cond delay="0"/>
+                                          </p:stCondLst>
+                                        </p:cTn>
+                                        <p:tgtEl>
+                                          <p:spTgt spid="3">
+                                            <p:txEl>
+                                              <p:pRg st="9" end="9"/>
+                                            </p:txEl>
+                                          </p:spTgt>
+                                        </p:tgtEl>
+                                        <p:attrNameLst>
+                                          <p:attrName>style.visibility</p:attrName>
+                                        </p:attrNameLst>
+                                      </p:cBhvr>
+                                      <p:to>
+                                        <p:strVal val="visible"/>
+                                      </p:to>
+                                    </p:set>
+                                    <p:animEffect transition="in" filter="fade">
+                                      <p:cBhvr>
+                                        <p:cTn id="50" dur="500"/>
+                                        <p:tgtEl>
+                                          <p:spTgt spid="3">
+                                            <p:txEl>
+                                              <p:pRg st="9" end="9"/>
+                                            </p:txEl>
+                                          </p:spTgt>
+                                        </p:tgtEl>
+                                      </p:cBhvr>
+                                    </p:animEffect>
+                                  </p:childTnLst>
+                                </p:cTn>
+                              </p:par>
+                            </p:childTnLst>
+                          </p:cTn>
+                        </p:par>
+                      </p:childTnLst>
+                    </p:cTn>
+                  </p:par>
+                </p:childTnLst>
+              </p:cTn>
+              <p:prevCondLst>
+                <p:cond evt="onPrev" delay="0">
+                  <p:tgtEl>
+                    <p:sldTgt/>
+                  </p:tgtEl>
+                </p:cond>
+              </p:prevCondLst>
+              <p:nextCondLst>
+                <p:cond evt="onNext" delay="0">
+                  <p:tgtEl>
+                    <p:sldTgt/>
+                  </p:tgtEl>
+                </p:cond>
+              </p:nextCondLst>
+            </p:seq>
+          </p:childTnLst>
+        </p:cTn>
+      </p:par>
+    </p:tnLst>
+    <p:bldLst>
+      <p:bldP spid="3" grpId="0" build="p"/>
+    </p:bldLst>
+  </p:timing>
+</p:sld>
+</file>
+
+<file path=ppt/slides/slide27.xml><?xml version="1.0" encoding="utf-8"?>
+<p:sld xmlns:a="http://schemas.openxmlformats.org/drawingml/2006/main" xmlns:r="http://schemas.openxmlformats.org/officeDocument/2006/relationships" xmlns:p="http://schemas.openxmlformats.org/presentationml/2006/main">
+  <p:cSld>
+    <p:spTree>
+      <p:nvGrpSpPr>
+        <p:cNvPr id="1" name=""/>
+        <p:cNvGrpSpPr/>
+        <p:nvPr/>
+      </p:nvGrpSpPr>
+      <p:grpSpPr>
+        <a:xfrm>
+          <a:off x="0" y="0"/>
+          <a:ext cx="0" cy="0"/>
+          <a:chOff x="0" y="0"/>
+          <a:chExt cx="0" cy="0"/>
+        </a:xfrm>
+      </p:grpSpPr>
+      <p:sp>
+        <p:nvSpPr>
+          <p:cNvPr id="2" name="Title 1">
+            <a:extLst>
+              <a:ext uri="{FF2B5EF4-FFF2-40B4-BE49-F238E27FC236}">
+                <a16:creationId xmlns:a16="http://schemas.microsoft.com/office/drawing/2014/main" id="{26AFA8D6-8CF9-4D6D-AC30-A5504074897A}"/>
+              </a:ext>
+            </a:extLst>
+          </p:cNvPr>
+          <p:cNvSpPr>
+            <a:spLocks noGrp="1"/>
+          </p:cNvSpPr>
+          <p:nvPr>
+            <p:ph type="title"/>
+          </p:nvPr>
+        </p:nvSpPr>
+        <p:spPr/>
+        <p:txBody>
+          <a:bodyPr/>
+          <a:lstStyle/>
+          <a:p>
+            <a:r>
+              <a:rPr lang="en-US" dirty="0"/>
+              <a:t>Containers and Operations</a:t>
+            </a:r>
+          </a:p>
+        </p:txBody>
+      </p:sp>
+      <p:sp>
+        <p:nvSpPr>
+          <p:cNvPr id="3" name="Content Placeholder 2">
+            <a:extLst>
+              <a:ext uri="{FF2B5EF4-FFF2-40B4-BE49-F238E27FC236}">
+                <a16:creationId xmlns:a16="http://schemas.microsoft.com/office/drawing/2014/main" id="{51892F45-8456-4EAF-BC73-F78EF9921B1C}"/>
+              </a:ext>
+            </a:extLst>
+          </p:cNvPr>
+          <p:cNvSpPr>
+            <a:spLocks noGrp="1"/>
+          </p:cNvSpPr>
+          <p:nvPr>
+            <p:ph idx="1"/>
+          </p:nvPr>
+        </p:nvSpPr>
+        <p:spPr>
+          <a:xfrm>
+            <a:off x="581192" y="2180496"/>
+            <a:ext cx="11029615" cy="4161938"/>
+          </a:xfrm>
+        </p:spPr>
+        <p:txBody>
+          <a:bodyPr>
+            <a:normAutofit/>
+          </a:bodyPr>
+          <a:lstStyle/>
+          <a:p>
+            <a:r>
+              <a:rPr lang="en-US" dirty="0"/>
+              <a:t>Reduced infrastructure cost</a:t>
+            </a:r>
+          </a:p>
+          <a:p>
+            <a:r>
+              <a:rPr lang="en-US" dirty="0"/>
+              <a:t>Tight control of container images</a:t>
+            </a:r>
+          </a:p>
+          <a:p>
+            <a:r>
+              <a:rPr lang="en-US" dirty="0"/>
+              <a:t>Security auditing</a:t>
+            </a:r>
+          </a:p>
+          <a:p>
+            <a:r>
+              <a:rPr lang="en-US" dirty="0"/>
+              <a:t>Required certification of applications</a:t>
+            </a:r>
+          </a:p>
+          <a:p>
+            <a:r>
+              <a:rPr lang="en-US" dirty="0"/>
+              <a:t>Excellent tools for automatic scaling</a:t>
+            </a:r>
+          </a:p>
+          <a:p>
+            <a:r>
+              <a:rPr lang="en-US" dirty="0"/>
+              <a:t>Reduced maintenance burden</a:t>
+            </a:r>
+          </a:p>
+          <a:p>
+            <a:endParaRPr lang="en-US" dirty="0"/>
+          </a:p>
+        </p:txBody>
+      </p:sp>
+    </p:spTree>
+    <p:extLst>
+      <p:ext uri="{BB962C8B-B14F-4D97-AF65-F5344CB8AC3E}">
+        <p14:creationId xmlns:p14="http://schemas.microsoft.com/office/powerpoint/2010/main" val="3648727292"/>
+      </p:ext>
+    </p:extLst>
+  </p:cSld>
+  <p:clrMapOvr>
+    <a:masterClrMapping/>
+  </p:clrMapOvr>
+  <p:timing>
+    <p:tnLst>
+      <p:par>
+        <p:cTn id="1" dur="indefinite" restart="never" nodeType="tmRoot">
+          <p:childTnLst>
+            <p:seq concurrent="1" nextAc="seek">
+              <p:cTn id="2" dur="indefinite" nodeType="mainSeq">
+                <p:childTnLst>
+                  <p:par>
+                    <p:cTn id="3" fill="hold">
+                      <p:stCondLst>
+                        <p:cond delay="indefinite"/>
+                      </p:stCondLst>
+                      <p:childTnLst>
+                        <p:par>
+                          <p:cTn id="4" fill="hold">
+                            <p:stCondLst>
+                              <p:cond delay="0"/>
+                            </p:stCondLst>
+                            <p:childTnLst>
+                              <p:par>
+                                <p:cTn id="5" presetID="10" presetClass="entr" presetSubtype="0" fill="hold" grpId="0" nodeType="clickEffect">
+                                  <p:stCondLst>
+                                    <p:cond delay="0"/>
+                                  </p:stCondLst>
+                                  <p:childTnLst>
+                                    <p:set>
+                                      <p:cBhvr>
+                                        <p:cTn id="6" dur="1" fill="hold">
+                                          <p:stCondLst>
+                                            <p:cond delay="0"/>
+                                          </p:stCondLst>
+                                        </p:cTn>
+                                        <p:tgtEl>
+                                          <p:spTgt spid="3">
+                                            <p:txEl>
+                                              <p:pRg st="0" end="0"/>
+                                            </p:txEl>
+                                          </p:spTgt>
+                                        </p:tgtEl>
+                                        <p:attrNameLst>
+                                          <p:attrName>style.visibility</p:attrName>
+                                        </p:attrNameLst>
+                                      </p:cBhvr>
+                                      <p:to>
+                                        <p:strVal val="visible"/>
+                                      </p:to>
+                                    </p:set>
+                                    <p:animEffect transition="in" filter="fade">
+                                      <p:cBhvr>
+                                        <p:cTn id="7" dur="500"/>
+                                        <p:tgtEl>
+                                          <p:spTgt spid="3">
+                                            <p:txEl>
+                                              <p:pRg st="0" end="0"/>
+                                            </p:txEl>
+                                          </p:spTgt>
+                                        </p:tgtEl>
+                                      </p:cBhvr>
+                                    </p:animEffect>
+                                  </p:childTnLst>
+                                </p:cTn>
+                              </p:par>
+                            </p:childTnLst>
+                          </p:cTn>
+                        </p:par>
+                      </p:childTnLst>
+                    </p:cTn>
+                  </p:par>
+                  <p:par>
+                    <p:cTn id="8" fill="hold">
+                      <p:stCondLst>
+                        <p:cond delay="indefinite"/>
+                      </p:stCondLst>
+                      <p:childTnLst>
+                        <p:par>
+                          <p:cTn id="9" fill="hold">
+                            <p:stCondLst>
+                              <p:cond delay="0"/>
+                            </p:stCondLst>
+                            <p:childTnLst>
+                              <p:par>
+                                <p:cTn id="10" presetID="10" presetClass="entr" presetSubtype="0" fill="hold" grpId="0" nodeType="clickEffect">
+                                  <p:stCondLst>
+                                    <p:cond delay="0"/>
+                                  </p:stCondLst>
+                                  <p:childTnLst>
+                                    <p:set>
+                                      <p:cBhvr>
+                                        <p:cTn id="11" dur="1" fill="hold">
+                                          <p:stCondLst>
+                                            <p:cond delay="0"/>
+                                          </p:stCondLst>
+                                        </p:cTn>
+                                        <p:tgtEl>
+                                          <p:spTgt spid="3">
+                                            <p:txEl>
+                                              <p:pRg st="1" end="1"/>
+                                            </p:txEl>
+                                          </p:spTgt>
+                                        </p:tgtEl>
+                                        <p:attrNameLst>
+                                          <p:attrName>style.visibility</p:attrName>
+                                        </p:attrNameLst>
+                                      </p:cBhvr>
+                                      <p:to>
+                                        <p:strVal val="visible"/>
+                                      </p:to>
+                                    </p:set>
+                                    <p:animEffect transition="in" filter="fade">
+                                      <p:cBhvr>
+                                        <p:cTn id="12" dur="500"/>
+                                        <p:tgtEl>
+                                          <p:spTgt spid="3">
+                                            <p:txEl>
+                                              <p:pRg st="1" end="1"/>
+                                            </p:txEl>
+                                          </p:spTgt>
+                                        </p:tgtEl>
+                                      </p:cBhvr>
+                                    </p:animEffect>
+                                  </p:childTnLst>
+                                </p:cTn>
+                              </p:par>
+                            </p:childTnLst>
+                          </p:cTn>
+                        </p:par>
+                      </p:childTnLst>
+                    </p:cTn>
+                  </p:par>
+                  <p:par>
+                    <p:cTn id="13" fill="hold">
+                      <p:stCondLst>
+                        <p:cond delay="indefinite"/>
+                      </p:stCondLst>
+                      <p:childTnLst>
+                        <p:par>
+                          <p:cTn id="14" fill="hold">
+                            <p:stCondLst>
+                              <p:cond delay="0"/>
+                            </p:stCondLst>
+                            <p:childTnLst>
+                              <p:par>
+                                <p:cTn id="15" presetID="10" presetClass="entr" presetSubtype="0" fill="hold" grpId="0" nodeType="clickEffect">
+                                  <p:stCondLst>
+                                    <p:cond delay="0"/>
+                                  </p:stCondLst>
+                                  <p:childTnLst>
+                                    <p:set>
+                                      <p:cBhvr>
+                                        <p:cTn id="16" dur="1" fill="hold">
+                                          <p:stCondLst>
+                                            <p:cond delay="0"/>
+                                          </p:stCondLst>
+                                        </p:cTn>
+                                        <p:tgtEl>
+                                          <p:spTgt spid="3">
+                                            <p:txEl>
+                                              <p:pRg st="2" end="2"/>
+                                            </p:txEl>
+                                          </p:spTgt>
+                                        </p:tgtEl>
+                                        <p:attrNameLst>
+                                          <p:attrName>style.visibility</p:attrName>
+                                        </p:attrNameLst>
+                                      </p:cBhvr>
+                                      <p:to>
+                                        <p:strVal val="visible"/>
+                                      </p:to>
+                                    </p:set>
+                                    <p:animEffect transition="in" filter="fade">
+                                      <p:cBhvr>
+                                        <p:cTn id="17" dur="500"/>
+                                        <p:tgtEl>
+                                          <p:spTgt spid="3">
+                                            <p:txEl>
+                                              <p:pRg st="2" end="2"/>
+                                            </p:txEl>
+                                          </p:spTgt>
+                                        </p:tgtEl>
+                                      </p:cBhvr>
+                                    </p:animEffect>
+                                  </p:childTnLst>
+                                </p:cTn>
+                              </p:par>
+                            </p:childTnLst>
+                          </p:cTn>
+                        </p:par>
+                      </p:childTnLst>
+                    </p:cTn>
+                  </p:par>
+                  <p:par>
+                    <p:cTn id="18" fill="hold">
+                      <p:stCondLst>
+                        <p:cond delay="indefinite"/>
+                      </p:stCondLst>
+                      <p:childTnLst>
+                        <p:par>
+                          <p:cTn id="19" fill="hold">
+                            <p:stCondLst>
+                              <p:cond delay="0"/>
+                            </p:stCondLst>
+                            <p:childTnLst>
+                              <p:par>
+                                <p:cTn id="20" presetID="10" presetClass="entr" presetSubtype="0" fill="hold" grpId="0" nodeType="clickEffect">
+                                  <p:stCondLst>
+                                    <p:cond delay="0"/>
+                                  </p:stCondLst>
+                                  <p:childTnLst>
+                                    <p:set>
+                                      <p:cBhvr>
+                                        <p:cTn id="21" dur="1" fill="hold">
+                                          <p:stCondLst>
+                                            <p:cond delay="0"/>
+                                          </p:stCondLst>
+                                        </p:cTn>
+                                        <p:tgtEl>
+                                          <p:spTgt spid="3">
+                                            <p:txEl>
+                                              <p:pRg st="3" end="3"/>
+                                            </p:txEl>
+                                          </p:spTgt>
+                                        </p:tgtEl>
+                                        <p:attrNameLst>
+                                          <p:attrName>style.visibility</p:attrName>
+                                        </p:attrNameLst>
+                                      </p:cBhvr>
+                                      <p:to>
+                                        <p:strVal val="visible"/>
+                                      </p:to>
+                                    </p:set>
+                                    <p:animEffect transition="in" filter="fade">
+                                      <p:cBhvr>
+                                        <p:cTn id="22" dur="500"/>
+                                        <p:tgtEl>
+                                          <p:spTgt spid="3">
+                                            <p:txEl>
+                                              <p:pRg st="3" end="3"/>
+                                            </p:txEl>
+                                          </p:spTgt>
+                                        </p:tgtEl>
+                                      </p:cBhvr>
+                                    </p:animEffect>
+                                  </p:childTnLst>
+                                </p:cTn>
+                              </p:par>
+                            </p:childTnLst>
+                          </p:cTn>
+                        </p:par>
+                      </p:childTnLst>
+                    </p:cTn>
+                  </p:par>
+                  <p:par>
+                    <p:cTn id="23" fill="hold">
+                      <p:stCondLst>
+                        <p:cond delay="indefinite"/>
+                      </p:stCondLst>
+                      <p:childTnLst>
+                        <p:par>
+                          <p:cTn id="24" fill="hold">
+                            <p:stCondLst>
+                              <p:cond delay="0"/>
+                            </p:stCondLst>
+                            <p:childTnLst>
+                              <p:par>
+                                <p:cTn id="25" presetID="10" presetClass="entr" presetSubtype="0" fill="hold" grpId="0" nodeType="clickEffect">
+                                  <p:stCondLst>
+                                    <p:cond delay="0"/>
+                                  </p:stCondLst>
+                                  <p:childTnLst>
+                                    <p:set>
+                                      <p:cBhvr>
+                                        <p:cTn id="26" dur="1" fill="hold">
+                                          <p:stCondLst>
+                                            <p:cond delay="0"/>
+                                          </p:stCondLst>
+                                        </p:cTn>
+                                        <p:tgtEl>
+                                          <p:spTgt spid="3">
+                                            <p:txEl>
+                                              <p:pRg st="4" end="4"/>
+                                            </p:txEl>
+                                          </p:spTgt>
+                                        </p:tgtEl>
+                                        <p:attrNameLst>
+                                          <p:attrName>style.visibility</p:attrName>
+                                        </p:attrNameLst>
+                                      </p:cBhvr>
+                                      <p:to>
+                                        <p:strVal val="visible"/>
+                                      </p:to>
+                                    </p:set>
+                                    <p:animEffect transition="in" filter="fade">
+                                      <p:cBhvr>
+                                        <p:cTn id="27" dur="500"/>
+                                        <p:tgtEl>
+                                          <p:spTgt spid="3">
+                                            <p:txEl>
+                                              <p:pRg st="4" end="4"/>
+                                            </p:txEl>
+                                          </p:spTgt>
+                                        </p:tgtEl>
+                                      </p:cBhvr>
+                                    </p:animEffect>
+                                  </p:childTnLst>
+                                </p:cTn>
+                              </p:par>
+                            </p:childTnLst>
+                          </p:cTn>
+                        </p:par>
+                      </p:childTnLst>
+                    </p:cTn>
+                  </p:par>
+                  <p:par>
+                    <p:cTn id="28" fill="hold">
+                      <p:stCondLst>
+                        <p:cond delay="indefinite"/>
+                      </p:stCondLst>
+                      <p:childTnLst>
+                        <p:par>
+                          <p:cTn id="29" fill="hold">
+                            <p:stCondLst>
+                              <p:cond delay="0"/>
+                            </p:stCondLst>
+                            <p:childTnLst>
+                              <p:par>
+                                <p:cTn id="30" presetID="10" presetClass="entr" presetSubtype="0" fill="hold" grpId="0" nodeType="clickEffect">
+                                  <p:stCondLst>
+                                    <p:cond delay="0"/>
+                                  </p:stCondLst>
+                                  <p:childTnLst>
+                                    <p:set>
+                                      <p:cBhvr>
+                                        <p:cTn id="31" dur="1" fill="hold">
+                                          <p:stCondLst>
+                                            <p:cond delay="0"/>
+                                          </p:stCondLst>
+                                        </p:cTn>
+                                        <p:tgtEl>
+                                          <p:spTgt spid="3">
+                                            <p:txEl>
+                                              <p:pRg st="5" end="5"/>
+                                            </p:txEl>
+                                          </p:spTgt>
+                                        </p:tgtEl>
+                                        <p:attrNameLst>
+                                          <p:attrName>style.visibility</p:attrName>
+                                        </p:attrNameLst>
+                                      </p:cBhvr>
+                                      <p:to>
+                                        <p:strVal val="visible"/>
+                                      </p:to>
+                                    </p:set>
+                                    <p:animEffect transition="in" filter="fade">
+                                      <p:cBhvr>
+                                        <p:cTn id="32" dur="500"/>
+                                        <p:tgtEl>
+                                          <p:spTgt spid="3">
+                                            <p:txEl>
+                                              <p:pRg st="5" end="5"/>
+                                            </p:txEl>
+                                          </p:spTgt>
+                                        </p:tgtEl>
+                                      </p:cBhvr>
+                                    </p:animEffect>
+                                  </p:childTnLst>
+                                </p:cTn>
+                              </p:par>
+                            </p:childTnLst>
+                          </p:cTn>
+                        </p:par>
+                      </p:childTnLst>
+                    </p:cTn>
+                  </p:par>
+                </p:childTnLst>
+              </p:cTn>
+              <p:prevCondLst>
+                <p:cond evt="onPrev" delay="0">
+                  <p:tgtEl>
+                    <p:sldTgt/>
+                  </p:tgtEl>
+                </p:cond>
+              </p:prevCondLst>
+              <p:nextCondLst>
+                <p:cond evt="onNext" delay="0">
+                  <p:tgtEl>
+                    <p:sldTgt/>
+                  </p:tgtEl>
+                </p:cond>
+              </p:nextCondLst>
+            </p:seq>
+          </p:childTnLst>
+        </p:cTn>
+      </p:par>
+    </p:tnLst>
+    <p:bldLst>
+      <p:bldP spid="3" grpId="0" build="p"/>
+    </p:bldLst>
+  </p:timing>
+</p:sld>
+</file>
+
 <file path=ppt/slides/slide3.xml><?xml version="1.0" encoding="utf-8"?>
 <p:sld xmlns:a="http://schemas.openxmlformats.org/drawingml/2006/main" xmlns:r="http://schemas.openxmlformats.org/officeDocument/2006/relationships" xmlns:p="http://schemas.openxmlformats.org/presentationml/2006/main">
   <p:cSld>

</xml_diff>

<commit_message>
Finished the 'concerns' section.
</commit_message>
<xml_diff>
--- a/presentation/presentation.pptx
+++ b/presentation/presentation.pptx
@@ -5,7 +5,7 @@
     <p:sldMasterId id="2147483648" r:id="rId1"/>
   </p:sldMasterIdLst>
   <p:notesMasterIdLst>
-    <p:notesMasterId r:id="rId29"/>
+    <p:notesMasterId r:id="rId31"/>
   </p:notesMasterIdLst>
   <p:sldIdLst>
     <p:sldId id="258" r:id="rId2"/>
@@ -35,6 +35,8 @@
     <p:sldId id="287" r:id="rId26"/>
     <p:sldId id="286" r:id="rId27"/>
     <p:sldId id="288" r:id="rId28"/>
+    <p:sldId id="289" r:id="rId29"/>
+    <p:sldId id="290" r:id="rId30"/>
   </p:sldIdLst>
   <p:sldSz cx="12192000" cy="6858000"/>
   <p:notesSz cx="6858000" cy="9144000"/>
@@ -188,7 +190,10 @@
           </p14:sldIdLst>
         </p14:section>
         <p14:section name="A Look at Some Concerns" id="{BBBC4B94-5C39-44E3-86B7-9871E92F1E29}">
-          <p14:sldIdLst/>
+          <p14:sldIdLst>
+            <p14:sldId id="289"/>
+            <p14:sldId id="290"/>
+          </p14:sldIdLst>
         </p14:section>
         <p14:section name="A List of Solution Partners" id="{ABD582D2-A447-4F3C-85E6-E482AC8E3D64}">
           <p14:sldIdLst/>
@@ -23567,6 +23572,754 @@
 </p:sld>
 </file>
 
+<file path=ppt/slides/slide28.xml><?xml version="1.0" encoding="utf-8"?>
+<p:sld xmlns:a="http://schemas.openxmlformats.org/drawingml/2006/main" xmlns:r="http://schemas.openxmlformats.org/officeDocument/2006/relationships" xmlns:p="http://schemas.openxmlformats.org/presentationml/2006/main">
+  <p:cSld>
+    <p:spTree>
+      <p:nvGrpSpPr>
+        <p:cNvPr id="1" name=""/>
+        <p:cNvGrpSpPr/>
+        <p:nvPr/>
+      </p:nvGrpSpPr>
+      <p:grpSpPr>
+        <a:xfrm>
+          <a:off x="0" y="0"/>
+          <a:ext cx="0" cy="0"/>
+          <a:chOff x="0" y="0"/>
+          <a:chExt cx="0" cy="0"/>
+        </a:xfrm>
+      </p:grpSpPr>
+      <p:sp>
+        <p:nvSpPr>
+          <p:cNvPr id="2" name="Title 1">
+            <a:extLst>
+              <a:ext uri="{FF2B5EF4-FFF2-40B4-BE49-F238E27FC236}">
+                <a16:creationId xmlns:a16="http://schemas.microsoft.com/office/drawing/2014/main" id="{8B4E1453-231D-4FBF-AD51-B3D5F8B64C1B}"/>
+              </a:ext>
+            </a:extLst>
+          </p:cNvPr>
+          <p:cNvSpPr>
+            <a:spLocks noGrp="1"/>
+          </p:cNvSpPr>
+          <p:nvPr>
+            <p:ph type="title"/>
+          </p:nvPr>
+        </p:nvSpPr>
+        <p:spPr/>
+        <p:txBody>
+          <a:bodyPr/>
+          <a:lstStyle/>
+          <a:p>
+            <a:r>
+              <a:rPr lang="en-US" dirty="0"/>
+              <a:t>A Hard Look at Some Concerns</a:t>
+            </a:r>
+          </a:p>
+        </p:txBody>
+      </p:sp>
+      <p:sp>
+        <p:nvSpPr>
+          <p:cNvPr id="3" name="Text Placeholder 2">
+            <a:extLst>
+              <a:ext uri="{FF2B5EF4-FFF2-40B4-BE49-F238E27FC236}">
+                <a16:creationId xmlns:a16="http://schemas.microsoft.com/office/drawing/2014/main" id="{F5C95B7B-725A-4963-A223-054C65D79505}"/>
+              </a:ext>
+            </a:extLst>
+          </p:cNvPr>
+          <p:cNvSpPr>
+            <a:spLocks noGrp="1"/>
+          </p:cNvSpPr>
+          <p:nvPr>
+            <p:ph type="body" idx="1"/>
+          </p:nvPr>
+        </p:nvSpPr>
+        <p:spPr/>
+        <p:txBody>
+          <a:bodyPr/>
+          <a:lstStyle/>
+          <a:p>
+            <a:r>
+              <a:rPr lang="en-US" dirty="0"/>
+              <a:t>Where I Tell You To BE Cautious</a:t>
+            </a:r>
+          </a:p>
+        </p:txBody>
+      </p:sp>
+    </p:spTree>
+    <p:extLst>
+      <p:ext uri="{BB962C8B-B14F-4D97-AF65-F5344CB8AC3E}">
+        <p14:creationId xmlns:p14="http://schemas.microsoft.com/office/powerpoint/2010/main" val="1189758927"/>
+      </p:ext>
+    </p:extLst>
+  </p:cSld>
+  <p:clrMapOvr>
+    <a:masterClrMapping/>
+  </p:clrMapOvr>
+</p:sld>
+</file>
+
+<file path=ppt/slides/slide29.xml><?xml version="1.0" encoding="utf-8"?>
+<p:sld xmlns:a="http://schemas.openxmlformats.org/drawingml/2006/main" xmlns:r="http://schemas.openxmlformats.org/officeDocument/2006/relationships" xmlns:p="http://schemas.openxmlformats.org/presentationml/2006/main">
+  <p:cSld>
+    <p:spTree>
+      <p:nvGrpSpPr>
+        <p:cNvPr id="1" name=""/>
+        <p:cNvGrpSpPr/>
+        <p:nvPr/>
+      </p:nvGrpSpPr>
+      <p:grpSpPr>
+        <a:xfrm>
+          <a:off x="0" y="0"/>
+          <a:ext cx="0" cy="0"/>
+          <a:chOff x="0" y="0"/>
+          <a:chExt cx="0" cy="0"/>
+        </a:xfrm>
+      </p:grpSpPr>
+      <p:sp>
+        <p:nvSpPr>
+          <p:cNvPr id="2" name="Title 1">
+            <a:extLst>
+              <a:ext uri="{FF2B5EF4-FFF2-40B4-BE49-F238E27FC236}">
+                <a16:creationId xmlns:a16="http://schemas.microsoft.com/office/drawing/2014/main" id="{840A6550-AAA2-4E9F-B7E1-52D2806EFB50}"/>
+              </a:ext>
+            </a:extLst>
+          </p:cNvPr>
+          <p:cNvSpPr>
+            <a:spLocks noGrp="1"/>
+          </p:cNvSpPr>
+          <p:nvPr>
+            <p:ph type="title"/>
+          </p:nvPr>
+        </p:nvSpPr>
+        <p:spPr/>
+        <p:txBody>
+          <a:bodyPr/>
+          <a:lstStyle/>
+          <a:p>
+            <a:r>
+              <a:rPr lang="en-US" dirty="0"/>
+              <a:t>You Have An Awesome Staff!</a:t>
+            </a:r>
+          </a:p>
+        </p:txBody>
+      </p:sp>
+      <p:sp>
+        <p:nvSpPr>
+          <p:cNvPr id="3" name="Content Placeholder 2">
+            <a:extLst>
+              <a:ext uri="{FF2B5EF4-FFF2-40B4-BE49-F238E27FC236}">
+                <a16:creationId xmlns:a16="http://schemas.microsoft.com/office/drawing/2014/main" id="{978858B4-E6A6-46D8-883B-CE5DBAA7F72A}"/>
+              </a:ext>
+            </a:extLst>
+          </p:cNvPr>
+          <p:cNvSpPr>
+            <a:spLocks noGrp="1"/>
+          </p:cNvSpPr>
+          <p:nvPr>
+            <p:ph idx="1"/>
+          </p:nvPr>
+        </p:nvSpPr>
+        <p:spPr/>
+        <p:txBody>
+          <a:bodyPr>
+            <a:normAutofit/>
+          </a:bodyPr>
+          <a:lstStyle/>
+          <a:p>
+            <a:r>
+              <a:rPr lang="en-US" dirty="0"/>
+              <a:t>I wanted to do a proof of concept for the developer story with docker…</a:t>
+            </a:r>
+          </a:p>
+          <a:p>
+            <a:r>
+              <a:rPr lang="en-US" dirty="0"/>
+              <a:t>These guys already know how to handle:</a:t>
+            </a:r>
+          </a:p>
+          <a:p>
+            <a:pPr lvl="1"/>
+            <a:r>
+              <a:rPr lang="en-US" dirty="0"/>
+              <a:t>Application monitoring</a:t>
+            </a:r>
+          </a:p>
+          <a:p>
+            <a:pPr lvl="1"/>
+            <a:r>
+              <a:rPr lang="en-US" dirty="0"/>
+              <a:t>Application isolation</a:t>
+            </a:r>
+          </a:p>
+          <a:p>
+            <a:pPr lvl="1"/>
+            <a:r>
+              <a:rPr lang="en-US" dirty="0"/>
+              <a:t>License auditing and control</a:t>
+            </a:r>
+          </a:p>
+          <a:p>
+            <a:pPr lvl="1"/>
+            <a:r>
+              <a:rPr lang="en-US" dirty="0"/>
+              <a:t>Patching and scheduling patches</a:t>
+            </a:r>
+          </a:p>
+          <a:p>
+            <a:pPr lvl="1"/>
+            <a:r>
+              <a:rPr lang="en-US" dirty="0"/>
+              <a:t>Disaster recovery</a:t>
+            </a:r>
+          </a:p>
+          <a:p>
+            <a:pPr lvl="1"/>
+            <a:r>
+              <a:rPr lang="en-US" dirty="0"/>
+              <a:t>Resource allocation</a:t>
+            </a:r>
+          </a:p>
+          <a:p>
+            <a:pPr lvl="1"/>
+            <a:r>
+              <a:rPr lang="en-US" dirty="0" err="1"/>
+              <a:t>Etc</a:t>
+            </a:r>
+            <a:r>
+              <a:rPr lang="en-US"/>
+              <a:t>…</a:t>
+            </a:r>
+            <a:endParaRPr lang="en-US" dirty="0"/>
+          </a:p>
+          <a:p>
+            <a:pPr lvl="1"/>
+            <a:endParaRPr lang="en-US" dirty="0"/>
+          </a:p>
+        </p:txBody>
+      </p:sp>
+    </p:spTree>
+    <p:extLst>
+      <p:ext uri="{BB962C8B-B14F-4D97-AF65-F5344CB8AC3E}">
+        <p14:creationId xmlns:p14="http://schemas.microsoft.com/office/powerpoint/2010/main" val="3981849503"/>
+      </p:ext>
+    </p:extLst>
+  </p:cSld>
+  <p:clrMapOvr>
+    <a:masterClrMapping/>
+  </p:clrMapOvr>
+  <p:timing>
+    <p:tnLst>
+      <p:par>
+        <p:cTn id="1" dur="indefinite" restart="never" nodeType="tmRoot">
+          <p:childTnLst>
+            <p:seq concurrent="1" nextAc="seek">
+              <p:cTn id="2" dur="indefinite" nodeType="mainSeq">
+                <p:childTnLst>
+                  <p:par>
+                    <p:cTn id="3" fill="hold">
+                      <p:stCondLst>
+                        <p:cond delay="indefinite"/>
+                      </p:stCondLst>
+                      <p:childTnLst>
+                        <p:par>
+                          <p:cTn id="4" fill="hold">
+                            <p:stCondLst>
+                              <p:cond delay="0"/>
+                            </p:stCondLst>
+                            <p:childTnLst>
+                              <p:par>
+                                <p:cTn id="5" presetID="10" presetClass="entr" presetSubtype="0" fill="hold" grpId="0" nodeType="clickEffect">
+                                  <p:stCondLst>
+                                    <p:cond delay="0"/>
+                                  </p:stCondLst>
+                                  <p:childTnLst>
+                                    <p:set>
+                                      <p:cBhvr>
+                                        <p:cTn id="6" dur="1" fill="hold">
+                                          <p:stCondLst>
+                                            <p:cond delay="0"/>
+                                          </p:stCondLst>
+                                        </p:cTn>
+                                        <p:tgtEl>
+                                          <p:spTgt spid="3">
+                                            <p:txEl>
+                                              <p:pRg st="0" end="0"/>
+                                            </p:txEl>
+                                          </p:spTgt>
+                                        </p:tgtEl>
+                                        <p:attrNameLst>
+                                          <p:attrName>style.visibility</p:attrName>
+                                        </p:attrNameLst>
+                                      </p:cBhvr>
+                                      <p:to>
+                                        <p:strVal val="visible"/>
+                                      </p:to>
+                                    </p:set>
+                                    <p:animEffect transition="in" filter="fade">
+                                      <p:cBhvr>
+                                        <p:cTn id="7" dur="500"/>
+                                        <p:tgtEl>
+                                          <p:spTgt spid="3">
+                                            <p:txEl>
+                                              <p:pRg st="0" end="0"/>
+                                            </p:txEl>
+                                          </p:spTgt>
+                                        </p:tgtEl>
+                                      </p:cBhvr>
+                                    </p:animEffect>
+                                  </p:childTnLst>
+                                </p:cTn>
+                              </p:par>
+                            </p:childTnLst>
+                          </p:cTn>
+                        </p:par>
+                      </p:childTnLst>
+                    </p:cTn>
+                  </p:par>
+                  <p:par>
+                    <p:cTn id="8" fill="hold">
+                      <p:stCondLst>
+                        <p:cond delay="indefinite"/>
+                      </p:stCondLst>
+                      <p:childTnLst>
+                        <p:par>
+                          <p:cTn id="9" fill="hold">
+                            <p:stCondLst>
+                              <p:cond delay="0"/>
+                            </p:stCondLst>
+                            <p:childTnLst>
+                              <p:par>
+                                <p:cTn id="10" presetID="10" presetClass="entr" presetSubtype="0" fill="hold" grpId="0" nodeType="clickEffect">
+                                  <p:stCondLst>
+                                    <p:cond delay="0"/>
+                                  </p:stCondLst>
+                                  <p:childTnLst>
+                                    <p:set>
+                                      <p:cBhvr>
+                                        <p:cTn id="11" dur="1" fill="hold">
+                                          <p:stCondLst>
+                                            <p:cond delay="0"/>
+                                          </p:stCondLst>
+                                        </p:cTn>
+                                        <p:tgtEl>
+                                          <p:spTgt spid="3">
+                                            <p:txEl>
+                                              <p:pRg st="1" end="1"/>
+                                            </p:txEl>
+                                          </p:spTgt>
+                                        </p:tgtEl>
+                                        <p:attrNameLst>
+                                          <p:attrName>style.visibility</p:attrName>
+                                        </p:attrNameLst>
+                                      </p:cBhvr>
+                                      <p:to>
+                                        <p:strVal val="visible"/>
+                                      </p:to>
+                                    </p:set>
+                                    <p:animEffect transition="in" filter="fade">
+                                      <p:cBhvr>
+                                        <p:cTn id="12" dur="500"/>
+                                        <p:tgtEl>
+                                          <p:spTgt spid="3">
+                                            <p:txEl>
+                                              <p:pRg st="1" end="1"/>
+                                            </p:txEl>
+                                          </p:spTgt>
+                                        </p:tgtEl>
+                                      </p:cBhvr>
+                                    </p:animEffect>
+                                  </p:childTnLst>
+                                </p:cTn>
+                              </p:par>
+                            </p:childTnLst>
+                          </p:cTn>
+                        </p:par>
+                      </p:childTnLst>
+                    </p:cTn>
+                  </p:par>
+                  <p:par>
+                    <p:cTn id="13" fill="hold">
+                      <p:stCondLst>
+                        <p:cond delay="indefinite"/>
+                      </p:stCondLst>
+                      <p:childTnLst>
+                        <p:par>
+                          <p:cTn id="14" fill="hold">
+                            <p:stCondLst>
+                              <p:cond delay="0"/>
+                            </p:stCondLst>
+                            <p:childTnLst>
+                              <p:par>
+                                <p:cTn id="15" presetID="10" presetClass="entr" presetSubtype="0" fill="hold" grpId="0" nodeType="clickEffect">
+                                  <p:stCondLst>
+                                    <p:cond delay="0"/>
+                                  </p:stCondLst>
+                                  <p:childTnLst>
+                                    <p:set>
+                                      <p:cBhvr>
+                                        <p:cTn id="16" dur="1" fill="hold">
+                                          <p:stCondLst>
+                                            <p:cond delay="0"/>
+                                          </p:stCondLst>
+                                        </p:cTn>
+                                        <p:tgtEl>
+                                          <p:spTgt spid="3">
+                                            <p:txEl>
+                                              <p:pRg st="2" end="2"/>
+                                            </p:txEl>
+                                          </p:spTgt>
+                                        </p:tgtEl>
+                                        <p:attrNameLst>
+                                          <p:attrName>style.visibility</p:attrName>
+                                        </p:attrNameLst>
+                                      </p:cBhvr>
+                                      <p:to>
+                                        <p:strVal val="visible"/>
+                                      </p:to>
+                                    </p:set>
+                                    <p:animEffect transition="in" filter="fade">
+                                      <p:cBhvr>
+                                        <p:cTn id="17" dur="500"/>
+                                        <p:tgtEl>
+                                          <p:spTgt spid="3">
+                                            <p:txEl>
+                                              <p:pRg st="2" end="2"/>
+                                            </p:txEl>
+                                          </p:spTgt>
+                                        </p:tgtEl>
+                                      </p:cBhvr>
+                                    </p:animEffect>
+                                  </p:childTnLst>
+                                </p:cTn>
+                              </p:par>
+                              <p:par>
+                                <p:cTn id="18" presetID="10" presetClass="entr" presetSubtype="0" fill="hold" grpId="0" nodeType="withEffect">
+                                  <p:stCondLst>
+                                    <p:cond delay="0"/>
+                                  </p:stCondLst>
+                                  <p:childTnLst>
+                                    <p:set>
+                                      <p:cBhvr>
+                                        <p:cTn id="19" dur="1" fill="hold">
+                                          <p:stCondLst>
+                                            <p:cond delay="0"/>
+                                          </p:stCondLst>
+                                        </p:cTn>
+                                        <p:tgtEl>
+                                          <p:spTgt spid="3">
+                                            <p:txEl>
+                                              <p:pRg st="3" end="3"/>
+                                            </p:txEl>
+                                          </p:spTgt>
+                                        </p:tgtEl>
+                                        <p:attrNameLst>
+                                          <p:attrName>style.visibility</p:attrName>
+                                        </p:attrNameLst>
+                                      </p:cBhvr>
+                                      <p:to>
+                                        <p:strVal val="visible"/>
+                                      </p:to>
+                                    </p:set>
+                                    <p:animEffect transition="in" filter="fade">
+                                      <p:cBhvr>
+                                        <p:cTn id="20" dur="500"/>
+                                        <p:tgtEl>
+                                          <p:spTgt spid="3">
+                                            <p:txEl>
+                                              <p:pRg st="3" end="3"/>
+                                            </p:txEl>
+                                          </p:spTgt>
+                                        </p:tgtEl>
+                                      </p:cBhvr>
+                                    </p:animEffect>
+                                  </p:childTnLst>
+                                </p:cTn>
+                              </p:par>
+                              <p:par>
+                                <p:cTn id="21" presetID="10" presetClass="entr" presetSubtype="0" fill="hold" grpId="0" nodeType="withEffect">
+                                  <p:stCondLst>
+                                    <p:cond delay="0"/>
+                                  </p:stCondLst>
+                                  <p:childTnLst>
+                                    <p:set>
+                                      <p:cBhvr>
+                                        <p:cTn id="22" dur="1" fill="hold">
+                                          <p:stCondLst>
+                                            <p:cond delay="0"/>
+                                          </p:stCondLst>
+                                        </p:cTn>
+                                        <p:tgtEl>
+                                          <p:spTgt spid="3">
+                                            <p:txEl>
+                                              <p:pRg st="4" end="4"/>
+                                            </p:txEl>
+                                          </p:spTgt>
+                                        </p:tgtEl>
+                                        <p:attrNameLst>
+                                          <p:attrName>style.visibility</p:attrName>
+                                        </p:attrNameLst>
+                                      </p:cBhvr>
+                                      <p:to>
+                                        <p:strVal val="visible"/>
+                                      </p:to>
+                                    </p:set>
+                                    <p:animEffect transition="in" filter="fade">
+                                      <p:cBhvr>
+                                        <p:cTn id="23" dur="500"/>
+                                        <p:tgtEl>
+                                          <p:spTgt spid="3">
+                                            <p:txEl>
+                                              <p:pRg st="4" end="4"/>
+                                            </p:txEl>
+                                          </p:spTgt>
+                                        </p:tgtEl>
+                                      </p:cBhvr>
+                                    </p:animEffect>
+                                  </p:childTnLst>
+                                </p:cTn>
+                              </p:par>
+                              <p:par>
+                                <p:cTn id="24" presetID="10" presetClass="entr" presetSubtype="0" fill="hold" grpId="0" nodeType="withEffect">
+                                  <p:stCondLst>
+                                    <p:cond delay="0"/>
+                                  </p:stCondLst>
+                                  <p:childTnLst>
+                                    <p:set>
+                                      <p:cBhvr>
+                                        <p:cTn id="25" dur="1" fill="hold">
+                                          <p:stCondLst>
+                                            <p:cond delay="0"/>
+                                          </p:stCondLst>
+                                        </p:cTn>
+                                        <p:tgtEl>
+                                          <p:spTgt spid="3">
+                                            <p:txEl>
+                                              <p:pRg st="5" end="5"/>
+                                            </p:txEl>
+                                          </p:spTgt>
+                                        </p:tgtEl>
+                                        <p:attrNameLst>
+                                          <p:attrName>style.visibility</p:attrName>
+                                        </p:attrNameLst>
+                                      </p:cBhvr>
+                                      <p:to>
+                                        <p:strVal val="visible"/>
+                                      </p:to>
+                                    </p:set>
+                                    <p:animEffect transition="in" filter="fade">
+                                      <p:cBhvr>
+                                        <p:cTn id="26" dur="500"/>
+                                        <p:tgtEl>
+                                          <p:spTgt spid="3">
+                                            <p:txEl>
+                                              <p:pRg st="5" end="5"/>
+                                            </p:txEl>
+                                          </p:spTgt>
+                                        </p:tgtEl>
+                                      </p:cBhvr>
+                                    </p:animEffect>
+                                  </p:childTnLst>
+                                </p:cTn>
+                              </p:par>
+                            </p:childTnLst>
+                          </p:cTn>
+                        </p:par>
+                      </p:childTnLst>
+                    </p:cTn>
+                  </p:par>
+                  <p:par>
+                    <p:cTn id="27" fill="hold">
+                      <p:stCondLst>
+                        <p:cond delay="indefinite"/>
+                      </p:stCondLst>
+                      <p:childTnLst>
+                        <p:par>
+                          <p:cTn id="28" fill="hold">
+                            <p:stCondLst>
+                              <p:cond delay="0"/>
+                            </p:stCondLst>
+                            <p:childTnLst>
+                              <p:par>
+                                <p:cTn id="29" presetID="10" presetClass="entr" presetSubtype="0" fill="hold" grpId="0" nodeType="clickEffect">
+                                  <p:stCondLst>
+                                    <p:cond delay="0"/>
+                                  </p:stCondLst>
+                                  <p:childTnLst>
+                                    <p:set>
+                                      <p:cBhvr>
+                                        <p:cTn id="30" dur="1" fill="hold">
+                                          <p:stCondLst>
+                                            <p:cond delay="0"/>
+                                          </p:stCondLst>
+                                        </p:cTn>
+                                        <p:tgtEl>
+                                          <p:spTgt spid="3">
+                                            <p:txEl>
+                                              <p:pRg st="6" end="6"/>
+                                            </p:txEl>
+                                          </p:spTgt>
+                                        </p:tgtEl>
+                                        <p:attrNameLst>
+                                          <p:attrName>style.visibility</p:attrName>
+                                        </p:attrNameLst>
+                                      </p:cBhvr>
+                                      <p:to>
+                                        <p:strVal val="visible"/>
+                                      </p:to>
+                                    </p:set>
+                                    <p:animEffect transition="in" filter="fade">
+                                      <p:cBhvr>
+                                        <p:cTn id="31" dur="500"/>
+                                        <p:tgtEl>
+                                          <p:spTgt spid="3">
+                                            <p:txEl>
+                                              <p:pRg st="6" end="6"/>
+                                            </p:txEl>
+                                          </p:spTgt>
+                                        </p:tgtEl>
+                                      </p:cBhvr>
+                                    </p:animEffect>
+                                  </p:childTnLst>
+                                </p:cTn>
+                              </p:par>
+                            </p:childTnLst>
+                          </p:cTn>
+                        </p:par>
+                      </p:childTnLst>
+                    </p:cTn>
+                  </p:par>
+                  <p:par>
+                    <p:cTn id="32" fill="hold">
+                      <p:stCondLst>
+                        <p:cond delay="indefinite"/>
+                      </p:stCondLst>
+                      <p:childTnLst>
+                        <p:par>
+                          <p:cTn id="33" fill="hold">
+                            <p:stCondLst>
+                              <p:cond delay="0"/>
+                            </p:stCondLst>
+                            <p:childTnLst>
+                              <p:par>
+                                <p:cTn id="34" presetID="10" presetClass="entr" presetSubtype="0" fill="hold" grpId="0" nodeType="clickEffect">
+                                  <p:stCondLst>
+                                    <p:cond delay="0"/>
+                                  </p:stCondLst>
+                                  <p:childTnLst>
+                                    <p:set>
+                                      <p:cBhvr>
+                                        <p:cTn id="35" dur="1" fill="hold">
+                                          <p:stCondLst>
+                                            <p:cond delay="0"/>
+                                          </p:stCondLst>
+                                        </p:cTn>
+                                        <p:tgtEl>
+                                          <p:spTgt spid="3">
+                                            <p:txEl>
+                                              <p:pRg st="7" end="7"/>
+                                            </p:txEl>
+                                          </p:spTgt>
+                                        </p:tgtEl>
+                                        <p:attrNameLst>
+                                          <p:attrName>style.visibility</p:attrName>
+                                        </p:attrNameLst>
+                                      </p:cBhvr>
+                                      <p:to>
+                                        <p:strVal val="visible"/>
+                                      </p:to>
+                                    </p:set>
+                                    <p:animEffect transition="in" filter="fade">
+                                      <p:cBhvr>
+                                        <p:cTn id="36" dur="500"/>
+                                        <p:tgtEl>
+                                          <p:spTgt spid="3">
+                                            <p:txEl>
+                                              <p:pRg st="7" end="7"/>
+                                            </p:txEl>
+                                          </p:spTgt>
+                                        </p:tgtEl>
+                                      </p:cBhvr>
+                                    </p:animEffect>
+                                  </p:childTnLst>
+                                </p:cTn>
+                              </p:par>
+                              <p:par>
+                                <p:cTn id="37" presetID="10" presetClass="entr" presetSubtype="0" fill="hold" grpId="0" nodeType="withEffect">
+                                  <p:stCondLst>
+                                    <p:cond delay="0"/>
+                                  </p:stCondLst>
+                                  <p:childTnLst>
+                                    <p:set>
+                                      <p:cBhvr>
+                                        <p:cTn id="38" dur="1" fill="hold">
+                                          <p:stCondLst>
+                                            <p:cond delay="0"/>
+                                          </p:stCondLst>
+                                        </p:cTn>
+                                        <p:tgtEl>
+                                          <p:spTgt spid="3">
+                                            <p:txEl>
+                                              <p:pRg st="8" end="8"/>
+                                            </p:txEl>
+                                          </p:spTgt>
+                                        </p:tgtEl>
+                                        <p:attrNameLst>
+                                          <p:attrName>style.visibility</p:attrName>
+                                        </p:attrNameLst>
+                                      </p:cBhvr>
+                                      <p:to>
+                                        <p:strVal val="visible"/>
+                                      </p:to>
+                                    </p:set>
+                                    <p:animEffect transition="in" filter="fade">
+                                      <p:cBhvr>
+                                        <p:cTn id="39" dur="500"/>
+                                        <p:tgtEl>
+                                          <p:spTgt spid="3">
+                                            <p:txEl>
+                                              <p:pRg st="8" end="8"/>
+                                            </p:txEl>
+                                          </p:spTgt>
+                                        </p:tgtEl>
+                                      </p:cBhvr>
+                                    </p:animEffect>
+                                  </p:childTnLst>
+                                </p:cTn>
+                              </p:par>
+                            </p:childTnLst>
+                          </p:cTn>
+                        </p:par>
+                      </p:childTnLst>
+                    </p:cTn>
+                  </p:par>
+                </p:childTnLst>
+              </p:cTn>
+              <p:prevCondLst>
+                <p:cond evt="onPrev" delay="0">
+                  <p:tgtEl>
+                    <p:sldTgt/>
+                  </p:tgtEl>
+                </p:cond>
+              </p:prevCondLst>
+              <p:nextCondLst>
+                <p:cond evt="onNext" delay="0">
+                  <p:tgtEl>
+                    <p:sldTgt/>
+                  </p:tgtEl>
+                </p:cond>
+              </p:nextCondLst>
+            </p:seq>
+          </p:childTnLst>
+        </p:cTn>
+      </p:par>
+    </p:tnLst>
+    <p:bldLst>
+      <p:bldP spid="3" grpId="0" uiExpand="1" build="p"/>
+    </p:bldLst>
+  </p:timing>
+</p:sld>
+</file>
+
 <file path=ppt/slides/slide3.xml><?xml version="1.0" encoding="utf-8"?>
 <p:sld xmlns:a="http://schemas.openxmlformats.org/drawingml/2006/main" xmlns:r="http://schemas.openxmlformats.org/officeDocument/2006/relationships" xmlns:p="http://schemas.openxmlformats.org/presentationml/2006/main">
   <p:cSld>
@@ -23659,7 +24412,7 @@
           <a:p>
             <a:r>
               <a:rPr lang="en-US" dirty="0"/>
-              <a:t>A Look at Some Concerns</a:t>
+              <a:t>A Hard Look at Some Concerns</a:t>
             </a:r>
           </a:p>
           <a:p>

</xml_diff>

<commit_message>
Finished next steps section.
</commit_message>
<xml_diff>
--- a/presentation/presentation.pptx
+++ b/presentation/presentation.pptx
@@ -5,7 +5,7 @@
     <p:sldMasterId id="2147483648" r:id="rId1"/>
   </p:sldMasterIdLst>
   <p:notesMasterIdLst>
-    <p:notesMasterId r:id="rId36"/>
+    <p:notesMasterId r:id="rId42"/>
   </p:notesMasterIdLst>
   <p:sldIdLst>
     <p:sldId id="258" r:id="rId2"/>
@@ -42,6 +42,12 @@
     <p:sldId id="290" r:id="rId33"/>
     <p:sldId id="291" r:id="rId34"/>
     <p:sldId id="295" r:id="rId35"/>
+    <p:sldId id="297" r:id="rId36"/>
+    <p:sldId id="296" r:id="rId37"/>
+    <p:sldId id="298" r:id="rId38"/>
+    <p:sldId id="299" r:id="rId39"/>
+    <p:sldId id="300" r:id="rId40"/>
+    <p:sldId id="301" r:id="rId41"/>
   </p:sldIdLst>
   <p:sldSz cx="12192000" cy="6858000"/>
   <p:notesSz cx="6858000" cy="9144000"/>
@@ -197,7 +203,7 @@
             <p14:sldId id="292"/>
           </p14:sldIdLst>
         </p14:section>
-        <p14:section name="A Look at Some Concerns" id="{BBBC4B94-5C39-44E3-86B7-9871E92F1E29}">
+        <p14:section name="A Hard Look at Some Concerns" id="{BBBC4B94-5C39-44E3-86B7-9871E92F1E29}">
           <p14:sldIdLst>
             <p14:sldId id="289"/>
             <p14:sldId id="290"/>
@@ -206,7 +212,14 @@
           </p14:sldIdLst>
         </p14:section>
         <p14:section name="A Look at Next Steps" id="{054C77BE-76F1-40B4-AE4C-60B66BF73523}">
-          <p14:sldIdLst/>
+          <p14:sldIdLst>
+            <p14:sldId id="297"/>
+            <p14:sldId id="296"/>
+            <p14:sldId id="298"/>
+            <p14:sldId id="299"/>
+            <p14:sldId id="300"/>
+            <p14:sldId id="301"/>
+          </p14:sldIdLst>
         </p14:section>
       </p14:sectionLst>
     </p:ext>
@@ -27702,6 +27715,721 @@
 </p:sld>
 </file>
 
+<file path=ppt/slides/slide35.xml><?xml version="1.0" encoding="utf-8"?>
+<p:sld xmlns:a="http://schemas.openxmlformats.org/drawingml/2006/main" xmlns:r="http://schemas.openxmlformats.org/officeDocument/2006/relationships" xmlns:p="http://schemas.openxmlformats.org/presentationml/2006/main">
+  <p:cSld>
+    <p:spTree>
+      <p:nvGrpSpPr>
+        <p:cNvPr id="1" name=""/>
+        <p:cNvGrpSpPr/>
+        <p:nvPr/>
+      </p:nvGrpSpPr>
+      <p:grpSpPr>
+        <a:xfrm>
+          <a:off x="0" y="0"/>
+          <a:ext cx="0" cy="0"/>
+          <a:chOff x="0" y="0"/>
+          <a:chExt cx="0" cy="0"/>
+        </a:xfrm>
+      </p:grpSpPr>
+      <p:sp>
+        <p:nvSpPr>
+          <p:cNvPr id="2" name="Title 1">
+            <a:extLst>
+              <a:ext uri="{FF2B5EF4-FFF2-40B4-BE49-F238E27FC236}">
+                <a16:creationId xmlns:a16="http://schemas.microsoft.com/office/drawing/2014/main" id="{6BF0D347-65B7-400F-B428-561CA819C5C0}"/>
+              </a:ext>
+            </a:extLst>
+          </p:cNvPr>
+          <p:cNvSpPr>
+            <a:spLocks noGrp="1"/>
+          </p:cNvSpPr>
+          <p:nvPr>
+            <p:ph type="title"/>
+          </p:nvPr>
+        </p:nvSpPr>
+        <p:spPr/>
+        <p:txBody>
+          <a:bodyPr/>
+          <a:lstStyle/>
+          <a:p>
+            <a:r>
+              <a:rPr lang="en-US" dirty="0"/>
+              <a:t>A Quick Look at Next Steps</a:t>
+            </a:r>
+          </a:p>
+        </p:txBody>
+      </p:sp>
+      <p:sp>
+        <p:nvSpPr>
+          <p:cNvPr id="3" name="Text Placeholder 2">
+            <a:extLst>
+              <a:ext uri="{FF2B5EF4-FFF2-40B4-BE49-F238E27FC236}">
+                <a16:creationId xmlns:a16="http://schemas.microsoft.com/office/drawing/2014/main" id="{DDCE985A-C68E-49C9-8149-6CC065D75C74}"/>
+              </a:ext>
+            </a:extLst>
+          </p:cNvPr>
+          <p:cNvSpPr>
+            <a:spLocks noGrp="1"/>
+          </p:cNvSpPr>
+          <p:nvPr>
+            <p:ph type="body" idx="1"/>
+          </p:nvPr>
+        </p:nvSpPr>
+        <p:spPr/>
+        <p:txBody>
+          <a:bodyPr/>
+          <a:lstStyle/>
+          <a:p>
+            <a:r>
+              <a:rPr lang="en-US" dirty="0"/>
+              <a:t>Where I Tell You What I Think We Should Do</a:t>
+            </a:r>
+          </a:p>
+        </p:txBody>
+      </p:sp>
+    </p:spTree>
+    <p:extLst>
+      <p:ext uri="{BB962C8B-B14F-4D97-AF65-F5344CB8AC3E}">
+        <p14:creationId xmlns:p14="http://schemas.microsoft.com/office/powerpoint/2010/main" val="2118630104"/>
+      </p:ext>
+    </p:extLst>
+  </p:cSld>
+  <p:clrMapOvr>
+    <a:masterClrMapping/>
+  </p:clrMapOvr>
+</p:sld>
+</file>
+
+<file path=ppt/slides/slide36.xml><?xml version="1.0" encoding="utf-8"?>
+<p:sld xmlns:a="http://schemas.openxmlformats.org/drawingml/2006/main" xmlns:r="http://schemas.openxmlformats.org/officeDocument/2006/relationships" xmlns:p="http://schemas.openxmlformats.org/presentationml/2006/main">
+  <p:cSld>
+    <p:spTree>
+      <p:nvGrpSpPr>
+        <p:cNvPr id="1" name=""/>
+        <p:cNvGrpSpPr/>
+        <p:nvPr/>
+      </p:nvGrpSpPr>
+      <p:grpSpPr>
+        <a:xfrm>
+          <a:off x="0" y="0"/>
+          <a:ext cx="0" cy="0"/>
+          <a:chOff x="0" y="0"/>
+          <a:chExt cx="0" cy="0"/>
+        </a:xfrm>
+      </p:grpSpPr>
+      <p:sp>
+        <p:nvSpPr>
+          <p:cNvPr id="2" name="Title 1">
+            <a:extLst>
+              <a:ext uri="{FF2B5EF4-FFF2-40B4-BE49-F238E27FC236}">
+                <a16:creationId xmlns:a16="http://schemas.microsoft.com/office/drawing/2014/main" id="{4C2CE01B-4B31-4A93-805C-2E5D3CD8EC2B}"/>
+              </a:ext>
+            </a:extLst>
+          </p:cNvPr>
+          <p:cNvSpPr>
+            <a:spLocks noGrp="1"/>
+          </p:cNvSpPr>
+          <p:nvPr>
+            <p:ph type="title"/>
+          </p:nvPr>
+        </p:nvSpPr>
+        <p:spPr/>
+        <p:txBody>
+          <a:bodyPr/>
+          <a:lstStyle/>
+          <a:p>
+            <a:r>
+              <a:rPr lang="en-US" dirty="0"/>
+              <a:t>Methodically Address Our Concerns</a:t>
+            </a:r>
+          </a:p>
+        </p:txBody>
+      </p:sp>
+      <p:sp>
+        <p:nvSpPr>
+          <p:cNvPr id="3" name="Content Placeholder 2">
+            <a:extLst>
+              <a:ext uri="{FF2B5EF4-FFF2-40B4-BE49-F238E27FC236}">
+                <a16:creationId xmlns:a16="http://schemas.microsoft.com/office/drawing/2014/main" id="{D4716BAD-2628-4008-8461-B4E0203B0B84}"/>
+              </a:ext>
+            </a:extLst>
+          </p:cNvPr>
+          <p:cNvSpPr>
+            <a:spLocks noGrp="1"/>
+          </p:cNvSpPr>
+          <p:nvPr>
+            <p:ph idx="1"/>
+          </p:nvPr>
+        </p:nvSpPr>
+        <p:spPr/>
+        <p:txBody>
+          <a:bodyPr/>
+          <a:lstStyle/>
+          <a:p>
+            <a:r>
+              <a:rPr lang="en-US" dirty="0"/>
+              <a:t>How do we audit licenses?</a:t>
+            </a:r>
+          </a:p>
+          <a:p>
+            <a:r>
+              <a:rPr lang="en-US" dirty="0"/>
+              <a:t>How do we audit base images?</a:t>
+            </a:r>
+          </a:p>
+          <a:p>
+            <a:r>
+              <a:rPr lang="en-US" dirty="0"/>
+              <a:t>How do we monitor running applications?</a:t>
+            </a:r>
+          </a:p>
+          <a:p>
+            <a:r>
+              <a:rPr lang="en-US" dirty="0"/>
+              <a:t>How do we scale effectively?</a:t>
+            </a:r>
+          </a:p>
+          <a:p>
+            <a:r>
+              <a:rPr lang="en-US" dirty="0"/>
+              <a:t>How do we do disaster recovery?</a:t>
+            </a:r>
+          </a:p>
+          <a:p>
+            <a:r>
+              <a:rPr lang="en-US" dirty="0"/>
+              <a:t>How do we provide information to support teams?</a:t>
+            </a:r>
+          </a:p>
+          <a:p>
+            <a:r>
+              <a:rPr lang="en-US" dirty="0"/>
+              <a:t>How do we secure desktops for Docker?</a:t>
+            </a:r>
+          </a:p>
+          <a:p>
+            <a:r>
+              <a:rPr lang="en-US" dirty="0" err="1"/>
+              <a:t>Etc</a:t>
+            </a:r>
+            <a:r>
+              <a:rPr lang="en-US" dirty="0"/>
+              <a:t>…</a:t>
+            </a:r>
+          </a:p>
+        </p:txBody>
+      </p:sp>
+    </p:spTree>
+    <p:extLst>
+      <p:ext uri="{BB962C8B-B14F-4D97-AF65-F5344CB8AC3E}">
+        <p14:creationId xmlns:p14="http://schemas.microsoft.com/office/powerpoint/2010/main" val="831246271"/>
+      </p:ext>
+    </p:extLst>
+  </p:cSld>
+  <p:clrMapOvr>
+    <a:masterClrMapping/>
+  </p:clrMapOvr>
+</p:sld>
+</file>
+
+<file path=ppt/slides/slide37.xml><?xml version="1.0" encoding="utf-8"?>
+<p:sld xmlns:a="http://schemas.openxmlformats.org/drawingml/2006/main" xmlns:r="http://schemas.openxmlformats.org/officeDocument/2006/relationships" xmlns:p="http://schemas.openxmlformats.org/presentationml/2006/main">
+  <p:cSld>
+    <p:spTree>
+      <p:nvGrpSpPr>
+        <p:cNvPr id="1" name=""/>
+        <p:cNvGrpSpPr/>
+        <p:nvPr/>
+      </p:nvGrpSpPr>
+      <p:grpSpPr>
+        <a:xfrm>
+          <a:off x="0" y="0"/>
+          <a:ext cx="0" cy="0"/>
+          <a:chOff x="0" y="0"/>
+          <a:chExt cx="0" cy="0"/>
+        </a:xfrm>
+      </p:grpSpPr>
+      <p:sp>
+        <p:nvSpPr>
+          <p:cNvPr id="2" name="Title 1">
+            <a:extLst>
+              <a:ext uri="{FF2B5EF4-FFF2-40B4-BE49-F238E27FC236}">
+                <a16:creationId xmlns:a16="http://schemas.microsoft.com/office/drawing/2014/main" id="{247269FB-C1B8-43AE-A0E9-2F468C19FFE8}"/>
+              </a:ext>
+            </a:extLst>
+          </p:cNvPr>
+          <p:cNvSpPr>
+            <a:spLocks noGrp="1"/>
+          </p:cNvSpPr>
+          <p:nvPr>
+            <p:ph type="title"/>
+          </p:nvPr>
+        </p:nvSpPr>
+        <p:spPr/>
+        <p:txBody>
+          <a:bodyPr/>
+          <a:lstStyle/>
+          <a:p>
+            <a:r>
+              <a:rPr lang="en-US" dirty="0"/>
+              <a:t>We Need Some Proofs of Concept</a:t>
+            </a:r>
+          </a:p>
+        </p:txBody>
+      </p:sp>
+      <p:sp>
+        <p:nvSpPr>
+          <p:cNvPr id="3" name="Content Placeholder 2">
+            <a:extLst>
+              <a:ext uri="{FF2B5EF4-FFF2-40B4-BE49-F238E27FC236}">
+                <a16:creationId xmlns:a16="http://schemas.microsoft.com/office/drawing/2014/main" id="{625EC4F8-491C-4A5B-A47C-3C56230E878F}"/>
+              </a:ext>
+            </a:extLst>
+          </p:cNvPr>
+          <p:cNvSpPr>
+            <a:spLocks noGrp="1"/>
+          </p:cNvSpPr>
+          <p:nvPr>
+            <p:ph idx="1"/>
+          </p:nvPr>
+        </p:nvSpPr>
+        <p:spPr/>
+        <p:txBody>
+          <a:bodyPr/>
+          <a:lstStyle/>
+          <a:p>
+            <a:r>
+              <a:rPr lang="en-US" dirty="0"/>
+              <a:t>We are (with some caveats) not in a hurry</a:t>
+            </a:r>
+          </a:p>
+          <a:p>
+            <a:r>
+              <a:rPr lang="en-US" dirty="0"/>
+              <a:t>We should evaluate all the offerings</a:t>
+            </a:r>
+          </a:p>
+          <a:p>
+            <a:pPr lvl="1"/>
+            <a:r>
+              <a:rPr lang="en-US" dirty="0"/>
+              <a:t>We keep learning new things at every demo</a:t>
+            </a:r>
+          </a:p>
+          <a:p>
+            <a:r>
+              <a:rPr lang="en-US" dirty="0"/>
+              <a:t>We should first consider our existing Enterprise partners</a:t>
+            </a:r>
+          </a:p>
+          <a:p>
+            <a:r>
+              <a:rPr lang="en-US" dirty="0"/>
+              <a:t>We should </a:t>
+            </a:r>
+            <a:r>
+              <a:rPr lang="en-US" i="1" dirty="0"/>
+              <a:t>try</a:t>
+            </a:r>
+            <a:r>
+              <a:rPr lang="en-US" dirty="0"/>
+              <a:t> to avoid vendor lock-in</a:t>
+            </a:r>
+          </a:p>
+          <a:p>
+            <a:r>
+              <a:rPr lang="en-US" dirty="0"/>
+              <a:t>We should take our time and get it right</a:t>
+            </a:r>
+          </a:p>
+        </p:txBody>
+      </p:sp>
+    </p:spTree>
+    <p:extLst>
+      <p:ext uri="{BB962C8B-B14F-4D97-AF65-F5344CB8AC3E}">
+        <p14:creationId xmlns:p14="http://schemas.microsoft.com/office/powerpoint/2010/main" val="3992490361"/>
+      </p:ext>
+    </p:extLst>
+  </p:cSld>
+  <p:clrMapOvr>
+    <a:masterClrMapping/>
+  </p:clrMapOvr>
+</p:sld>
+</file>
+
+<file path=ppt/slides/slide38.xml><?xml version="1.0" encoding="utf-8"?>
+<p:sld xmlns:a="http://schemas.openxmlformats.org/drawingml/2006/main" xmlns:r="http://schemas.openxmlformats.org/officeDocument/2006/relationships" xmlns:p="http://schemas.openxmlformats.org/presentationml/2006/main">
+  <p:cSld>
+    <p:spTree>
+      <p:nvGrpSpPr>
+        <p:cNvPr id="1" name=""/>
+        <p:cNvGrpSpPr/>
+        <p:nvPr/>
+      </p:nvGrpSpPr>
+      <p:grpSpPr>
+        <a:xfrm>
+          <a:off x="0" y="0"/>
+          <a:ext cx="0" cy="0"/>
+          <a:chOff x="0" y="0"/>
+          <a:chExt cx="0" cy="0"/>
+        </a:xfrm>
+      </p:grpSpPr>
+      <p:sp>
+        <p:nvSpPr>
+          <p:cNvPr id="2" name="Title 1">
+            <a:extLst>
+              <a:ext uri="{FF2B5EF4-FFF2-40B4-BE49-F238E27FC236}">
+                <a16:creationId xmlns:a16="http://schemas.microsoft.com/office/drawing/2014/main" id="{045FFE82-9EC1-42A7-83CE-F859A3907801}"/>
+              </a:ext>
+            </a:extLst>
+          </p:cNvPr>
+          <p:cNvSpPr>
+            <a:spLocks noGrp="1"/>
+          </p:cNvSpPr>
+          <p:nvPr>
+            <p:ph type="title"/>
+          </p:nvPr>
+        </p:nvSpPr>
+        <p:spPr/>
+        <p:txBody>
+          <a:bodyPr/>
+          <a:lstStyle/>
+          <a:p>
+            <a:r>
+              <a:rPr lang="en-US" dirty="0"/>
+              <a:t>Individual Preparedness</a:t>
+            </a:r>
+          </a:p>
+        </p:txBody>
+      </p:sp>
+      <p:sp>
+        <p:nvSpPr>
+          <p:cNvPr id="3" name="Content Placeholder 2">
+            <a:extLst>
+              <a:ext uri="{FF2B5EF4-FFF2-40B4-BE49-F238E27FC236}">
+                <a16:creationId xmlns:a16="http://schemas.microsoft.com/office/drawing/2014/main" id="{BC0344A5-3C15-4163-8FCE-D6DA238EC22E}"/>
+              </a:ext>
+            </a:extLst>
+          </p:cNvPr>
+          <p:cNvSpPr>
+            <a:spLocks noGrp="1"/>
+          </p:cNvSpPr>
+          <p:nvPr>
+            <p:ph idx="1"/>
+          </p:nvPr>
+        </p:nvSpPr>
+        <p:spPr>
+          <a:xfrm>
+            <a:off x="581192" y="2180496"/>
+            <a:ext cx="11029615" cy="4108436"/>
+          </a:xfrm>
+        </p:spPr>
+        <p:txBody>
+          <a:bodyPr>
+            <a:normAutofit/>
+          </a:bodyPr>
+          <a:lstStyle/>
+          <a:p>
+            <a:r>
+              <a:rPr lang="en-US" b="1" i="1" u="sng" dirty="0">
+                <a:solidFill>
+                  <a:srgbClr val="FF0000"/>
+                </a:solidFill>
+              </a:rPr>
+              <a:t>CONTAINERS ARE COMING</a:t>
+            </a:r>
+          </a:p>
+          <a:p>
+            <a:r>
+              <a:rPr lang="en-US" dirty="0"/>
+              <a:t>Everybody needs to do a little work</a:t>
+            </a:r>
+          </a:p>
+          <a:p>
+            <a:pPr lvl="1"/>
+            <a:r>
+              <a:rPr lang="en-US" dirty="0"/>
+              <a:t>If you are the hands-on type, get your hands dirty</a:t>
+            </a:r>
+          </a:p>
+          <a:p>
+            <a:pPr lvl="2"/>
+            <a:r>
+              <a:rPr lang="en-US" dirty="0"/>
+              <a:t>Install docker somewhere</a:t>
+            </a:r>
+          </a:p>
+          <a:p>
+            <a:pPr lvl="2"/>
+            <a:r>
+              <a:rPr lang="en-US" dirty="0"/>
+              <a:t>Play with it, develop and </a:t>
+            </a:r>
+            <a:r>
+              <a:rPr lang="en-US" dirty="0" err="1"/>
+              <a:t>dockerize</a:t>
+            </a:r>
+            <a:r>
+              <a:rPr lang="en-US" dirty="0"/>
+              <a:t> an app, build containers, smash ‘</a:t>
+            </a:r>
+            <a:r>
+              <a:rPr lang="en-US" dirty="0" err="1"/>
+              <a:t>em</a:t>
+            </a:r>
+            <a:r>
+              <a:rPr lang="en-US" dirty="0"/>
+              <a:t>, trash ‘</a:t>
+            </a:r>
+            <a:r>
+              <a:rPr lang="en-US" dirty="0" err="1"/>
+              <a:t>em</a:t>
+            </a:r>
+            <a:r>
+              <a:rPr lang="en-US" dirty="0"/>
+              <a:t>, </a:t>
+            </a:r>
+            <a:r>
+              <a:rPr lang="en-US" dirty="0" err="1"/>
+              <a:t>etc</a:t>
+            </a:r>
+            <a:r>
+              <a:rPr lang="en-US" dirty="0"/>
+              <a:t>…</a:t>
+            </a:r>
+          </a:p>
+          <a:p>
+            <a:pPr lvl="2"/>
+            <a:r>
+              <a:rPr lang="en-US" dirty="0"/>
+              <a:t>Go through the Pluralsight courses, especially the deep dives</a:t>
+            </a:r>
+          </a:p>
+          <a:p>
+            <a:pPr lvl="2"/>
+            <a:r>
+              <a:rPr lang="en-US" b="1" i="1" dirty="0"/>
+              <a:t>Take some notes</a:t>
+            </a:r>
+          </a:p>
+          <a:p>
+            <a:pPr lvl="1"/>
+            <a:r>
+              <a:rPr lang="en-US" dirty="0"/>
+              <a:t>If you are not the hands-on type, do your homework</a:t>
+            </a:r>
+          </a:p>
+          <a:p>
+            <a:pPr lvl="2"/>
+            <a:r>
+              <a:rPr lang="en-US" dirty="0"/>
+              <a:t>Go through </a:t>
+            </a:r>
+            <a:r>
+              <a:rPr lang="en-US" i="1" dirty="0"/>
+              <a:t>one </a:t>
+            </a:r>
+            <a:r>
+              <a:rPr lang="en-US" dirty="0"/>
+              <a:t>Pluralsight course:  </a:t>
+            </a:r>
+            <a:r>
+              <a:rPr lang="en-US" b="1" dirty="0"/>
+              <a:t>“Docker and Containers:  The Big Picture”</a:t>
+            </a:r>
+            <a:r>
+              <a:rPr lang="en-US" dirty="0"/>
+              <a:t> by Nigel Poulton.  </a:t>
+            </a:r>
+            <a:r>
+              <a:rPr lang="en-US" i="1" dirty="0"/>
+              <a:t>This is only about 4 hours</a:t>
+            </a:r>
+            <a:r>
+              <a:rPr lang="en-US" dirty="0"/>
+              <a:t>.</a:t>
+            </a:r>
+          </a:p>
+          <a:p>
+            <a:pPr lvl="2"/>
+            <a:r>
+              <a:rPr lang="en-US" dirty="0"/>
+              <a:t>Start talking about it with your peers and subordinates</a:t>
+            </a:r>
+          </a:p>
+          <a:p>
+            <a:pPr lvl="2"/>
+            <a:r>
+              <a:rPr lang="en-US" dirty="0"/>
+              <a:t>Give some time to thinking about it</a:t>
+            </a:r>
+          </a:p>
+          <a:p>
+            <a:pPr lvl="2"/>
+            <a:endParaRPr lang="en-US" dirty="0"/>
+          </a:p>
+        </p:txBody>
+      </p:sp>
+    </p:spTree>
+    <p:extLst>
+      <p:ext uri="{BB962C8B-B14F-4D97-AF65-F5344CB8AC3E}">
+        <p14:creationId xmlns:p14="http://schemas.microsoft.com/office/powerpoint/2010/main" val="4150383022"/>
+      </p:ext>
+    </p:extLst>
+  </p:cSld>
+  <p:clrMapOvr>
+    <a:masterClrMapping/>
+  </p:clrMapOvr>
+</p:sld>
+</file>
+
+<file path=ppt/slides/slide39.xml><?xml version="1.0" encoding="utf-8"?>
+<p:sld xmlns:a="http://schemas.openxmlformats.org/drawingml/2006/main" xmlns:r="http://schemas.openxmlformats.org/officeDocument/2006/relationships" xmlns:p="http://schemas.openxmlformats.org/presentationml/2006/main">
+  <p:cSld>
+    <p:spTree>
+      <p:nvGrpSpPr>
+        <p:cNvPr id="1" name=""/>
+        <p:cNvGrpSpPr/>
+        <p:nvPr/>
+      </p:nvGrpSpPr>
+      <p:grpSpPr>
+        <a:xfrm>
+          <a:off x="0" y="0"/>
+          <a:ext cx="0" cy="0"/>
+          <a:chOff x="0" y="0"/>
+          <a:chExt cx="0" cy="0"/>
+        </a:xfrm>
+      </p:grpSpPr>
+      <p:sp>
+        <p:nvSpPr>
+          <p:cNvPr id="2" name="Title 1">
+            <a:extLst>
+              <a:ext uri="{FF2B5EF4-FFF2-40B4-BE49-F238E27FC236}">
+                <a16:creationId xmlns:a16="http://schemas.microsoft.com/office/drawing/2014/main" id="{045FFE82-9EC1-42A7-83CE-F859A3907801}"/>
+              </a:ext>
+            </a:extLst>
+          </p:cNvPr>
+          <p:cNvSpPr>
+            <a:spLocks noGrp="1"/>
+          </p:cNvSpPr>
+          <p:nvPr>
+            <p:ph type="title"/>
+          </p:nvPr>
+        </p:nvSpPr>
+        <p:spPr/>
+        <p:txBody>
+          <a:bodyPr/>
+          <a:lstStyle/>
+          <a:p>
+            <a:r>
+              <a:rPr lang="en-US" dirty="0"/>
+              <a:t>Organizational Preparedness</a:t>
+            </a:r>
+          </a:p>
+        </p:txBody>
+      </p:sp>
+      <p:sp>
+        <p:nvSpPr>
+          <p:cNvPr id="3" name="Content Placeholder 2">
+            <a:extLst>
+              <a:ext uri="{FF2B5EF4-FFF2-40B4-BE49-F238E27FC236}">
+                <a16:creationId xmlns:a16="http://schemas.microsoft.com/office/drawing/2014/main" id="{BC0344A5-3C15-4163-8FCE-D6DA238EC22E}"/>
+              </a:ext>
+            </a:extLst>
+          </p:cNvPr>
+          <p:cNvSpPr>
+            <a:spLocks noGrp="1"/>
+          </p:cNvSpPr>
+          <p:nvPr>
+            <p:ph idx="1"/>
+          </p:nvPr>
+        </p:nvSpPr>
+        <p:spPr>
+          <a:xfrm>
+            <a:off x="581192" y="2180496"/>
+            <a:ext cx="11029615" cy="4108436"/>
+          </a:xfrm>
+        </p:spPr>
+        <p:txBody>
+          <a:bodyPr>
+            <a:normAutofit/>
+          </a:bodyPr>
+          <a:lstStyle/>
+          <a:p>
+            <a:r>
+              <a:rPr lang="en-US" b="1" i="1" u="sng" dirty="0">
+                <a:solidFill>
+                  <a:srgbClr val="FF0000"/>
+                </a:solidFill>
+              </a:rPr>
+              <a:t>CONTAINERS ARE COMING</a:t>
+            </a:r>
+          </a:p>
+          <a:p>
+            <a:r>
+              <a:rPr lang="en-US" dirty="0"/>
+              <a:t>Acceptance is key</a:t>
+            </a:r>
+          </a:p>
+          <a:p>
+            <a:r>
+              <a:rPr lang="en-US" dirty="0"/>
+              <a:t>People are already using them</a:t>
+            </a:r>
+          </a:p>
+          <a:p>
+            <a:r>
+              <a:rPr lang="en-US" dirty="0"/>
+              <a:t>Make a formal analysis so we aren’t caught on our heels</a:t>
+            </a:r>
+          </a:p>
+          <a:p>
+            <a:r>
+              <a:rPr lang="en-US" dirty="0"/>
+              <a:t>Decide on partners and platforms</a:t>
+            </a:r>
+          </a:p>
+          <a:p>
+            <a:r>
+              <a:rPr lang="en-US" dirty="0"/>
+              <a:t>Discuss budgeting across teams</a:t>
+            </a:r>
+          </a:p>
+          <a:p>
+            <a:r>
+              <a:rPr lang="en-US" dirty="0"/>
+              <a:t>Use the Big Data / Data Science team as a launchpad</a:t>
+            </a:r>
+          </a:p>
+          <a:p>
+            <a:r>
+              <a:rPr lang="en-US" dirty="0"/>
+              <a:t>Create boilerplate so it is easy to start new applications with containers</a:t>
+            </a:r>
+          </a:p>
+          <a:p>
+            <a:pPr lvl="1"/>
+            <a:r>
+              <a:rPr lang="en-US" dirty="0"/>
+              <a:t>Especially CI / CD (where appropriate)</a:t>
+            </a:r>
+          </a:p>
+        </p:txBody>
+      </p:sp>
+    </p:spTree>
+    <p:extLst>
+      <p:ext uri="{BB962C8B-B14F-4D97-AF65-F5344CB8AC3E}">
+        <p14:creationId xmlns:p14="http://schemas.microsoft.com/office/powerpoint/2010/main" val="3387391210"/>
+      </p:ext>
+    </p:extLst>
+  </p:cSld>
+  <p:clrMapOvr>
+    <a:masterClrMapping/>
+  </p:clrMapOvr>
+</p:sld>
+</file>
+
 <file path=ppt/slides/slide4.xml><?xml version="1.0" encoding="utf-8"?>
 <p:sld xmlns:a="http://schemas.openxmlformats.org/drawingml/2006/main" xmlns:r="http://schemas.openxmlformats.org/officeDocument/2006/relationships" xmlns:p="http://schemas.openxmlformats.org/presentationml/2006/main">
   <p:cSld>
@@ -27785,6 +28513,496 @@
   <p:clrMapOvr>
     <a:masterClrMapping/>
   </p:clrMapOvr>
+</p:sld>
+</file>
+
+<file path=ppt/slides/slide40.xml><?xml version="1.0" encoding="utf-8"?>
+<p:sld xmlns:a="http://schemas.openxmlformats.org/drawingml/2006/main" xmlns:r="http://schemas.openxmlformats.org/officeDocument/2006/relationships" xmlns:p="http://schemas.openxmlformats.org/presentationml/2006/main">
+  <p:cSld>
+    <p:spTree>
+      <p:nvGrpSpPr>
+        <p:cNvPr id="1" name=""/>
+        <p:cNvGrpSpPr/>
+        <p:nvPr/>
+      </p:nvGrpSpPr>
+      <p:grpSpPr>
+        <a:xfrm>
+          <a:off x="0" y="0"/>
+          <a:ext cx="0" cy="0"/>
+          <a:chOff x="0" y="0"/>
+          <a:chExt cx="0" cy="0"/>
+        </a:xfrm>
+      </p:grpSpPr>
+      <p:sp>
+        <p:nvSpPr>
+          <p:cNvPr id="2" name="Title 1">
+            <a:extLst>
+              <a:ext uri="{FF2B5EF4-FFF2-40B4-BE49-F238E27FC236}">
+                <a16:creationId xmlns:a16="http://schemas.microsoft.com/office/drawing/2014/main" id="{CE2C3261-F0B1-487A-A833-48FD33D8A184}"/>
+              </a:ext>
+            </a:extLst>
+          </p:cNvPr>
+          <p:cNvSpPr>
+            <a:spLocks noGrp="1"/>
+          </p:cNvSpPr>
+          <p:nvPr>
+            <p:ph type="title"/>
+          </p:nvPr>
+        </p:nvSpPr>
+        <p:spPr/>
+        <p:txBody>
+          <a:bodyPr/>
+          <a:lstStyle/>
+          <a:p>
+            <a:r>
+              <a:rPr lang="en-US" dirty="0"/>
+              <a:t>Organizational Preparedness (Continued)</a:t>
+            </a:r>
+          </a:p>
+        </p:txBody>
+      </p:sp>
+      <p:sp>
+        <p:nvSpPr>
+          <p:cNvPr id="3" name="Content Placeholder 2">
+            <a:extLst>
+              <a:ext uri="{FF2B5EF4-FFF2-40B4-BE49-F238E27FC236}">
+                <a16:creationId xmlns:a16="http://schemas.microsoft.com/office/drawing/2014/main" id="{3215D89E-585B-457D-8CC0-4BE8E480A94F}"/>
+              </a:ext>
+            </a:extLst>
+          </p:cNvPr>
+          <p:cNvSpPr>
+            <a:spLocks noGrp="1"/>
+          </p:cNvSpPr>
+          <p:nvPr>
+            <p:ph sz="half" idx="1"/>
+          </p:nvPr>
+        </p:nvSpPr>
+        <p:spPr/>
+        <p:txBody>
+          <a:bodyPr>
+            <a:normAutofit fontScale="92500" lnSpcReduction="20000"/>
+          </a:bodyPr>
+          <a:lstStyle/>
+          <a:p>
+            <a:pPr>
+              <a:lnSpc>
+                <a:spcPct val="200000"/>
+              </a:lnSpc>
+            </a:pPr>
+            <a:r>
+              <a:rPr lang="en-US" dirty="0"/>
+              <a:t>Start making it official so we don’t have unsupervised pockets </a:t>
+            </a:r>
+            <a:r>
+              <a:rPr lang="en-US"/>
+              <a:t>of adoption</a:t>
+            </a:r>
+            <a:endParaRPr lang="en-US" dirty="0"/>
+          </a:p>
+          <a:p>
+            <a:pPr>
+              <a:lnSpc>
+                <a:spcPct val="200000"/>
+              </a:lnSpc>
+            </a:pPr>
+            <a:r>
+              <a:rPr lang="en-US" dirty="0"/>
+              <a:t>Consider starting with developers and </a:t>
+            </a:r>
+            <a:r>
+              <a:rPr lang="en-US" dirty="0" err="1"/>
+              <a:t>devops</a:t>
+            </a:r>
+            <a:r>
+              <a:rPr lang="en-US" dirty="0"/>
+              <a:t>.  This is who containers were designed for.</a:t>
+            </a:r>
+          </a:p>
+          <a:p>
+            <a:pPr>
+              <a:lnSpc>
+                <a:spcPct val="300000"/>
+              </a:lnSpc>
+            </a:pPr>
+            <a:r>
+              <a:rPr lang="en-US" dirty="0"/>
+              <a:t>Ignore operations at your peril.  They present many blockers to moving forward, </a:t>
+            </a:r>
+            <a:r>
+              <a:rPr lang="en-US" i="1" dirty="0"/>
+              <a:t>as they should</a:t>
+            </a:r>
+            <a:r>
+              <a:rPr lang="en-US" dirty="0"/>
+              <a:t>.</a:t>
+            </a:r>
+          </a:p>
+        </p:txBody>
+      </p:sp>
+      <p:pic>
+        <p:nvPicPr>
+          <p:cNvPr id="5" name="Content Placeholder 4">
+            <a:extLst>
+              <a:ext uri="{FF2B5EF4-FFF2-40B4-BE49-F238E27FC236}">
+                <a16:creationId xmlns:a16="http://schemas.microsoft.com/office/drawing/2014/main" id="{13EE4135-32D5-4E30-87C9-8510329A472B}"/>
+              </a:ext>
+            </a:extLst>
+          </p:cNvPr>
+          <p:cNvPicPr>
+            <a:picLocks noGrp="1" noChangeAspect="1"/>
+          </p:cNvPicPr>
+          <p:nvPr>
+            <p:ph sz="half" idx="2"/>
+          </p:nvPr>
+        </p:nvPicPr>
+        <p:blipFill>
+          <a:blip r:embed="rId2"/>
+          <a:stretch>
+            <a:fillRect/>
+          </a:stretch>
+        </p:blipFill>
+        <p:spPr>
+          <a:xfrm>
+            <a:off x="6096000" y="1897263"/>
+            <a:ext cx="5422900" cy="2093295"/>
+          </a:xfrm>
+          <a:prstGeom prst="rect">
+            <a:avLst/>
+          </a:prstGeom>
+        </p:spPr>
+      </p:pic>
+      <p:pic>
+        <p:nvPicPr>
+          <p:cNvPr id="6" name="Picture 5">
+            <a:extLst>
+              <a:ext uri="{FF2B5EF4-FFF2-40B4-BE49-F238E27FC236}">
+                <a16:creationId xmlns:a16="http://schemas.microsoft.com/office/drawing/2014/main" id="{13A4EBA5-B620-4D9F-8750-23D3844E089E}"/>
+              </a:ext>
+            </a:extLst>
+          </p:cNvPr>
+          <p:cNvPicPr>
+            <a:picLocks noChangeAspect="1"/>
+          </p:cNvPicPr>
+          <p:nvPr/>
+        </p:nvPicPr>
+        <p:blipFill>
+          <a:blip r:embed="rId3"/>
+          <a:stretch>
+            <a:fillRect/>
+          </a:stretch>
+        </p:blipFill>
+        <p:spPr>
+          <a:xfrm>
+            <a:off x="6188419" y="4348163"/>
+            <a:ext cx="4719639" cy="2052638"/>
+          </a:xfrm>
+          <a:prstGeom prst="rect">
+            <a:avLst/>
+          </a:prstGeom>
+        </p:spPr>
+      </p:pic>
+    </p:spTree>
+    <p:extLst>
+      <p:ext uri="{BB962C8B-B14F-4D97-AF65-F5344CB8AC3E}">
+        <p14:creationId xmlns:p14="http://schemas.microsoft.com/office/powerpoint/2010/main" val="2992001403"/>
+      </p:ext>
+    </p:extLst>
+  </p:cSld>
+  <p:clrMapOvr>
+    <a:masterClrMapping/>
+  </p:clrMapOvr>
+  <p:timing>
+    <p:tnLst>
+      <p:par>
+        <p:cTn id="1" dur="indefinite" restart="never" nodeType="tmRoot">
+          <p:childTnLst>
+            <p:seq concurrent="1" nextAc="seek">
+              <p:cTn id="2" dur="indefinite" nodeType="mainSeq">
+                <p:childTnLst>
+                  <p:par>
+                    <p:cTn id="3" fill="hold">
+                      <p:stCondLst>
+                        <p:cond delay="indefinite"/>
+                      </p:stCondLst>
+                      <p:childTnLst>
+                        <p:par>
+                          <p:cTn id="4" fill="hold">
+                            <p:stCondLst>
+                              <p:cond delay="0"/>
+                            </p:stCondLst>
+                            <p:childTnLst>
+                              <p:par>
+                                <p:cTn id="5" presetID="10" presetClass="entr" presetSubtype="0" fill="hold" nodeType="clickEffect">
+                                  <p:stCondLst>
+                                    <p:cond delay="0"/>
+                                  </p:stCondLst>
+                                  <p:childTnLst>
+                                    <p:set>
+                                      <p:cBhvr>
+                                        <p:cTn id="6" dur="1" fill="hold">
+                                          <p:stCondLst>
+                                            <p:cond delay="0"/>
+                                          </p:stCondLst>
+                                        </p:cTn>
+                                        <p:tgtEl>
+                                          <p:spTgt spid="3">
+                                            <p:txEl>
+                                              <p:pRg st="0" end="0"/>
+                                            </p:txEl>
+                                          </p:spTgt>
+                                        </p:tgtEl>
+                                        <p:attrNameLst>
+                                          <p:attrName>style.visibility</p:attrName>
+                                        </p:attrNameLst>
+                                      </p:cBhvr>
+                                      <p:to>
+                                        <p:strVal val="visible"/>
+                                      </p:to>
+                                    </p:set>
+                                    <p:animEffect transition="in" filter="fade">
+                                      <p:cBhvr>
+                                        <p:cTn id="7" dur="500"/>
+                                        <p:tgtEl>
+                                          <p:spTgt spid="3">
+                                            <p:txEl>
+                                              <p:pRg st="0" end="0"/>
+                                            </p:txEl>
+                                          </p:spTgt>
+                                        </p:tgtEl>
+                                      </p:cBhvr>
+                                    </p:animEffect>
+                                  </p:childTnLst>
+                                </p:cTn>
+                              </p:par>
+                            </p:childTnLst>
+                          </p:cTn>
+                        </p:par>
+                      </p:childTnLst>
+                    </p:cTn>
+                  </p:par>
+                  <p:par>
+                    <p:cTn id="8" fill="hold">
+                      <p:stCondLst>
+                        <p:cond delay="indefinite"/>
+                      </p:stCondLst>
+                      <p:childTnLst>
+                        <p:par>
+                          <p:cTn id="9" fill="hold">
+                            <p:stCondLst>
+                              <p:cond delay="0"/>
+                            </p:stCondLst>
+                            <p:childTnLst>
+                              <p:par>
+                                <p:cTn id="10" presetID="10" presetClass="entr" presetSubtype="0" fill="hold" nodeType="clickEffect">
+                                  <p:stCondLst>
+                                    <p:cond delay="0"/>
+                                  </p:stCondLst>
+                                  <p:childTnLst>
+                                    <p:set>
+                                      <p:cBhvr>
+                                        <p:cTn id="11" dur="1" fill="hold">
+                                          <p:stCondLst>
+                                            <p:cond delay="0"/>
+                                          </p:stCondLst>
+                                        </p:cTn>
+                                        <p:tgtEl>
+                                          <p:spTgt spid="3">
+                                            <p:txEl>
+                                              <p:pRg st="1" end="1"/>
+                                            </p:txEl>
+                                          </p:spTgt>
+                                        </p:tgtEl>
+                                        <p:attrNameLst>
+                                          <p:attrName>style.visibility</p:attrName>
+                                        </p:attrNameLst>
+                                      </p:cBhvr>
+                                      <p:to>
+                                        <p:strVal val="visible"/>
+                                      </p:to>
+                                    </p:set>
+                                    <p:animEffect transition="in" filter="fade">
+                                      <p:cBhvr>
+                                        <p:cTn id="12" dur="500"/>
+                                        <p:tgtEl>
+                                          <p:spTgt spid="3">
+                                            <p:txEl>
+                                              <p:pRg st="1" end="1"/>
+                                            </p:txEl>
+                                          </p:spTgt>
+                                        </p:tgtEl>
+                                      </p:cBhvr>
+                                    </p:animEffect>
+                                  </p:childTnLst>
+                                </p:cTn>
+                              </p:par>
+                            </p:childTnLst>
+                          </p:cTn>
+                        </p:par>
+                        <p:par>
+                          <p:cTn id="13" fill="hold">
+                            <p:stCondLst>
+                              <p:cond delay="500"/>
+                            </p:stCondLst>
+                            <p:childTnLst>
+                              <p:par>
+                                <p:cTn id="14" presetID="10" presetClass="entr" presetSubtype="0" fill="hold" nodeType="afterEffect">
+                                  <p:stCondLst>
+                                    <p:cond delay="0"/>
+                                  </p:stCondLst>
+                                  <p:childTnLst>
+                                    <p:set>
+                                      <p:cBhvr>
+                                        <p:cTn id="15" dur="1" fill="hold">
+                                          <p:stCondLst>
+                                            <p:cond delay="0"/>
+                                          </p:stCondLst>
+                                        </p:cTn>
+                                        <p:tgtEl>
+                                          <p:spTgt spid="5"/>
+                                        </p:tgtEl>
+                                        <p:attrNameLst>
+                                          <p:attrName>style.visibility</p:attrName>
+                                        </p:attrNameLst>
+                                      </p:cBhvr>
+                                      <p:to>
+                                        <p:strVal val="visible"/>
+                                      </p:to>
+                                    </p:set>
+                                    <p:animEffect transition="in" filter="fade">
+                                      <p:cBhvr>
+                                        <p:cTn id="16" dur="500"/>
+                                        <p:tgtEl>
+                                          <p:spTgt spid="5"/>
+                                        </p:tgtEl>
+                                      </p:cBhvr>
+                                    </p:animEffect>
+                                  </p:childTnLst>
+                                </p:cTn>
+                              </p:par>
+                            </p:childTnLst>
+                          </p:cTn>
+                        </p:par>
+                      </p:childTnLst>
+                    </p:cTn>
+                  </p:par>
+                  <p:par>
+                    <p:cTn id="17" fill="hold">
+                      <p:stCondLst>
+                        <p:cond delay="indefinite"/>
+                      </p:stCondLst>
+                      <p:childTnLst>
+                        <p:par>
+                          <p:cTn id="18" fill="hold">
+                            <p:stCondLst>
+                              <p:cond delay="0"/>
+                            </p:stCondLst>
+                            <p:childTnLst>
+                              <p:par>
+                                <p:cTn id="19" presetID="10" presetClass="entr" presetSubtype="0" fill="hold" nodeType="clickEffect">
+                                  <p:stCondLst>
+                                    <p:cond delay="0"/>
+                                  </p:stCondLst>
+                                  <p:childTnLst>
+                                    <p:set>
+                                      <p:cBhvr>
+                                        <p:cTn id="20" dur="1" fill="hold">
+                                          <p:stCondLst>
+                                            <p:cond delay="0"/>
+                                          </p:stCondLst>
+                                        </p:cTn>
+                                        <p:tgtEl>
+                                          <p:spTgt spid="3">
+                                            <p:txEl>
+                                              <p:pRg st="2" end="2"/>
+                                            </p:txEl>
+                                          </p:spTgt>
+                                        </p:tgtEl>
+                                        <p:attrNameLst>
+                                          <p:attrName>style.visibility</p:attrName>
+                                        </p:attrNameLst>
+                                      </p:cBhvr>
+                                      <p:to>
+                                        <p:strVal val="visible"/>
+                                      </p:to>
+                                    </p:set>
+                                    <p:animEffect transition="in" filter="fade">
+                                      <p:cBhvr>
+                                        <p:cTn id="21" dur="500"/>
+                                        <p:tgtEl>
+                                          <p:spTgt spid="3">
+                                            <p:txEl>
+                                              <p:pRg st="2" end="2"/>
+                                            </p:txEl>
+                                          </p:spTgt>
+                                        </p:tgtEl>
+                                      </p:cBhvr>
+                                    </p:animEffect>
+                                  </p:childTnLst>
+                                </p:cTn>
+                              </p:par>
+                              <p:par>
+                                <p:cTn id="22" presetID="10" presetClass="entr" presetSubtype="0" fill="hold" nodeType="withEffect">
+                                  <p:stCondLst>
+                                    <p:cond delay="0"/>
+                                  </p:stCondLst>
+                                  <p:childTnLst>
+                                    <p:set>
+                                      <p:cBhvr>
+                                        <p:cTn id="23" dur="1" fill="hold">
+                                          <p:stCondLst>
+                                            <p:cond delay="0"/>
+                                          </p:stCondLst>
+                                        </p:cTn>
+                                        <p:tgtEl>
+                                          <p:spTgt spid="6"/>
+                                        </p:tgtEl>
+                                        <p:attrNameLst>
+                                          <p:attrName>style.visibility</p:attrName>
+                                        </p:attrNameLst>
+                                      </p:cBhvr>
+                                      <p:to>
+                                        <p:strVal val="visible"/>
+                                      </p:to>
+                                    </p:set>
+                                    <p:animEffect transition="in" filter="fade">
+                                      <p:cBhvr>
+                                        <p:cTn id="24" dur="500"/>
+                                        <p:tgtEl>
+                                          <p:spTgt spid="6"/>
+                                        </p:tgtEl>
+                                      </p:cBhvr>
+                                    </p:animEffect>
+                                  </p:childTnLst>
+                                </p:cTn>
+                              </p:par>
+                            </p:childTnLst>
+                          </p:cTn>
+                        </p:par>
+                      </p:childTnLst>
+                    </p:cTn>
+                  </p:par>
+                </p:childTnLst>
+              </p:cTn>
+              <p:prevCondLst>
+                <p:cond evt="onPrev" delay="0">
+                  <p:tgtEl>
+                    <p:sldTgt/>
+                  </p:tgtEl>
+                </p:cond>
+              </p:prevCondLst>
+              <p:nextCondLst>
+                <p:cond evt="onNext" delay="0">
+                  <p:tgtEl>
+                    <p:sldTgt/>
+                  </p:tgtEl>
+                </p:cond>
+              </p:nextCondLst>
+            </p:seq>
+          </p:childTnLst>
+        </p:cTn>
+      </p:par>
+    </p:tnLst>
+  </p:timing>
 </p:sld>
 </file>
 

</xml_diff>

<commit_message>
Minor Removed demo slides, since I can't do the demo on my work laptop.
</commit_message>
<xml_diff>
--- a/presentation/presentation.pptx
+++ b/presentation/presentation.pptx
@@ -6,52 +6,50 @@
     <p:sldMasterId id="2147483660" r:id="rId2"/>
   </p:sldMasterIdLst>
   <p:notesMasterIdLst>
-    <p:notesMasterId r:id="rId46"/>
+    <p:notesMasterId r:id="rId44"/>
   </p:notesMasterIdLst>
   <p:sldIdLst>
     <p:sldId id="256" r:id="rId3"/>
     <p:sldId id="259" r:id="rId4"/>
     <p:sldId id="260" r:id="rId5"/>
-    <p:sldId id="304" r:id="rId6"/>
-    <p:sldId id="261" r:id="rId7"/>
-    <p:sldId id="262" r:id="rId8"/>
-    <p:sldId id="263" r:id="rId9"/>
-    <p:sldId id="264" r:id="rId10"/>
-    <p:sldId id="265" r:id="rId11"/>
-    <p:sldId id="267" r:id="rId12"/>
-    <p:sldId id="270" r:id="rId13"/>
-    <p:sldId id="268" r:id="rId14"/>
-    <p:sldId id="269" r:id="rId15"/>
-    <p:sldId id="303" r:id="rId16"/>
-    <p:sldId id="280" r:id="rId17"/>
-    <p:sldId id="273" r:id="rId18"/>
-    <p:sldId id="276" r:id="rId19"/>
-    <p:sldId id="277" r:id="rId20"/>
-    <p:sldId id="278" r:id="rId21"/>
-    <p:sldId id="279" r:id="rId22"/>
-    <p:sldId id="281" r:id="rId23"/>
-    <p:sldId id="282" r:id="rId24"/>
-    <p:sldId id="283" r:id="rId25"/>
-    <p:sldId id="293" r:id="rId26"/>
-    <p:sldId id="294" r:id="rId27"/>
-    <p:sldId id="284" r:id="rId28"/>
-    <p:sldId id="285" r:id="rId29"/>
-    <p:sldId id="287" r:id="rId30"/>
-    <p:sldId id="286" r:id="rId31"/>
-    <p:sldId id="288" r:id="rId32"/>
-    <p:sldId id="292" r:id="rId33"/>
-    <p:sldId id="289" r:id="rId34"/>
-    <p:sldId id="290" r:id="rId35"/>
-    <p:sldId id="291" r:id="rId36"/>
-    <p:sldId id="295" r:id="rId37"/>
-    <p:sldId id="297" r:id="rId38"/>
-    <p:sldId id="298" r:id="rId39"/>
-    <p:sldId id="296" r:id="rId40"/>
-    <p:sldId id="299" r:id="rId41"/>
-    <p:sldId id="300" r:id="rId42"/>
-    <p:sldId id="301" r:id="rId43"/>
-    <p:sldId id="305" r:id="rId44"/>
-    <p:sldId id="302" r:id="rId45"/>
+    <p:sldId id="261" r:id="rId6"/>
+    <p:sldId id="262" r:id="rId7"/>
+    <p:sldId id="263" r:id="rId8"/>
+    <p:sldId id="264" r:id="rId9"/>
+    <p:sldId id="265" r:id="rId10"/>
+    <p:sldId id="267" r:id="rId11"/>
+    <p:sldId id="270" r:id="rId12"/>
+    <p:sldId id="268" r:id="rId13"/>
+    <p:sldId id="269" r:id="rId14"/>
+    <p:sldId id="303" r:id="rId15"/>
+    <p:sldId id="280" r:id="rId16"/>
+    <p:sldId id="273" r:id="rId17"/>
+    <p:sldId id="276" r:id="rId18"/>
+    <p:sldId id="277" r:id="rId19"/>
+    <p:sldId id="278" r:id="rId20"/>
+    <p:sldId id="279" r:id="rId21"/>
+    <p:sldId id="281" r:id="rId22"/>
+    <p:sldId id="282" r:id="rId23"/>
+    <p:sldId id="283" r:id="rId24"/>
+    <p:sldId id="293" r:id="rId25"/>
+    <p:sldId id="294" r:id="rId26"/>
+    <p:sldId id="284" r:id="rId27"/>
+    <p:sldId id="285" r:id="rId28"/>
+    <p:sldId id="287" r:id="rId29"/>
+    <p:sldId id="286" r:id="rId30"/>
+    <p:sldId id="288" r:id="rId31"/>
+    <p:sldId id="292" r:id="rId32"/>
+    <p:sldId id="289" r:id="rId33"/>
+    <p:sldId id="290" r:id="rId34"/>
+    <p:sldId id="291" r:id="rId35"/>
+    <p:sldId id="295" r:id="rId36"/>
+    <p:sldId id="297" r:id="rId37"/>
+    <p:sldId id="298" r:id="rId38"/>
+    <p:sldId id="296" r:id="rId39"/>
+    <p:sldId id="299" r:id="rId40"/>
+    <p:sldId id="300" r:id="rId41"/>
+    <p:sldId id="301" r:id="rId42"/>
+    <p:sldId id="302" r:id="rId43"/>
   </p:sldIdLst>
   <p:sldSz cx="12192000" cy="6858000"/>
   <p:notesSz cx="6858000" cy="9144000"/>
@@ -162,7 +160,6 @@
           <p14:sldIdLst>
             <p14:sldId id="259"/>
             <p14:sldId id="260"/>
-            <p14:sldId id="304"/>
           </p14:sldIdLst>
         </p14:section>
         <p14:section name="A Problem Statement" id="{9C193E4B-B7CA-425A-BB89-FA54529671C9}">
@@ -224,7 +221,6 @@
             <p14:sldId id="299"/>
             <p14:sldId id="300"/>
             <p14:sldId id="301"/>
-            <p14:sldId id="305"/>
           </p14:sldIdLst>
         </p14:section>
         <p14:section name="A Q&amp;A Session" id="{5FBB5FF9-8AD7-434B-821A-52152BE7B765}">
@@ -2709,7 +2705,7 @@
           <a:p>
             <a:fld id="{A5C20BB3-3CCB-4FE5-991B-82F6BCB48AF3}" type="datetimeFigureOut">
               <a:rPr lang="en-US" smtClean="0"/>
-              <a:t>3/7/2019</a:t>
+              <a:t>3/22/2019</a:t>
             </a:fld>
             <a:endParaRPr lang="en-US"/>
           </a:p>
@@ -3058,7 +3054,7 @@
           <a:p>
             <a:fld id="{E0746DE6-3336-457D-A091-FA20AC1C536E}" type="slidenum">
               <a:rPr lang="en-US" smtClean="0"/>
-              <a:t>11</a:t>
+              <a:t>10</a:t>
             </a:fld>
             <a:endParaRPr lang="en-US"/>
           </a:p>
@@ -3229,7 +3225,7 @@
           <a:p>
             <a:fld id="{E0746DE6-3336-457D-A091-FA20AC1C536E}" type="slidenum">
               <a:rPr lang="en-US" smtClean="0"/>
-              <a:t>21</a:t>
+              <a:t>20</a:t>
             </a:fld>
             <a:endParaRPr lang="en-US"/>
           </a:p>
@@ -3352,7 +3348,7 @@
           <a:p>
             <a:fld id="{E0746DE6-3336-457D-A091-FA20AC1C536E}" type="slidenum">
               <a:rPr lang="en-US" smtClean="0"/>
-              <a:t>12</a:t>
+              <a:t>11</a:t>
             </a:fld>
             <a:endParaRPr lang="en-US"/>
           </a:p>
@@ -3523,7 +3519,7 @@
           <a:p>
             <a:fld id="{E0746DE6-3336-457D-A091-FA20AC1C536E}" type="slidenum">
               <a:rPr lang="en-US" smtClean="0"/>
-              <a:t>13</a:t>
+              <a:t>12</a:t>
             </a:fld>
             <a:endParaRPr lang="en-US"/>
           </a:p>
@@ -3614,7 +3610,7 @@
           <a:p>
             <a:fld id="{E0746DE6-3336-457D-A091-FA20AC1C536E}" type="slidenum">
               <a:rPr lang="en-US" smtClean="0"/>
-              <a:t>15</a:t>
+              <a:t>14</a:t>
             </a:fld>
             <a:endParaRPr lang="en-US"/>
           </a:p>
@@ -3702,7 +3698,7 @@
           <a:p>
             <a:fld id="{E0746DE6-3336-457D-A091-FA20AC1C536E}" type="slidenum">
               <a:rPr lang="en-US" smtClean="0"/>
-              <a:t>16</a:t>
+              <a:t>15</a:t>
             </a:fld>
             <a:endParaRPr lang="en-US"/>
           </a:p>
@@ -3790,7 +3786,7 @@
           <a:p>
             <a:fld id="{E0746DE6-3336-457D-A091-FA20AC1C536E}" type="slidenum">
               <a:rPr lang="en-US" smtClean="0"/>
-              <a:t>17</a:t>
+              <a:t>16</a:t>
             </a:fld>
             <a:endParaRPr lang="en-US"/>
           </a:p>
@@ -3878,7 +3874,7 @@
           <a:p>
             <a:fld id="{E0746DE6-3336-457D-A091-FA20AC1C536E}" type="slidenum">
               <a:rPr lang="en-US" smtClean="0"/>
-              <a:t>18</a:t>
+              <a:t>17</a:t>
             </a:fld>
             <a:endParaRPr lang="en-US"/>
           </a:p>
@@ -3966,7 +3962,7 @@
           <a:p>
             <a:fld id="{E0746DE6-3336-457D-A091-FA20AC1C536E}" type="slidenum">
               <a:rPr lang="en-US" smtClean="0"/>
-              <a:t>19</a:t>
+              <a:t>18</a:t>
             </a:fld>
             <a:endParaRPr lang="en-US"/>
           </a:p>
@@ -4054,7 +4050,7 @@
           <a:p>
             <a:fld id="{E0746DE6-3336-457D-A091-FA20AC1C536E}" type="slidenum">
               <a:rPr lang="en-US" smtClean="0"/>
-              <a:t>20</a:t>
+              <a:t>19</a:t>
             </a:fld>
             <a:endParaRPr lang="en-US"/>
           </a:p>
@@ -4319,7 +4315,7 @@
             <a:fld id="{B61BEF0D-F0BB-DE4B-95CE-6DB70DBA9567}" type="datetimeFigureOut">
               <a:rPr lang="en-US" dirty="0"/>
               <a:pPr/>
-              <a:t>3/7/2019</a:t>
+              <a:t>3/22/2019</a:t>
             </a:fld>
             <a:endParaRPr lang="en-US" dirty="0"/>
           </a:p>
@@ -4583,7 +4579,7 @@
             <a:fld id="{B61BEF0D-F0BB-DE4B-95CE-6DB70DBA9567}" type="datetimeFigureOut">
               <a:rPr lang="en-US" dirty="0"/>
               <a:pPr/>
-              <a:t>3/7/2019</a:t>
+              <a:t>3/22/2019</a:t>
             </a:fld>
             <a:endParaRPr lang="en-US" dirty="0"/>
           </a:p>
@@ -4820,7 +4816,7 @@
             <a:fld id="{B61BEF0D-F0BB-DE4B-95CE-6DB70DBA9567}" type="datetimeFigureOut">
               <a:rPr lang="en-US" dirty="0"/>
               <a:pPr/>
-              <a:t>3/7/2019</a:t>
+              <a:t>3/22/2019</a:t>
             </a:fld>
             <a:endParaRPr lang="en-US" dirty="0"/>
           </a:p>
@@ -5050,7 +5046,7 @@
           <a:p>
             <a:fld id="{5F9E72CA-C8DB-4FE1-9619-3E0CC03F8A15}" type="datetimeFigureOut">
               <a:rPr lang="en-US" smtClean="0"/>
-              <a:t>3/7/2019</a:t>
+              <a:t>3/22/2019</a:t>
             </a:fld>
             <a:endParaRPr lang="en-US"/>
           </a:p>
@@ -5248,7 +5244,7 @@
           <a:p>
             <a:fld id="{5F9E72CA-C8DB-4FE1-9619-3E0CC03F8A15}" type="datetimeFigureOut">
               <a:rPr lang="en-US" smtClean="0"/>
-              <a:t>3/7/2019</a:t>
+              <a:t>3/22/2019</a:t>
             </a:fld>
             <a:endParaRPr lang="en-US"/>
           </a:p>
@@ -5523,7 +5519,7 @@
           <a:p>
             <a:fld id="{5F9E72CA-C8DB-4FE1-9619-3E0CC03F8A15}" type="datetimeFigureOut">
               <a:rPr lang="en-US" smtClean="0"/>
-              <a:t>3/7/2019</a:t>
+              <a:t>3/22/2019</a:t>
             </a:fld>
             <a:endParaRPr lang="en-US"/>
           </a:p>
@@ -5788,7 +5784,7 @@
           <a:p>
             <a:fld id="{5F9E72CA-C8DB-4FE1-9619-3E0CC03F8A15}" type="datetimeFigureOut">
               <a:rPr lang="en-US" smtClean="0"/>
-              <a:t>3/7/2019</a:t>
+              <a:t>3/22/2019</a:t>
             </a:fld>
             <a:endParaRPr lang="en-US"/>
           </a:p>
@@ -6200,7 +6196,7 @@
           <a:p>
             <a:fld id="{5F9E72CA-C8DB-4FE1-9619-3E0CC03F8A15}" type="datetimeFigureOut">
               <a:rPr lang="en-US" smtClean="0"/>
-              <a:t>3/7/2019</a:t>
+              <a:t>3/22/2019</a:t>
             </a:fld>
             <a:endParaRPr lang="en-US"/>
           </a:p>
@@ -6341,7 +6337,7 @@
           <a:p>
             <a:fld id="{5F9E72CA-C8DB-4FE1-9619-3E0CC03F8A15}" type="datetimeFigureOut">
               <a:rPr lang="en-US" smtClean="0"/>
-              <a:t>3/7/2019</a:t>
+              <a:t>3/22/2019</a:t>
             </a:fld>
             <a:endParaRPr lang="en-US"/>
           </a:p>
@@ -6454,7 +6450,7 @@
           <a:p>
             <a:fld id="{5F9E72CA-C8DB-4FE1-9619-3E0CC03F8A15}" type="datetimeFigureOut">
               <a:rPr lang="en-US" smtClean="0"/>
-              <a:t>3/7/2019</a:t>
+              <a:t>3/22/2019</a:t>
             </a:fld>
             <a:endParaRPr lang="en-US"/>
           </a:p>
@@ -6765,7 +6761,7 @@
           <a:p>
             <a:fld id="{5F9E72CA-C8DB-4FE1-9619-3E0CC03F8A15}" type="datetimeFigureOut">
               <a:rPr lang="en-US" smtClean="0"/>
-              <a:t>3/7/2019</a:t>
+              <a:t>3/22/2019</a:t>
             </a:fld>
             <a:endParaRPr lang="en-US"/>
           </a:p>
@@ -6997,7 +6993,7 @@
             <a:fld id="{B61BEF0D-F0BB-DE4B-95CE-6DB70DBA9567}" type="datetimeFigureOut">
               <a:rPr lang="en-US" dirty="0"/>
               <a:pPr/>
-              <a:t>3/7/2019</a:t>
+              <a:t>3/22/2019</a:t>
             </a:fld>
             <a:endParaRPr lang="en-US" dirty="0"/>
           </a:p>
@@ -7279,7 +7275,7 @@
           <a:p>
             <a:fld id="{5F9E72CA-C8DB-4FE1-9619-3E0CC03F8A15}" type="datetimeFigureOut">
               <a:rPr lang="en-US" smtClean="0"/>
-              <a:t>3/7/2019</a:t>
+              <a:t>3/22/2019</a:t>
             </a:fld>
             <a:endParaRPr lang="en-US"/>
           </a:p>
@@ -7477,7 +7473,7 @@
           <a:p>
             <a:fld id="{5F9E72CA-C8DB-4FE1-9619-3E0CC03F8A15}" type="datetimeFigureOut">
               <a:rPr lang="en-US" smtClean="0"/>
-              <a:t>3/7/2019</a:t>
+              <a:t>3/22/2019</a:t>
             </a:fld>
             <a:endParaRPr lang="en-US"/>
           </a:p>
@@ -7685,7 +7681,7 @@
           <a:p>
             <a:fld id="{5F9E72CA-C8DB-4FE1-9619-3E0CC03F8A15}" type="datetimeFigureOut">
               <a:rPr lang="en-US" smtClean="0"/>
-              <a:t>3/7/2019</a:t>
+              <a:t>3/22/2019</a:t>
             </a:fld>
             <a:endParaRPr lang="en-US"/>
           </a:p>
@@ -8000,7 +7996,7 @@
             <a:fld id="{B61BEF0D-F0BB-DE4B-95CE-6DB70DBA9567}" type="datetimeFigureOut">
               <a:rPr lang="en-US" dirty="0"/>
               <a:pPr/>
-              <a:t>3/7/2019</a:t>
+              <a:t>3/22/2019</a:t>
             </a:fld>
             <a:endParaRPr lang="en-US" dirty="0"/>
           </a:p>
@@ -8304,7 +8300,7 @@
             <a:fld id="{B61BEF0D-F0BB-DE4B-95CE-6DB70DBA9567}" type="datetimeFigureOut">
               <a:rPr lang="en-US" dirty="0"/>
               <a:pPr/>
-              <a:t>3/7/2019</a:t>
+              <a:t>3/22/2019</a:t>
             </a:fld>
             <a:endParaRPr lang="en-US" dirty="0"/>
           </a:p>
@@ -8728,7 +8724,7 @@
             <a:fld id="{B61BEF0D-F0BB-DE4B-95CE-6DB70DBA9567}" type="datetimeFigureOut">
               <a:rPr lang="en-US" dirty="0"/>
               <a:pPr/>
-              <a:t>3/7/2019</a:t>
+              <a:t>3/22/2019</a:t>
             </a:fld>
             <a:endParaRPr lang="en-US" dirty="0"/>
           </a:p>
@@ -8892,7 +8888,7 @@
             <a:fld id="{B61BEF0D-F0BB-DE4B-95CE-6DB70DBA9567}" type="datetimeFigureOut">
               <a:rPr lang="en-US" dirty="0"/>
               <a:pPr/>
-              <a:t>3/7/2019</a:t>
+              <a:t>3/22/2019</a:t>
             </a:fld>
             <a:endParaRPr lang="en-US" dirty="0"/>
           </a:p>
@@ -8989,7 +8985,7 @@
             <a:fld id="{B61BEF0D-F0BB-DE4B-95CE-6DB70DBA9567}" type="datetimeFigureOut">
               <a:rPr lang="en-US" dirty="0"/>
               <a:pPr/>
-              <a:t>3/7/2019</a:t>
+              <a:t>3/22/2019</a:t>
             </a:fld>
             <a:endParaRPr lang="en-US" dirty="0"/>
           </a:p>
@@ -9369,7 +9365,7 @@
             <a:fld id="{B61BEF0D-F0BB-DE4B-95CE-6DB70DBA9567}" type="datetimeFigureOut">
               <a:rPr lang="en-US" dirty="0"/>
               <a:pPr/>
-              <a:t>3/7/2019</a:t>
+              <a:t>3/22/2019</a:t>
             </a:fld>
             <a:endParaRPr lang="en-US" dirty="0"/>
           </a:p>
@@ -9660,7 +9656,7 @@
             <a:fld id="{B61BEF0D-F0BB-DE4B-95CE-6DB70DBA9567}" type="datetimeFigureOut">
               <a:rPr lang="en-US" dirty="0"/>
               <a:pPr/>
-              <a:t>3/7/2019</a:t>
+              <a:t>3/22/2019</a:t>
             </a:fld>
             <a:endParaRPr lang="en-US" dirty="0"/>
           </a:p>
@@ -9873,7 +9869,7 @@
             <a:fld id="{B61BEF0D-F0BB-DE4B-95CE-6DB70DBA9567}" type="datetimeFigureOut">
               <a:rPr lang="en-US" dirty="0"/>
               <a:pPr/>
-              <a:t>3/7/2019</a:t>
+              <a:t>3/22/2019</a:t>
             </a:fld>
             <a:endParaRPr lang="en-US" dirty="0"/>
           </a:p>
@@ -10626,7 +10622,7 @@
           <a:p>
             <a:fld id="{5F9E72CA-C8DB-4FE1-9619-3E0CC03F8A15}" type="datetimeFigureOut">
               <a:rPr lang="en-US" smtClean="0"/>
-              <a:t>3/7/2019</a:t>
+              <a:t>3/22/2019</a:t>
             </a:fld>
             <a:endParaRPr lang="en-US"/>
           </a:p>
@@ -11062,7 +11058,7 @@
                 <a16:creationId xmlns:a16="http://schemas.microsoft.com/office/drawing/2014/main" id="{5B32A67F-3598-4A13-8552-DA884FFCCE57}"/>
               </a:ext>
               <a:ext uri="{C183D7F6-B498-43B3-948B-1728B52AA6E4}">
-                <adec:decorative xmlns:adec="http://schemas.microsoft.com/office/drawing/2017/decorative" val="1"/>
+                <adec:decorative xmlns:adec="http://schemas.microsoft.com/office/drawing/2017/decorative" xmlns="" val="1"/>
               </a:ext>
             </a:extLst>
           </p:cNvPr>
@@ -11208,7 +11204,7 @@
                 <a16:creationId xmlns:a16="http://schemas.microsoft.com/office/drawing/2014/main" id="{BCC55ACC-A2F6-403C-A3A4-D59B3734D45F}"/>
               </a:ext>
               <a:ext uri="{C183D7F6-B498-43B3-948B-1728B52AA6E4}">
-                <adec:decorative xmlns:adec="http://schemas.microsoft.com/office/drawing/2017/decorative" val="1"/>
+                <adec:decorative xmlns:adec="http://schemas.microsoft.com/office/drawing/2017/decorative" xmlns="" val="1"/>
               </a:ext>
             </a:extLst>
           </p:cNvPr>
@@ -11409,7 +11405,7 @@
                 <a16:creationId xmlns:a16="http://schemas.microsoft.com/office/drawing/2014/main" id="{598EBA13-C937-430B-9523-439FE21096E6}"/>
               </a:ext>
               <a:ext uri="{C183D7F6-B498-43B3-948B-1728B52AA6E4}">
-                <adec:decorative xmlns:adec="http://schemas.microsoft.com/office/drawing/2017/decorative" val="1"/>
+                <adec:decorative xmlns:adec="http://schemas.microsoft.com/office/drawing/2017/decorative" xmlns="" val="1"/>
               </a:ext>
             </a:extLst>
           </p:cNvPr>
@@ -11650,474 +11646,6 @@
 </file>
 
 <file path=ppt/slides/slide10.xml><?xml version="1.0" encoding="utf-8"?>
-<p:sld xmlns:a="http://schemas.openxmlformats.org/drawingml/2006/main" xmlns:r="http://schemas.openxmlformats.org/officeDocument/2006/relationships" xmlns:p="http://schemas.openxmlformats.org/presentationml/2006/main">
-  <p:cSld>
-    <p:spTree>
-      <p:nvGrpSpPr>
-        <p:cNvPr id="1" name=""/>
-        <p:cNvGrpSpPr/>
-        <p:nvPr/>
-      </p:nvGrpSpPr>
-      <p:grpSpPr>
-        <a:xfrm>
-          <a:off x="0" y="0"/>
-          <a:ext cx="0" cy="0"/>
-          <a:chOff x="0" y="0"/>
-          <a:chExt cx="0" cy="0"/>
-        </a:xfrm>
-      </p:grpSpPr>
-      <p:sp>
-        <p:nvSpPr>
-          <p:cNvPr id="2" name="Title 1"/>
-          <p:cNvSpPr>
-            <a:spLocks noGrp="1"/>
-          </p:cNvSpPr>
-          <p:nvPr>
-            <p:ph type="title"/>
-          </p:nvPr>
-        </p:nvSpPr>
-        <p:spPr/>
-        <p:txBody>
-          <a:bodyPr/>
-          <a:lstStyle/>
-          <a:p>
-            <a:r>
-              <a:rPr lang="en-US" dirty="0"/>
-              <a:t>Hello Hypervisor!</a:t>
-            </a:r>
-          </a:p>
-        </p:txBody>
-      </p:sp>
-      <p:sp>
-        <p:nvSpPr>
-          <p:cNvPr id="3" name="Content Placeholder 2"/>
-          <p:cNvSpPr>
-            <a:spLocks noGrp="1"/>
-          </p:cNvSpPr>
-          <p:nvPr>
-            <p:ph idx="1"/>
-          </p:nvPr>
-        </p:nvSpPr>
-        <p:spPr/>
-        <p:txBody>
-          <a:bodyPr>
-            <a:normAutofit fontScale="85000" lnSpcReduction="10000"/>
-          </a:bodyPr>
-          <a:lstStyle/>
-          <a:p>
-            <a:pPr>
-              <a:lnSpc>
-                <a:spcPct val="270000"/>
-              </a:lnSpc>
-            </a:pPr>
-            <a:r>
-              <a:rPr lang="en-US" dirty="0"/>
-              <a:t>Along came Hypervisors</a:t>
-            </a:r>
-          </a:p>
-          <a:p>
-            <a:pPr>
-              <a:lnSpc>
-                <a:spcPct val="270000"/>
-              </a:lnSpc>
-            </a:pPr>
-            <a:r>
-              <a:rPr lang="en-US" dirty="0"/>
-              <a:t>We can now squeeze more out of physical servers</a:t>
-            </a:r>
-          </a:p>
-          <a:p>
-            <a:pPr>
-              <a:lnSpc>
-                <a:spcPct val="270000"/>
-              </a:lnSpc>
-            </a:pPr>
-            <a:r>
-              <a:rPr lang="en-US" dirty="0"/>
-              <a:t>We can still isolate an application to an OS</a:t>
-            </a:r>
-          </a:p>
-          <a:p>
-            <a:pPr>
-              <a:lnSpc>
-                <a:spcPct val="270000"/>
-              </a:lnSpc>
-            </a:pPr>
-            <a:r>
-              <a:rPr lang="en-US" dirty="0"/>
-              <a:t>Yay for VMWare!</a:t>
-            </a:r>
-          </a:p>
-          <a:p>
-            <a:pPr>
-              <a:lnSpc>
-                <a:spcPct val="270000"/>
-              </a:lnSpc>
-            </a:pPr>
-            <a:r>
-              <a:rPr lang="en-US" dirty="0"/>
-              <a:t>But there are some </a:t>
-            </a:r>
-            <a:r>
-              <a:rPr lang="en-US" dirty="0" err="1"/>
-              <a:t>VMWarts</a:t>
-            </a:r>
-            <a:endParaRPr lang="en-US" dirty="0"/>
-          </a:p>
-        </p:txBody>
-      </p:sp>
-    </p:spTree>
-    <p:extLst>
-      <p:ext uri="{BB962C8B-B14F-4D97-AF65-F5344CB8AC3E}">
-        <p14:creationId xmlns:p14="http://schemas.microsoft.com/office/powerpoint/2010/main" val="1446593834"/>
-      </p:ext>
-    </p:extLst>
-  </p:cSld>
-  <p:clrMapOvr>
-    <a:masterClrMapping/>
-  </p:clrMapOvr>
-  <p:timing>
-    <p:tnLst>
-      <p:par>
-        <p:cTn id="1" dur="indefinite" restart="never" nodeType="tmRoot">
-          <p:childTnLst>
-            <p:seq concurrent="1" nextAc="seek">
-              <p:cTn id="2" dur="indefinite" nodeType="mainSeq">
-                <p:childTnLst>
-                  <p:par>
-                    <p:cTn id="3" fill="hold">
-                      <p:stCondLst>
-                        <p:cond delay="indefinite"/>
-                      </p:stCondLst>
-                      <p:childTnLst>
-                        <p:par>
-                          <p:cTn id="4" fill="hold">
-                            <p:stCondLst>
-                              <p:cond delay="0"/>
-                            </p:stCondLst>
-                            <p:childTnLst>
-                              <p:par>
-                                <p:cTn id="5" presetID="10" presetClass="entr" presetSubtype="0" fill="hold" grpId="0" nodeType="clickEffect">
-                                  <p:stCondLst>
-                                    <p:cond delay="0"/>
-                                  </p:stCondLst>
-                                  <p:childTnLst>
-                                    <p:set>
-                                      <p:cBhvr>
-                                        <p:cTn id="6" dur="1" fill="hold">
-                                          <p:stCondLst>
-                                            <p:cond delay="0"/>
-                                          </p:stCondLst>
-                                        </p:cTn>
-                                        <p:tgtEl>
-                                          <p:spTgt spid="3">
-                                            <p:txEl>
-                                              <p:pRg st="0" end="0"/>
-                                            </p:txEl>
-                                          </p:spTgt>
-                                        </p:tgtEl>
-                                        <p:attrNameLst>
-                                          <p:attrName>style.visibility</p:attrName>
-                                        </p:attrNameLst>
-                                      </p:cBhvr>
-                                      <p:to>
-                                        <p:strVal val="visible"/>
-                                      </p:to>
-                                    </p:set>
-                                    <p:animEffect transition="in" filter="fade">
-                                      <p:cBhvr>
-                                        <p:cTn id="7" dur="500"/>
-                                        <p:tgtEl>
-                                          <p:spTgt spid="3">
-                                            <p:txEl>
-                                              <p:pRg st="0" end="0"/>
-                                            </p:txEl>
-                                          </p:spTgt>
-                                        </p:tgtEl>
-                                      </p:cBhvr>
-                                    </p:animEffect>
-                                  </p:childTnLst>
-                                </p:cTn>
-                              </p:par>
-                            </p:childTnLst>
-                          </p:cTn>
-                        </p:par>
-                      </p:childTnLst>
-                    </p:cTn>
-                  </p:par>
-                  <p:par>
-                    <p:cTn id="8" fill="hold">
-                      <p:stCondLst>
-                        <p:cond delay="indefinite"/>
-                      </p:stCondLst>
-                      <p:childTnLst>
-                        <p:par>
-                          <p:cTn id="9" fill="hold">
-                            <p:stCondLst>
-                              <p:cond delay="0"/>
-                            </p:stCondLst>
-                            <p:childTnLst>
-                              <p:par>
-                                <p:cTn id="10" presetID="10" presetClass="entr" presetSubtype="0" fill="hold" grpId="0" nodeType="clickEffect">
-                                  <p:stCondLst>
-                                    <p:cond delay="0"/>
-                                  </p:stCondLst>
-                                  <p:childTnLst>
-                                    <p:set>
-                                      <p:cBhvr>
-                                        <p:cTn id="11" dur="1" fill="hold">
-                                          <p:stCondLst>
-                                            <p:cond delay="0"/>
-                                          </p:stCondLst>
-                                        </p:cTn>
-                                        <p:tgtEl>
-                                          <p:spTgt spid="3">
-                                            <p:txEl>
-                                              <p:pRg st="1" end="1"/>
-                                            </p:txEl>
-                                          </p:spTgt>
-                                        </p:tgtEl>
-                                        <p:attrNameLst>
-                                          <p:attrName>style.visibility</p:attrName>
-                                        </p:attrNameLst>
-                                      </p:cBhvr>
-                                      <p:to>
-                                        <p:strVal val="visible"/>
-                                      </p:to>
-                                    </p:set>
-                                    <p:animEffect transition="in" filter="fade">
-                                      <p:cBhvr>
-                                        <p:cTn id="12" dur="500"/>
-                                        <p:tgtEl>
-                                          <p:spTgt spid="3">
-                                            <p:txEl>
-                                              <p:pRg st="1" end="1"/>
-                                            </p:txEl>
-                                          </p:spTgt>
-                                        </p:tgtEl>
-                                      </p:cBhvr>
-                                    </p:animEffect>
-                                  </p:childTnLst>
-                                </p:cTn>
-                              </p:par>
-                            </p:childTnLst>
-                          </p:cTn>
-                        </p:par>
-                      </p:childTnLst>
-                    </p:cTn>
-                  </p:par>
-                  <p:par>
-                    <p:cTn id="13" fill="hold">
-                      <p:stCondLst>
-                        <p:cond delay="indefinite"/>
-                      </p:stCondLst>
-                      <p:childTnLst>
-                        <p:par>
-                          <p:cTn id="14" fill="hold">
-                            <p:stCondLst>
-                              <p:cond delay="0"/>
-                            </p:stCondLst>
-                            <p:childTnLst>
-                              <p:par>
-                                <p:cTn id="15" presetID="10" presetClass="entr" presetSubtype="0" fill="hold" grpId="0" nodeType="clickEffect">
-                                  <p:stCondLst>
-                                    <p:cond delay="0"/>
-                                  </p:stCondLst>
-                                  <p:childTnLst>
-                                    <p:set>
-                                      <p:cBhvr>
-                                        <p:cTn id="16" dur="1" fill="hold">
-                                          <p:stCondLst>
-                                            <p:cond delay="0"/>
-                                          </p:stCondLst>
-                                        </p:cTn>
-                                        <p:tgtEl>
-                                          <p:spTgt spid="3">
-                                            <p:txEl>
-                                              <p:pRg st="2" end="2"/>
-                                            </p:txEl>
-                                          </p:spTgt>
-                                        </p:tgtEl>
-                                        <p:attrNameLst>
-                                          <p:attrName>style.visibility</p:attrName>
-                                        </p:attrNameLst>
-                                      </p:cBhvr>
-                                      <p:to>
-                                        <p:strVal val="visible"/>
-                                      </p:to>
-                                    </p:set>
-                                    <p:animEffect transition="in" filter="fade">
-                                      <p:cBhvr>
-                                        <p:cTn id="17" dur="500"/>
-                                        <p:tgtEl>
-                                          <p:spTgt spid="3">
-                                            <p:txEl>
-                                              <p:pRg st="2" end="2"/>
-                                            </p:txEl>
-                                          </p:spTgt>
-                                        </p:tgtEl>
-                                      </p:cBhvr>
-                                    </p:animEffect>
-                                  </p:childTnLst>
-                                </p:cTn>
-                              </p:par>
-                            </p:childTnLst>
-                          </p:cTn>
-                        </p:par>
-                      </p:childTnLst>
-                    </p:cTn>
-                  </p:par>
-                  <p:par>
-                    <p:cTn id="18" fill="hold">
-                      <p:stCondLst>
-                        <p:cond delay="indefinite"/>
-                      </p:stCondLst>
-                      <p:childTnLst>
-                        <p:par>
-                          <p:cTn id="19" fill="hold">
-                            <p:stCondLst>
-                              <p:cond delay="0"/>
-                            </p:stCondLst>
-                            <p:childTnLst>
-                              <p:par>
-                                <p:cTn id="20" presetID="10" presetClass="entr" presetSubtype="0" fill="hold" grpId="0" nodeType="clickEffect">
-                                  <p:stCondLst>
-                                    <p:cond delay="0"/>
-                                  </p:stCondLst>
-                                  <p:childTnLst>
-                                    <p:set>
-                                      <p:cBhvr>
-                                        <p:cTn id="21" dur="1" fill="hold">
-                                          <p:stCondLst>
-                                            <p:cond delay="0"/>
-                                          </p:stCondLst>
-                                        </p:cTn>
-                                        <p:tgtEl>
-                                          <p:spTgt spid="3">
-                                            <p:txEl>
-                                              <p:pRg st="3" end="3"/>
-                                            </p:txEl>
-                                          </p:spTgt>
-                                        </p:tgtEl>
-                                        <p:attrNameLst>
-                                          <p:attrName>style.visibility</p:attrName>
-                                        </p:attrNameLst>
-                                      </p:cBhvr>
-                                      <p:to>
-                                        <p:strVal val="visible"/>
-                                      </p:to>
-                                    </p:set>
-                                    <p:animEffect transition="in" filter="fade">
-                                      <p:cBhvr>
-                                        <p:cTn id="22" dur="500"/>
-                                        <p:tgtEl>
-                                          <p:spTgt spid="3">
-                                            <p:txEl>
-                                              <p:pRg st="3" end="3"/>
-                                            </p:txEl>
-                                          </p:spTgt>
-                                        </p:tgtEl>
-                                      </p:cBhvr>
-                                    </p:animEffect>
-                                  </p:childTnLst>
-                                </p:cTn>
-                              </p:par>
-                            </p:childTnLst>
-                          </p:cTn>
-                        </p:par>
-                      </p:childTnLst>
-                    </p:cTn>
-                  </p:par>
-                  <p:par>
-                    <p:cTn id="23" fill="hold">
-                      <p:stCondLst>
-                        <p:cond delay="indefinite"/>
-                      </p:stCondLst>
-                      <p:childTnLst>
-                        <p:par>
-                          <p:cTn id="24" fill="hold">
-                            <p:stCondLst>
-                              <p:cond delay="0"/>
-                            </p:stCondLst>
-                            <p:childTnLst>
-                              <p:par>
-                                <p:cTn id="25" presetID="10" presetClass="entr" presetSubtype="0" fill="hold" grpId="0" nodeType="clickEffect">
-                                  <p:stCondLst>
-                                    <p:cond delay="0"/>
-                                  </p:stCondLst>
-                                  <p:childTnLst>
-                                    <p:set>
-                                      <p:cBhvr>
-                                        <p:cTn id="26" dur="1" fill="hold">
-                                          <p:stCondLst>
-                                            <p:cond delay="0"/>
-                                          </p:stCondLst>
-                                        </p:cTn>
-                                        <p:tgtEl>
-                                          <p:spTgt spid="3">
-                                            <p:txEl>
-                                              <p:pRg st="4" end="4"/>
-                                            </p:txEl>
-                                          </p:spTgt>
-                                        </p:tgtEl>
-                                        <p:attrNameLst>
-                                          <p:attrName>style.visibility</p:attrName>
-                                        </p:attrNameLst>
-                                      </p:cBhvr>
-                                      <p:to>
-                                        <p:strVal val="visible"/>
-                                      </p:to>
-                                    </p:set>
-                                    <p:animEffect transition="in" filter="fade">
-                                      <p:cBhvr>
-                                        <p:cTn id="27" dur="500"/>
-                                        <p:tgtEl>
-                                          <p:spTgt spid="3">
-                                            <p:txEl>
-                                              <p:pRg st="4" end="4"/>
-                                            </p:txEl>
-                                          </p:spTgt>
-                                        </p:tgtEl>
-                                      </p:cBhvr>
-                                    </p:animEffect>
-                                  </p:childTnLst>
-                                </p:cTn>
-                              </p:par>
-                            </p:childTnLst>
-                          </p:cTn>
-                        </p:par>
-                      </p:childTnLst>
-                    </p:cTn>
-                  </p:par>
-                </p:childTnLst>
-              </p:cTn>
-              <p:prevCondLst>
-                <p:cond evt="onPrev" delay="0">
-                  <p:tgtEl>
-                    <p:sldTgt/>
-                  </p:tgtEl>
-                </p:cond>
-              </p:prevCondLst>
-              <p:nextCondLst>
-                <p:cond evt="onNext" delay="0">
-                  <p:tgtEl>
-                    <p:sldTgt/>
-                  </p:tgtEl>
-                </p:cond>
-              </p:nextCondLst>
-            </p:seq>
-          </p:childTnLst>
-        </p:cTn>
-      </p:par>
-    </p:tnLst>
-    <p:bldLst>
-      <p:bldP spid="3" grpId="0" build="p"/>
-    </p:bldLst>
-  </p:timing>
-</p:sld>
-</file>
-
-<file path=ppt/slides/slide11.xml><?xml version="1.0" encoding="utf-8"?>
 <p:sld xmlns:a="http://schemas.openxmlformats.org/drawingml/2006/main" xmlns:r="http://schemas.openxmlformats.org/officeDocument/2006/relationships" xmlns:p="http://schemas.openxmlformats.org/presentationml/2006/main">
   <p:cSld>
     <p:spTree>
@@ -12735,7 +12263,7 @@
 </p:sld>
 </file>
 
-<file path=ppt/slides/slide12.xml><?xml version="1.0" encoding="utf-8"?>
+<file path=ppt/slides/slide11.xml><?xml version="1.0" encoding="utf-8"?>
 <p:sld xmlns:a="http://schemas.openxmlformats.org/drawingml/2006/main" xmlns:r="http://schemas.openxmlformats.org/officeDocument/2006/relationships" xmlns:p="http://schemas.openxmlformats.org/presentationml/2006/main">
   <p:cSld>
     <p:spTree>
@@ -13247,7 +12775,7 @@
 </p:sld>
 </file>
 
-<file path=ppt/slides/slide13.xml><?xml version="1.0" encoding="utf-8"?>
+<file path=ppt/slides/slide12.xml><?xml version="1.0" encoding="utf-8"?>
 <p:sld xmlns:a="http://schemas.openxmlformats.org/drawingml/2006/main" xmlns:r="http://schemas.openxmlformats.org/officeDocument/2006/relationships" xmlns:p="http://schemas.openxmlformats.org/presentationml/2006/main">
   <p:cSld>
     <p:spTree>
@@ -14183,7 +13711,7 @@
 </p:sld>
 </file>
 
-<file path=ppt/slides/slide14.xml><?xml version="1.0" encoding="utf-8"?>
+<file path=ppt/slides/slide13.xml><?xml version="1.0" encoding="utf-8"?>
 <p:sld xmlns:a="http://schemas.openxmlformats.org/drawingml/2006/main" xmlns:r="http://schemas.openxmlformats.org/officeDocument/2006/relationships" xmlns:p="http://schemas.openxmlformats.org/presentationml/2006/main">
   <p:cSld>
     <p:bg>
@@ -14216,7 +13744,7 @@
                 <a16:creationId xmlns:a16="http://schemas.microsoft.com/office/drawing/2014/main" id="{C0B27210-D0CA-4654-B3E3-9ABB4F178EA1}"/>
               </a:ext>
               <a:ext uri="{C183D7F6-B498-43B3-948B-1728B52AA6E4}">
-                <adec:decorative xmlns:adec="http://schemas.microsoft.com/office/drawing/2017/decorative" val="1"/>
+                <adec:decorative xmlns:adec="http://schemas.microsoft.com/office/drawing/2017/decorative" xmlns="" val="1"/>
               </a:ext>
             </a:extLst>
           </p:cNvPr>
@@ -14401,7 +13929,7 @@
                 <a16:creationId xmlns:a16="http://schemas.microsoft.com/office/drawing/2014/main" id="{1DB7C82F-AB7E-4F0C-B829-FA1B9C415180}"/>
               </a:ext>
               <a:ext uri="{C183D7F6-B498-43B3-948B-1728B52AA6E4}">
-                <adec:decorative xmlns:adec="http://schemas.microsoft.com/office/drawing/2017/decorative" val="1"/>
+                <adec:decorative xmlns:adec="http://schemas.microsoft.com/office/drawing/2017/decorative" xmlns="" val="1"/>
               </a:ext>
             </a:extLst>
           </p:cNvPr>
@@ -14568,7 +14096,7 @@
                 <a16:creationId xmlns:a16="http://schemas.microsoft.com/office/drawing/2014/main" id="{70B66945-4967-4040-926D-DCA44313CDAB}"/>
               </a:ext>
               <a:ext uri="{C183D7F6-B498-43B3-948B-1728B52AA6E4}">
-                <adec:decorative xmlns:adec="http://schemas.microsoft.com/office/drawing/2017/decorative" val="1"/>
+                <adec:decorative xmlns:adec="http://schemas.microsoft.com/office/drawing/2017/decorative" xmlns="" val="1"/>
               </a:ext>
             </a:extLst>
           </p:cNvPr>
@@ -14746,7 +14274,7 @@
                 <a14:useLocalDpi xmlns:a14="http://schemas.microsoft.com/office/drawing/2010/main" val="0"/>
               </a:ext>
               <a:ext uri="{837473B0-CC2E-450A-ABE3-18F120FF3D39}">
-                <a1611:picAttrSrcUrl xmlns:a1611="http://schemas.microsoft.com/office/drawing/2016/11/main" r:id="rId3"/>
+                <a1611:picAttrSrcUrl xmlns:a1611="http://schemas.microsoft.com/office/drawing/2016/11/main" xmlns="" r:id="rId3"/>
               </a:ext>
             </a:extLst>
           </a:blip>
@@ -14768,6 +14296,87 @@
     <p:extLst>
       <p:ext uri="{BB962C8B-B14F-4D97-AF65-F5344CB8AC3E}">
         <p14:creationId xmlns:p14="http://schemas.microsoft.com/office/powerpoint/2010/main" val="2757435673"/>
+      </p:ext>
+    </p:extLst>
+  </p:cSld>
+  <p:clrMapOvr>
+    <a:masterClrMapping/>
+  </p:clrMapOvr>
+</p:sld>
+</file>
+
+<file path=ppt/slides/slide14.xml><?xml version="1.0" encoding="utf-8"?>
+<p:sld xmlns:a="http://schemas.openxmlformats.org/drawingml/2006/main" xmlns:r="http://schemas.openxmlformats.org/officeDocument/2006/relationships" xmlns:p="http://schemas.openxmlformats.org/presentationml/2006/main">
+  <p:cSld>
+    <p:spTree>
+      <p:nvGrpSpPr>
+        <p:cNvPr id="1" name=""/>
+        <p:cNvGrpSpPr/>
+        <p:nvPr/>
+      </p:nvGrpSpPr>
+      <p:grpSpPr>
+        <a:xfrm>
+          <a:off x="0" y="0"/>
+          <a:ext cx="0" cy="0"/>
+          <a:chOff x="0" y="0"/>
+          <a:chExt cx="0" cy="0"/>
+        </a:xfrm>
+      </p:grpSpPr>
+      <p:sp>
+        <p:nvSpPr>
+          <p:cNvPr id="4" name="Rounded Rectangle 3"/>
+          <p:cNvSpPr/>
+          <p:nvPr/>
+        </p:nvSpPr>
+        <p:spPr>
+          <a:xfrm>
+            <a:off x="447675" y="876299"/>
+            <a:ext cx="11296650" cy="5591175"/>
+          </a:xfrm>
+          <a:prstGeom prst="roundRect">
+            <a:avLst>
+              <a:gd name="adj" fmla="val 2599"/>
+            </a:avLst>
+          </a:prstGeom>
+          <a:solidFill>
+            <a:schemeClr val="tx1">
+              <a:lumMod val="65000"/>
+              <a:lumOff val="35000"/>
+            </a:schemeClr>
+          </a:solidFill>
+        </p:spPr>
+        <p:style>
+          <a:lnRef idx="2">
+            <a:schemeClr val="accent1">
+              <a:shade val="50000"/>
+            </a:schemeClr>
+          </a:lnRef>
+          <a:fillRef idx="1">
+            <a:schemeClr val="accent1"/>
+          </a:fillRef>
+          <a:effectRef idx="0">
+            <a:schemeClr val="accent1"/>
+          </a:effectRef>
+          <a:fontRef idx="minor">
+            <a:schemeClr val="lt1"/>
+          </a:fontRef>
+        </p:style>
+        <p:txBody>
+          <a:bodyPr rtlCol="0" anchor="b"/>
+          <a:lstStyle/>
+          <a:p>
+            <a:pPr algn="ctr"/>
+            <a:r>
+              <a:rPr lang="en-US" sz="3600" dirty="0"/>
+              <a:t>Physical Server</a:t>
+            </a:r>
+          </a:p>
+        </p:txBody>
+      </p:sp>
+    </p:spTree>
+    <p:extLst>
+      <p:ext uri="{BB962C8B-B14F-4D97-AF65-F5344CB8AC3E}">
+        <p14:creationId xmlns:p14="http://schemas.microsoft.com/office/powerpoint/2010/main" val="3650986029"/>
       </p:ext>
     </p:extLst>
   </p:cSld>
@@ -14845,16 +14454,212 @@
           </a:p>
         </p:txBody>
       </p:sp>
+      <p:sp>
+        <p:nvSpPr>
+          <p:cNvPr id="10" name="Rectangle 9"/>
+          <p:cNvSpPr/>
+          <p:nvPr/>
+        </p:nvSpPr>
+        <p:spPr>
+          <a:xfrm>
+            <a:off x="590548" y="4486274"/>
+            <a:ext cx="2536827" cy="1352551"/>
+          </a:xfrm>
+          <a:prstGeom prst="rect">
+            <a:avLst/>
+          </a:prstGeom>
+          <a:solidFill>
+            <a:srgbClr val="0070C0"/>
+          </a:solidFill>
+        </p:spPr>
+        <p:style>
+          <a:lnRef idx="2">
+            <a:schemeClr val="accent1">
+              <a:shade val="50000"/>
+            </a:schemeClr>
+          </a:lnRef>
+          <a:fillRef idx="1">
+            <a:schemeClr val="accent1"/>
+          </a:fillRef>
+          <a:effectRef idx="0">
+            <a:schemeClr val="accent1"/>
+          </a:effectRef>
+          <a:fontRef idx="minor">
+            <a:schemeClr val="lt1"/>
+          </a:fontRef>
+        </p:style>
+        <p:txBody>
+          <a:bodyPr rtlCol="0" anchor="ctr"/>
+          <a:lstStyle/>
+          <a:p>
+            <a:pPr algn="ctr"/>
+            <a:r>
+              <a:rPr lang="en-US" dirty="0"/>
+              <a:t>App</a:t>
+            </a:r>
+          </a:p>
+        </p:txBody>
+      </p:sp>
+      <p:sp>
+        <p:nvSpPr>
+          <p:cNvPr id="11" name="Rectangle 10"/>
+          <p:cNvSpPr/>
+          <p:nvPr/>
+        </p:nvSpPr>
+        <p:spPr>
+          <a:xfrm>
+            <a:off x="3410477" y="4486274"/>
+            <a:ext cx="2536827" cy="1352551"/>
+          </a:xfrm>
+          <a:prstGeom prst="rect">
+            <a:avLst/>
+          </a:prstGeom>
+          <a:solidFill>
+            <a:srgbClr val="0070C0"/>
+          </a:solidFill>
+        </p:spPr>
+        <p:style>
+          <a:lnRef idx="2">
+            <a:schemeClr val="accent1">
+              <a:shade val="50000"/>
+            </a:schemeClr>
+          </a:lnRef>
+          <a:fillRef idx="1">
+            <a:schemeClr val="accent1"/>
+          </a:fillRef>
+          <a:effectRef idx="0">
+            <a:schemeClr val="accent1"/>
+          </a:effectRef>
+          <a:fontRef idx="minor">
+            <a:schemeClr val="lt1"/>
+          </a:fontRef>
+        </p:style>
+        <p:txBody>
+          <a:bodyPr rtlCol="0" anchor="ctr"/>
+          <a:lstStyle/>
+          <a:p>
+            <a:pPr algn="ctr"/>
+            <a:r>
+              <a:rPr lang="en-US" dirty="0"/>
+              <a:t>App</a:t>
+            </a:r>
+          </a:p>
+        </p:txBody>
+      </p:sp>
+      <p:sp>
+        <p:nvSpPr>
+          <p:cNvPr id="12" name="Rectangle 11"/>
+          <p:cNvSpPr/>
+          <p:nvPr/>
+        </p:nvSpPr>
+        <p:spPr>
+          <a:xfrm>
+            <a:off x="6230406" y="4486274"/>
+            <a:ext cx="2536827" cy="1352551"/>
+          </a:xfrm>
+          <a:prstGeom prst="rect">
+            <a:avLst/>
+          </a:prstGeom>
+          <a:solidFill>
+            <a:srgbClr val="0070C0"/>
+          </a:solidFill>
+        </p:spPr>
+        <p:style>
+          <a:lnRef idx="2">
+            <a:schemeClr val="accent1">
+              <a:shade val="50000"/>
+            </a:schemeClr>
+          </a:lnRef>
+          <a:fillRef idx="1">
+            <a:schemeClr val="accent1"/>
+          </a:fillRef>
+          <a:effectRef idx="0">
+            <a:schemeClr val="accent1"/>
+          </a:effectRef>
+          <a:fontRef idx="minor">
+            <a:schemeClr val="lt1"/>
+          </a:fontRef>
+        </p:style>
+        <p:txBody>
+          <a:bodyPr rtlCol="0" anchor="ctr"/>
+          <a:lstStyle/>
+          <a:p>
+            <a:pPr algn="ctr"/>
+            <a:r>
+              <a:rPr lang="en-US" dirty="0"/>
+              <a:t>App</a:t>
+            </a:r>
+          </a:p>
+        </p:txBody>
+      </p:sp>
+      <p:sp>
+        <p:nvSpPr>
+          <p:cNvPr id="13" name="Rectangle 12"/>
+          <p:cNvSpPr/>
+          <p:nvPr/>
+        </p:nvSpPr>
+        <p:spPr>
+          <a:xfrm>
+            <a:off x="9050336" y="4486274"/>
+            <a:ext cx="2536827" cy="1352551"/>
+          </a:xfrm>
+          <a:prstGeom prst="rect">
+            <a:avLst/>
+          </a:prstGeom>
+          <a:solidFill>
+            <a:srgbClr val="0070C0"/>
+          </a:solidFill>
+        </p:spPr>
+        <p:style>
+          <a:lnRef idx="2">
+            <a:schemeClr val="accent1">
+              <a:shade val="50000"/>
+            </a:schemeClr>
+          </a:lnRef>
+          <a:fillRef idx="1">
+            <a:schemeClr val="accent1"/>
+          </a:fillRef>
+          <a:effectRef idx="0">
+            <a:schemeClr val="accent1"/>
+          </a:effectRef>
+          <a:fontRef idx="minor">
+            <a:schemeClr val="lt1"/>
+          </a:fontRef>
+        </p:style>
+        <p:txBody>
+          <a:bodyPr rtlCol="0" anchor="ctr"/>
+          <a:lstStyle/>
+          <a:p>
+            <a:pPr algn="ctr"/>
+            <a:r>
+              <a:rPr lang="en-US" dirty="0"/>
+              <a:t>App</a:t>
+            </a:r>
+          </a:p>
+        </p:txBody>
+      </p:sp>
     </p:spTree>
     <p:extLst>
       <p:ext uri="{BB962C8B-B14F-4D97-AF65-F5344CB8AC3E}">
-        <p14:creationId xmlns:p14="http://schemas.microsoft.com/office/powerpoint/2010/main" val="3650986029"/>
+        <p14:creationId xmlns:p14="http://schemas.microsoft.com/office/powerpoint/2010/main" val="2507490874"/>
       </p:ext>
     </p:extLst>
   </p:cSld>
   <p:clrMapOvr>
     <a:masterClrMapping/>
   </p:clrMapOvr>
+  <mc:AlternateContent xmlns:mc="http://schemas.openxmlformats.org/markup-compatibility/2006" xmlns:p159="http://schemas.microsoft.com/office/powerpoint/2015/09/main">
+    <mc:Choice Requires="p159">
+      <p:transition xmlns:p14="http://schemas.microsoft.com/office/powerpoint/2010/main" spd="slow" p14:dur="2000">
+        <p159:morph option="byObject"/>
+      </p:transition>
+    </mc:Choice>
+    <mc:Fallback xmlns="">
+      <p:transition spd="slow">
+        <p:fade/>
+      </p:transition>
+    </mc:Fallback>
+  </mc:AlternateContent>
 </p:sld>
 </file>
 
@@ -14928,283 +14733,6 @@
       </p:sp>
       <p:sp>
         <p:nvSpPr>
-          <p:cNvPr id="10" name="Rectangle 9"/>
-          <p:cNvSpPr/>
-          <p:nvPr/>
-        </p:nvSpPr>
-        <p:spPr>
-          <a:xfrm>
-            <a:off x="590548" y="4486274"/>
-            <a:ext cx="2536827" cy="1352551"/>
-          </a:xfrm>
-          <a:prstGeom prst="rect">
-            <a:avLst/>
-          </a:prstGeom>
-          <a:solidFill>
-            <a:srgbClr val="0070C0"/>
-          </a:solidFill>
-        </p:spPr>
-        <p:style>
-          <a:lnRef idx="2">
-            <a:schemeClr val="accent1">
-              <a:shade val="50000"/>
-            </a:schemeClr>
-          </a:lnRef>
-          <a:fillRef idx="1">
-            <a:schemeClr val="accent1"/>
-          </a:fillRef>
-          <a:effectRef idx="0">
-            <a:schemeClr val="accent1"/>
-          </a:effectRef>
-          <a:fontRef idx="minor">
-            <a:schemeClr val="lt1"/>
-          </a:fontRef>
-        </p:style>
-        <p:txBody>
-          <a:bodyPr rtlCol="0" anchor="ctr"/>
-          <a:lstStyle/>
-          <a:p>
-            <a:pPr algn="ctr"/>
-            <a:r>
-              <a:rPr lang="en-US" dirty="0"/>
-              <a:t>App</a:t>
-            </a:r>
-          </a:p>
-        </p:txBody>
-      </p:sp>
-      <p:sp>
-        <p:nvSpPr>
-          <p:cNvPr id="11" name="Rectangle 10"/>
-          <p:cNvSpPr/>
-          <p:nvPr/>
-        </p:nvSpPr>
-        <p:spPr>
-          <a:xfrm>
-            <a:off x="3410477" y="4486274"/>
-            <a:ext cx="2536827" cy="1352551"/>
-          </a:xfrm>
-          <a:prstGeom prst="rect">
-            <a:avLst/>
-          </a:prstGeom>
-          <a:solidFill>
-            <a:srgbClr val="0070C0"/>
-          </a:solidFill>
-        </p:spPr>
-        <p:style>
-          <a:lnRef idx="2">
-            <a:schemeClr val="accent1">
-              <a:shade val="50000"/>
-            </a:schemeClr>
-          </a:lnRef>
-          <a:fillRef idx="1">
-            <a:schemeClr val="accent1"/>
-          </a:fillRef>
-          <a:effectRef idx="0">
-            <a:schemeClr val="accent1"/>
-          </a:effectRef>
-          <a:fontRef idx="minor">
-            <a:schemeClr val="lt1"/>
-          </a:fontRef>
-        </p:style>
-        <p:txBody>
-          <a:bodyPr rtlCol="0" anchor="ctr"/>
-          <a:lstStyle/>
-          <a:p>
-            <a:pPr algn="ctr"/>
-            <a:r>
-              <a:rPr lang="en-US" dirty="0"/>
-              <a:t>App</a:t>
-            </a:r>
-          </a:p>
-        </p:txBody>
-      </p:sp>
-      <p:sp>
-        <p:nvSpPr>
-          <p:cNvPr id="12" name="Rectangle 11"/>
-          <p:cNvSpPr/>
-          <p:nvPr/>
-        </p:nvSpPr>
-        <p:spPr>
-          <a:xfrm>
-            <a:off x="6230406" y="4486274"/>
-            <a:ext cx="2536827" cy="1352551"/>
-          </a:xfrm>
-          <a:prstGeom prst="rect">
-            <a:avLst/>
-          </a:prstGeom>
-          <a:solidFill>
-            <a:srgbClr val="0070C0"/>
-          </a:solidFill>
-        </p:spPr>
-        <p:style>
-          <a:lnRef idx="2">
-            <a:schemeClr val="accent1">
-              <a:shade val="50000"/>
-            </a:schemeClr>
-          </a:lnRef>
-          <a:fillRef idx="1">
-            <a:schemeClr val="accent1"/>
-          </a:fillRef>
-          <a:effectRef idx="0">
-            <a:schemeClr val="accent1"/>
-          </a:effectRef>
-          <a:fontRef idx="minor">
-            <a:schemeClr val="lt1"/>
-          </a:fontRef>
-        </p:style>
-        <p:txBody>
-          <a:bodyPr rtlCol="0" anchor="ctr"/>
-          <a:lstStyle/>
-          <a:p>
-            <a:pPr algn="ctr"/>
-            <a:r>
-              <a:rPr lang="en-US" dirty="0"/>
-              <a:t>App</a:t>
-            </a:r>
-          </a:p>
-        </p:txBody>
-      </p:sp>
-      <p:sp>
-        <p:nvSpPr>
-          <p:cNvPr id="13" name="Rectangle 12"/>
-          <p:cNvSpPr/>
-          <p:nvPr/>
-        </p:nvSpPr>
-        <p:spPr>
-          <a:xfrm>
-            <a:off x="9050336" y="4486274"/>
-            <a:ext cx="2536827" cy="1352551"/>
-          </a:xfrm>
-          <a:prstGeom prst="rect">
-            <a:avLst/>
-          </a:prstGeom>
-          <a:solidFill>
-            <a:srgbClr val="0070C0"/>
-          </a:solidFill>
-        </p:spPr>
-        <p:style>
-          <a:lnRef idx="2">
-            <a:schemeClr val="accent1">
-              <a:shade val="50000"/>
-            </a:schemeClr>
-          </a:lnRef>
-          <a:fillRef idx="1">
-            <a:schemeClr val="accent1"/>
-          </a:fillRef>
-          <a:effectRef idx="0">
-            <a:schemeClr val="accent1"/>
-          </a:effectRef>
-          <a:fontRef idx="minor">
-            <a:schemeClr val="lt1"/>
-          </a:fontRef>
-        </p:style>
-        <p:txBody>
-          <a:bodyPr rtlCol="0" anchor="ctr"/>
-          <a:lstStyle/>
-          <a:p>
-            <a:pPr algn="ctr"/>
-            <a:r>
-              <a:rPr lang="en-US" dirty="0"/>
-              <a:t>App</a:t>
-            </a:r>
-          </a:p>
-        </p:txBody>
-      </p:sp>
-    </p:spTree>
-    <p:extLst>
-      <p:ext uri="{BB962C8B-B14F-4D97-AF65-F5344CB8AC3E}">
-        <p14:creationId xmlns:p14="http://schemas.microsoft.com/office/powerpoint/2010/main" val="2507490874"/>
-      </p:ext>
-    </p:extLst>
-  </p:cSld>
-  <p:clrMapOvr>
-    <a:masterClrMapping/>
-  </p:clrMapOvr>
-  <mc:AlternateContent xmlns:mc="http://schemas.openxmlformats.org/markup-compatibility/2006" xmlns:p159="http://schemas.microsoft.com/office/powerpoint/2015/09/main">
-    <mc:Choice Requires="p159">
-      <p:transition xmlns:p14="http://schemas.microsoft.com/office/powerpoint/2010/main" spd="slow" p14:dur="2000">
-        <p159:morph option="byObject"/>
-      </p:transition>
-    </mc:Choice>
-    <mc:Fallback xmlns="">
-      <p:transition spd="slow">
-        <p:fade/>
-      </p:transition>
-    </mc:Fallback>
-  </mc:AlternateContent>
-</p:sld>
-</file>
-
-<file path=ppt/slides/slide17.xml><?xml version="1.0" encoding="utf-8"?>
-<p:sld xmlns:a="http://schemas.openxmlformats.org/drawingml/2006/main" xmlns:r="http://schemas.openxmlformats.org/officeDocument/2006/relationships" xmlns:p="http://schemas.openxmlformats.org/presentationml/2006/main">
-  <p:cSld>
-    <p:spTree>
-      <p:nvGrpSpPr>
-        <p:cNvPr id="1" name=""/>
-        <p:cNvGrpSpPr/>
-        <p:nvPr/>
-      </p:nvGrpSpPr>
-      <p:grpSpPr>
-        <a:xfrm>
-          <a:off x="0" y="0"/>
-          <a:ext cx="0" cy="0"/>
-          <a:chOff x="0" y="0"/>
-          <a:chExt cx="0" cy="0"/>
-        </a:xfrm>
-      </p:grpSpPr>
-      <p:sp>
-        <p:nvSpPr>
-          <p:cNvPr id="4" name="Rounded Rectangle 3"/>
-          <p:cNvSpPr/>
-          <p:nvPr/>
-        </p:nvSpPr>
-        <p:spPr>
-          <a:xfrm>
-            <a:off x="447675" y="876299"/>
-            <a:ext cx="11296650" cy="5591175"/>
-          </a:xfrm>
-          <a:prstGeom prst="roundRect">
-            <a:avLst>
-              <a:gd name="adj" fmla="val 2599"/>
-            </a:avLst>
-          </a:prstGeom>
-          <a:solidFill>
-            <a:schemeClr val="tx1">
-              <a:lumMod val="65000"/>
-              <a:lumOff val="35000"/>
-            </a:schemeClr>
-          </a:solidFill>
-        </p:spPr>
-        <p:style>
-          <a:lnRef idx="2">
-            <a:schemeClr val="accent1">
-              <a:shade val="50000"/>
-            </a:schemeClr>
-          </a:lnRef>
-          <a:fillRef idx="1">
-            <a:schemeClr val="accent1"/>
-          </a:fillRef>
-          <a:effectRef idx="0">
-            <a:schemeClr val="accent1"/>
-          </a:effectRef>
-          <a:fontRef idx="minor">
-            <a:schemeClr val="lt1"/>
-          </a:fontRef>
-        </p:style>
-        <p:txBody>
-          <a:bodyPr rtlCol="0" anchor="b"/>
-          <a:lstStyle/>
-          <a:p>
-            <a:pPr algn="ctr"/>
-            <a:r>
-              <a:rPr lang="en-US" sz="3600" dirty="0"/>
-              <a:t>Physical Server</a:t>
-            </a:r>
-          </a:p>
-        </p:txBody>
-      </p:sp>
-      <p:sp>
-        <p:nvSpPr>
           <p:cNvPr id="5" name="Rectangle 4"/>
           <p:cNvSpPr/>
           <p:nvPr/>
@@ -15459,7 +14987,7 @@
 </p:sld>
 </file>
 
-<file path=ppt/slides/slide18.xml><?xml version="1.0" encoding="utf-8"?>
+<file path=ppt/slides/slide17.xml><?xml version="1.0" encoding="utf-8"?>
 <p:sld xmlns:a="http://schemas.openxmlformats.org/drawingml/2006/main" xmlns:r="http://schemas.openxmlformats.org/officeDocument/2006/relationships" xmlns:p="http://schemas.openxmlformats.org/presentationml/2006/main">
   <p:cSld>
     <p:spTree>
@@ -17395,7 +16923,7 @@
 </p:sld>
 </file>
 
-<file path=ppt/slides/slide19.xml><?xml version="1.0" encoding="utf-8"?>
+<file path=ppt/slides/slide18.xml><?xml version="1.0" encoding="utf-8"?>
 <p:sld xmlns:a="http://schemas.openxmlformats.org/drawingml/2006/main" xmlns:r="http://schemas.openxmlformats.org/officeDocument/2006/relationships" xmlns:p="http://schemas.openxmlformats.org/presentationml/2006/main">
   <p:cSld>
     <p:spTree>
@@ -19331,93 +18859,7 @@
 </p:sld>
 </file>
 
-<file path=ppt/slides/slide2.xml><?xml version="1.0" encoding="utf-8"?>
-<p:sld xmlns:a="http://schemas.openxmlformats.org/drawingml/2006/main" xmlns:r="http://schemas.openxmlformats.org/officeDocument/2006/relationships" xmlns:p="http://schemas.openxmlformats.org/presentationml/2006/main">
-  <p:cSld>
-    <p:spTree>
-      <p:nvGrpSpPr>
-        <p:cNvPr id="1" name=""/>
-        <p:cNvGrpSpPr/>
-        <p:nvPr/>
-      </p:nvGrpSpPr>
-      <p:grpSpPr>
-        <a:xfrm>
-          <a:off x="0" y="0"/>
-          <a:ext cx="0" cy="0"/>
-          <a:chOff x="0" y="0"/>
-          <a:chExt cx="0" cy="0"/>
-        </a:xfrm>
-      </p:grpSpPr>
-      <p:sp>
-        <p:nvSpPr>
-          <p:cNvPr id="2" name="Title 1">
-            <a:extLst>
-              <a:ext uri="{FF2B5EF4-FFF2-40B4-BE49-F238E27FC236}">
-                <a16:creationId xmlns:a16="http://schemas.microsoft.com/office/drawing/2014/main" id="{AD0EF887-B521-4A7D-B159-25C51A913FFC}"/>
-              </a:ext>
-            </a:extLst>
-          </p:cNvPr>
-          <p:cNvSpPr>
-            <a:spLocks noGrp="1"/>
-          </p:cNvSpPr>
-          <p:nvPr>
-            <p:ph type="title"/>
-          </p:nvPr>
-        </p:nvSpPr>
-        <p:spPr/>
-        <p:txBody>
-          <a:bodyPr/>
-          <a:lstStyle/>
-          <a:p>
-            <a:r>
-              <a:rPr lang="en-US" dirty="0"/>
-              <a:t>Presentation Overview</a:t>
-            </a:r>
-          </a:p>
-        </p:txBody>
-      </p:sp>
-      <p:sp>
-        <p:nvSpPr>
-          <p:cNvPr id="3" name="Text Placeholder 2">
-            <a:extLst>
-              <a:ext uri="{FF2B5EF4-FFF2-40B4-BE49-F238E27FC236}">
-                <a16:creationId xmlns:a16="http://schemas.microsoft.com/office/drawing/2014/main" id="{40F93536-9D2E-4485-A099-5ABD38646551}"/>
-              </a:ext>
-            </a:extLst>
-          </p:cNvPr>
-          <p:cNvSpPr>
-            <a:spLocks noGrp="1"/>
-          </p:cNvSpPr>
-          <p:nvPr>
-            <p:ph type="body" idx="1"/>
-          </p:nvPr>
-        </p:nvSpPr>
-        <p:spPr/>
-        <p:txBody>
-          <a:bodyPr/>
-          <a:lstStyle/>
-          <a:p>
-            <a:r>
-              <a:rPr lang="en-US" dirty="0"/>
-              <a:t>Where I tell you what I’m going to tell you.</a:t>
-            </a:r>
-          </a:p>
-        </p:txBody>
-      </p:sp>
-    </p:spTree>
-    <p:extLst>
-      <p:ext uri="{BB962C8B-B14F-4D97-AF65-F5344CB8AC3E}">
-        <p14:creationId xmlns:p14="http://schemas.microsoft.com/office/powerpoint/2010/main" val="2853623997"/>
-      </p:ext>
-    </p:extLst>
-  </p:cSld>
-  <p:clrMapOvr>
-    <a:masterClrMapping/>
-  </p:clrMapOvr>
-</p:sld>
-</file>
-
-<file path=ppt/slides/slide20.xml><?xml version="1.0" encoding="utf-8"?>
+<file path=ppt/slides/slide19.xml><?xml version="1.0" encoding="utf-8"?>
 <p:sld xmlns:a="http://schemas.openxmlformats.org/drawingml/2006/main" xmlns:r="http://schemas.openxmlformats.org/officeDocument/2006/relationships" xmlns:p="http://schemas.openxmlformats.org/presentationml/2006/main">
   <p:cSld>
     <p:spTree>
@@ -21405,7 +20847,93 @@
 </p:sld>
 </file>
 
-<file path=ppt/slides/slide21.xml><?xml version="1.0" encoding="utf-8"?>
+<file path=ppt/slides/slide2.xml><?xml version="1.0" encoding="utf-8"?>
+<p:sld xmlns:a="http://schemas.openxmlformats.org/drawingml/2006/main" xmlns:r="http://schemas.openxmlformats.org/officeDocument/2006/relationships" xmlns:p="http://schemas.openxmlformats.org/presentationml/2006/main">
+  <p:cSld>
+    <p:spTree>
+      <p:nvGrpSpPr>
+        <p:cNvPr id="1" name=""/>
+        <p:cNvGrpSpPr/>
+        <p:nvPr/>
+      </p:nvGrpSpPr>
+      <p:grpSpPr>
+        <a:xfrm>
+          <a:off x="0" y="0"/>
+          <a:ext cx="0" cy="0"/>
+          <a:chOff x="0" y="0"/>
+          <a:chExt cx="0" cy="0"/>
+        </a:xfrm>
+      </p:grpSpPr>
+      <p:sp>
+        <p:nvSpPr>
+          <p:cNvPr id="2" name="Title 1">
+            <a:extLst>
+              <a:ext uri="{FF2B5EF4-FFF2-40B4-BE49-F238E27FC236}">
+                <a16:creationId xmlns:a16="http://schemas.microsoft.com/office/drawing/2014/main" id="{AD0EF887-B521-4A7D-B159-25C51A913FFC}"/>
+              </a:ext>
+            </a:extLst>
+          </p:cNvPr>
+          <p:cNvSpPr>
+            <a:spLocks noGrp="1"/>
+          </p:cNvSpPr>
+          <p:nvPr>
+            <p:ph type="title"/>
+          </p:nvPr>
+        </p:nvSpPr>
+        <p:spPr/>
+        <p:txBody>
+          <a:bodyPr/>
+          <a:lstStyle/>
+          <a:p>
+            <a:r>
+              <a:rPr lang="en-US" dirty="0"/>
+              <a:t>Presentation Overview</a:t>
+            </a:r>
+          </a:p>
+        </p:txBody>
+      </p:sp>
+      <p:sp>
+        <p:nvSpPr>
+          <p:cNvPr id="3" name="Text Placeholder 2">
+            <a:extLst>
+              <a:ext uri="{FF2B5EF4-FFF2-40B4-BE49-F238E27FC236}">
+                <a16:creationId xmlns:a16="http://schemas.microsoft.com/office/drawing/2014/main" id="{40F93536-9D2E-4485-A099-5ABD38646551}"/>
+              </a:ext>
+            </a:extLst>
+          </p:cNvPr>
+          <p:cNvSpPr>
+            <a:spLocks noGrp="1"/>
+          </p:cNvSpPr>
+          <p:nvPr>
+            <p:ph type="body" idx="1"/>
+          </p:nvPr>
+        </p:nvSpPr>
+        <p:spPr/>
+        <p:txBody>
+          <a:bodyPr/>
+          <a:lstStyle/>
+          <a:p>
+            <a:r>
+              <a:rPr lang="en-US" dirty="0"/>
+              <a:t>Where I tell you what I’m going to tell you.</a:t>
+            </a:r>
+          </a:p>
+        </p:txBody>
+      </p:sp>
+    </p:spTree>
+    <p:extLst>
+      <p:ext uri="{BB962C8B-B14F-4D97-AF65-F5344CB8AC3E}">
+        <p14:creationId xmlns:p14="http://schemas.microsoft.com/office/powerpoint/2010/main" val="2853623997"/>
+      </p:ext>
+    </p:extLst>
+  </p:cSld>
+  <p:clrMapOvr>
+    <a:masterClrMapping/>
+  </p:clrMapOvr>
+</p:sld>
+</file>
+
+<file path=ppt/slides/slide20.xml><?xml version="1.0" encoding="utf-8"?>
 <p:sld xmlns:a="http://schemas.openxmlformats.org/drawingml/2006/main" xmlns:r="http://schemas.openxmlformats.org/officeDocument/2006/relationships" xmlns:p="http://schemas.openxmlformats.org/presentationml/2006/main">
   <p:cSld>
     <p:spTree>
@@ -24344,7 +23872,7 @@
 </p:sld>
 </file>
 
-<file path=ppt/slides/slide22.xml><?xml version="1.0" encoding="utf-8"?>
+<file path=ppt/slides/slide21.xml><?xml version="1.0" encoding="utf-8"?>
 <p:sld xmlns:a="http://schemas.openxmlformats.org/drawingml/2006/main" xmlns:r="http://schemas.openxmlformats.org/officeDocument/2006/relationships" xmlns:p="http://schemas.openxmlformats.org/presentationml/2006/main">
   <p:cSld>
     <p:spTree>
@@ -24430,7 +23958,7 @@
 </p:sld>
 </file>
 
-<file path=ppt/slides/slide23.xml><?xml version="1.0" encoding="utf-8"?>
+<file path=ppt/slides/slide22.xml><?xml version="1.0" encoding="utf-8"?>
 <p:sld xmlns:a="http://schemas.openxmlformats.org/drawingml/2006/main" xmlns:r="http://schemas.openxmlformats.org/officeDocument/2006/relationships" xmlns:p="http://schemas.openxmlformats.org/presentationml/2006/main">
   <p:cSld>
     <p:spTree>
@@ -25126,7 +24654,7 @@
 </p:sld>
 </file>
 
-<file path=ppt/slides/slide24.xml><?xml version="1.0" encoding="utf-8"?>
+<file path=ppt/slides/slide23.xml><?xml version="1.0" encoding="utf-8"?>
 <p:sld xmlns:a="http://schemas.openxmlformats.org/drawingml/2006/main" xmlns:r="http://schemas.openxmlformats.org/officeDocument/2006/relationships" xmlns:p="http://schemas.openxmlformats.org/presentationml/2006/main">
   <p:cSld>
     <p:spTree>
@@ -25455,7 +24983,7 @@
 </p:sld>
 </file>
 
-<file path=ppt/slides/slide25.xml><?xml version="1.0" encoding="utf-8"?>
+<file path=ppt/slides/slide24.xml><?xml version="1.0" encoding="utf-8"?>
 <p:sld xmlns:a="http://schemas.openxmlformats.org/drawingml/2006/main" xmlns:r="http://schemas.openxmlformats.org/officeDocument/2006/relationships" xmlns:p="http://schemas.openxmlformats.org/presentationml/2006/main">
   <p:cSld>
     <p:spTree>
@@ -26007,7 +25535,7 @@
 </p:sld>
 </file>
 
-<file path=ppt/slides/slide26.xml><?xml version="1.0" encoding="utf-8"?>
+<file path=ppt/slides/slide25.xml><?xml version="1.0" encoding="utf-8"?>
 <p:sld xmlns:a="http://schemas.openxmlformats.org/drawingml/2006/main" xmlns:r="http://schemas.openxmlformats.org/officeDocument/2006/relationships" xmlns:p="http://schemas.openxmlformats.org/presentationml/2006/main">
   <p:cSld>
     <p:spTree>
@@ -26730,7 +26258,7 @@
 </p:sld>
 </file>
 
-<file path=ppt/slides/slide27.xml><?xml version="1.0" encoding="utf-8"?>
+<file path=ppt/slides/slide26.xml><?xml version="1.0" encoding="utf-8"?>
 <p:sld xmlns:a="http://schemas.openxmlformats.org/drawingml/2006/main" xmlns:r="http://schemas.openxmlformats.org/officeDocument/2006/relationships" xmlns:p="http://schemas.openxmlformats.org/presentationml/2006/main">
   <p:cSld>
     <p:spTree>
@@ -27404,7 +26932,7 @@
 </p:sld>
 </file>
 
-<file path=ppt/slides/slide28.xml><?xml version="1.0" encoding="utf-8"?>
+<file path=ppt/slides/slide27.xml><?xml version="1.0" encoding="utf-8"?>
 <p:sld xmlns:a="http://schemas.openxmlformats.org/drawingml/2006/main" xmlns:r="http://schemas.openxmlformats.org/officeDocument/2006/relationships" xmlns:p="http://schemas.openxmlformats.org/presentationml/2006/main">
   <p:cSld>
     <p:spTree>
@@ -27835,7 +27363,7 @@
 </p:sld>
 </file>
 
-<file path=ppt/slides/slide29.xml><?xml version="1.0" encoding="utf-8"?>
+<file path=ppt/slides/slide28.xml><?xml version="1.0" encoding="utf-8"?>
 <p:sld xmlns:a="http://schemas.openxmlformats.org/drawingml/2006/main" xmlns:r="http://schemas.openxmlformats.org/officeDocument/2006/relationships" xmlns:p="http://schemas.openxmlformats.org/presentationml/2006/main">
   <p:cSld>
     <p:spTree>
@@ -28650,6 +28178,571 @@
 </p:sld>
 </file>
 
+<file path=ppt/slides/slide29.xml><?xml version="1.0" encoding="utf-8"?>
+<p:sld xmlns:a="http://schemas.openxmlformats.org/drawingml/2006/main" xmlns:r="http://schemas.openxmlformats.org/officeDocument/2006/relationships" xmlns:p="http://schemas.openxmlformats.org/presentationml/2006/main">
+  <p:cSld>
+    <p:spTree>
+      <p:nvGrpSpPr>
+        <p:cNvPr id="1" name=""/>
+        <p:cNvGrpSpPr/>
+        <p:nvPr/>
+      </p:nvGrpSpPr>
+      <p:grpSpPr>
+        <a:xfrm>
+          <a:off x="0" y="0"/>
+          <a:ext cx="0" cy="0"/>
+          <a:chOff x="0" y="0"/>
+          <a:chExt cx="0" cy="0"/>
+        </a:xfrm>
+      </p:grpSpPr>
+      <p:sp>
+        <p:nvSpPr>
+          <p:cNvPr id="2" name="Title 1">
+            <a:extLst>
+              <a:ext uri="{FF2B5EF4-FFF2-40B4-BE49-F238E27FC236}">
+                <a16:creationId xmlns:a16="http://schemas.microsoft.com/office/drawing/2014/main" id="{26AFA8D6-8CF9-4D6D-AC30-A5504074897A}"/>
+              </a:ext>
+            </a:extLst>
+          </p:cNvPr>
+          <p:cNvSpPr>
+            <a:spLocks noGrp="1"/>
+          </p:cNvSpPr>
+          <p:nvPr>
+            <p:ph type="title"/>
+          </p:nvPr>
+        </p:nvSpPr>
+        <p:spPr/>
+        <p:txBody>
+          <a:bodyPr/>
+          <a:lstStyle/>
+          <a:p>
+            <a:pPr>
+              <a:lnSpc>
+                <a:spcPct val="200000"/>
+              </a:lnSpc>
+            </a:pPr>
+            <a:r>
+              <a:rPr lang="en-US" dirty="0"/>
+              <a:t>Containers and Operations</a:t>
+            </a:r>
+          </a:p>
+        </p:txBody>
+      </p:sp>
+      <p:sp>
+        <p:nvSpPr>
+          <p:cNvPr id="3" name="Content Placeholder 2">
+            <a:extLst>
+              <a:ext uri="{FF2B5EF4-FFF2-40B4-BE49-F238E27FC236}">
+                <a16:creationId xmlns:a16="http://schemas.microsoft.com/office/drawing/2014/main" id="{51892F45-8456-4EAF-BC73-F78EF9921B1C}"/>
+              </a:ext>
+            </a:extLst>
+          </p:cNvPr>
+          <p:cNvSpPr>
+            <a:spLocks noGrp="1"/>
+          </p:cNvSpPr>
+          <p:nvPr>
+            <p:ph idx="1"/>
+          </p:nvPr>
+        </p:nvSpPr>
+        <p:spPr>
+          <a:xfrm>
+            <a:off x="581192" y="2180496"/>
+            <a:ext cx="11029615" cy="4161938"/>
+          </a:xfrm>
+        </p:spPr>
+        <p:txBody>
+          <a:bodyPr>
+            <a:normAutofit/>
+          </a:bodyPr>
+          <a:lstStyle/>
+          <a:p>
+            <a:pPr>
+              <a:lnSpc>
+                <a:spcPct val="200000"/>
+              </a:lnSpc>
+            </a:pPr>
+            <a:r>
+              <a:rPr lang="en-US" dirty="0"/>
+              <a:t>Reduced infrastructure cost</a:t>
+            </a:r>
+          </a:p>
+          <a:p>
+            <a:pPr>
+              <a:lnSpc>
+                <a:spcPct val="200000"/>
+              </a:lnSpc>
+            </a:pPr>
+            <a:r>
+              <a:rPr lang="en-US" dirty="0"/>
+              <a:t>Tight control of container images</a:t>
+            </a:r>
+          </a:p>
+          <a:p>
+            <a:pPr>
+              <a:lnSpc>
+                <a:spcPct val="200000"/>
+              </a:lnSpc>
+            </a:pPr>
+            <a:r>
+              <a:rPr lang="en-US" dirty="0"/>
+              <a:t>Security auditing</a:t>
+            </a:r>
+          </a:p>
+          <a:p>
+            <a:pPr>
+              <a:lnSpc>
+                <a:spcPct val="200000"/>
+              </a:lnSpc>
+            </a:pPr>
+            <a:r>
+              <a:rPr lang="en-US" dirty="0"/>
+              <a:t>Required certification of applications</a:t>
+            </a:r>
+          </a:p>
+          <a:p>
+            <a:pPr>
+              <a:lnSpc>
+                <a:spcPct val="200000"/>
+              </a:lnSpc>
+            </a:pPr>
+            <a:r>
+              <a:rPr lang="en-US" dirty="0"/>
+              <a:t>Excellent tools for automatic scaling</a:t>
+            </a:r>
+          </a:p>
+          <a:p>
+            <a:pPr>
+              <a:lnSpc>
+                <a:spcPct val="200000"/>
+              </a:lnSpc>
+            </a:pPr>
+            <a:r>
+              <a:rPr lang="en-US" dirty="0"/>
+              <a:t>Reduced maintenance burden</a:t>
+            </a:r>
+          </a:p>
+          <a:p>
+            <a:pPr>
+              <a:lnSpc>
+                <a:spcPct val="200000"/>
+              </a:lnSpc>
+            </a:pPr>
+            <a:endParaRPr lang="en-US" dirty="0"/>
+          </a:p>
+        </p:txBody>
+      </p:sp>
+    </p:spTree>
+    <p:extLst>
+      <p:ext uri="{BB962C8B-B14F-4D97-AF65-F5344CB8AC3E}">
+        <p14:creationId xmlns:p14="http://schemas.microsoft.com/office/powerpoint/2010/main" val="3648727292"/>
+      </p:ext>
+    </p:extLst>
+  </p:cSld>
+  <p:clrMapOvr>
+    <a:masterClrMapping/>
+  </p:clrMapOvr>
+  <p:timing>
+    <p:tnLst>
+      <p:par>
+        <p:cTn id="1" dur="indefinite" restart="never" nodeType="tmRoot">
+          <p:childTnLst>
+            <p:seq concurrent="1" nextAc="seek">
+              <p:cTn id="2" dur="indefinite" nodeType="mainSeq">
+                <p:childTnLst>
+                  <p:par>
+                    <p:cTn id="3" fill="hold">
+                      <p:stCondLst>
+                        <p:cond delay="indefinite"/>
+                      </p:stCondLst>
+                      <p:childTnLst>
+                        <p:par>
+                          <p:cTn id="4" fill="hold">
+                            <p:stCondLst>
+                              <p:cond delay="0"/>
+                            </p:stCondLst>
+                            <p:childTnLst>
+                              <p:par>
+                                <p:cTn id="5" presetID="10" presetClass="entr" presetSubtype="0" fill="hold" grpId="0" nodeType="clickEffect">
+                                  <p:stCondLst>
+                                    <p:cond delay="0"/>
+                                  </p:stCondLst>
+                                  <p:childTnLst>
+                                    <p:set>
+                                      <p:cBhvr>
+                                        <p:cTn id="6" dur="1" fill="hold">
+                                          <p:stCondLst>
+                                            <p:cond delay="0"/>
+                                          </p:stCondLst>
+                                        </p:cTn>
+                                        <p:tgtEl>
+                                          <p:spTgt spid="3">
+                                            <p:txEl>
+                                              <p:pRg st="0" end="0"/>
+                                            </p:txEl>
+                                          </p:spTgt>
+                                        </p:tgtEl>
+                                        <p:attrNameLst>
+                                          <p:attrName>style.visibility</p:attrName>
+                                        </p:attrNameLst>
+                                      </p:cBhvr>
+                                      <p:to>
+                                        <p:strVal val="visible"/>
+                                      </p:to>
+                                    </p:set>
+                                    <p:animEffect transition="in" filter="fade">
+                                      <p:cBhvr>
+                                        <p:cTn id="7" dur="500"/>
+                                        <p:tgtEl>
+                                          <p:spTgt spid="3">
+                                            <p:txEl>
+                                              <p:pRg st="0" end="0"/>
+                                            </p:txEl>
+                                          </p:spTgt>
+                                        </p:tgtEl>
+                                      </p:cBhvr>
+                                    </p:animEffect>
+                                  </p:childTnLst>
+                                </p:cTn>
+                              </p:par>
+                            </p:childTnLst>
+                          </p:cTn>
+                        </p:par>
+                      </p:childTnLst>
+                    </p:cTn>
+                  </p:par>
+                  <p:par>
+                    <p:cTn id="8" fill="hold">
+                      <p:stCondLst>
+                        <p:cond delay="indefinite"/>
+                      </p:stCondLst>
+                      <p:childTnLst>
+                        <p:par>
+                          <p:cTn id="9" fill="hold">
+                            <p:stCondLst>
+                              <p:cond delay="0"/>
+                            </p:stCondLst>
+                            <p:childTnLst>
+                              <p:par>
+                                <p:cTn id="10" presetID="10" presetClass="entr" presetSubtype="0" fill="hold" grpId="0" nodeType="clickEffect">
+                                  <p:stCondLst>
+                                    <p:cond delay="0"/>
+                                  </p:stCondLst>
+                                  <p:childTnLst>
+                                    <p:set>
+                                      <p:cBhvr>
+                                        <p:cTn id="11" dur="1" fill="hold">
+                                          <p:stCondLst>
+                                            <p:cond delay="0"/>
+                                          </p:stCondLst>
+                                        </p:cTn>
+                                        <p:tgtEl>
+                                          <p:spTgt spid="3">
+                                            <p:txEl>
+                                              <p:pRg st="1" end="1"/>
+                                            </p:txEl>
+                                          </p:spTgt>
+                                        </p:tgtEl>
+                                        <p:attrNameLst>
+                                          <p:attrName>style.visibility</p:attrName>
+                                        </p:attrNameLst>
+                                      </p:cBhvr>
+                                      <p:to>
+                                        <p:strVal val="visible"/>
+                                      </p:to>
+                                    </p:set>
+                                    <p:animEffect transition="in" filter="fade">
+                                      <p:cBhvr>
+                                        <p:cTn id="12" dur="500"/>
+                                        <p:tgtEl>
+                                          <p:spTgt spid="3">
+                                            <p:txEl>
+                                              <p:pRg st="1" end="1"/>
+                                            </p:txEl>
+                                          </p:spTgt>
+                                        </p:tgtEl>
+                                      </p:cBhvr>
+                                    </p:animEffect>
+                                  </p:childTnLst>
+                                </p:cTn>
+                              </p:par>
+                            </p:childTnLst>
+                          </p:cTn>
+                        </p:par>
+                      </p:childTnLst>
+                    </p:cTn>
+                  </p:par>
+                  <p:par>
+                    <p:cTn id="13" fill="hold">
+                      <p:stCondLst>
+                        <p:cond delay="indefinite"/>
+                      </p:stCondLst>
+                      <p:childTnLst>
+                        <p:par>
+                          <p:cTn id="14" fill="hold">
+                            <p:stCondLst>
+                              <p:cond delay="0"/>
+                            </p:stCondLst>
+                            <p:childTnLst>
+                              <p:par>
+                                <p:cTn id="15" presetID="10" presetClass="entr" presetSubtype="0" fill="hold" grpId="0" nodeType="clickEffect">
+                                  <p:stCondLst>
+                                    <p:cond delay="0"/>
+                                  </p:stCondLst>
+                                  <p:childTnLst>
+                                    <p:set>
+                                      <p:cBhvr>
+                                        <p:cTn id="16" dur="1" fill="hold">
+                                          <p:stCondLst>
+                                            <p:cond delay="0"/>
+                                          </p:stCondLst>
+                                        </p:cTn>
+                                        <p:tgtEl>
+                                          <p:spTgt spid="3">
+                                            <p:txEl>
+                                              <p:pRg st="2" end="2"/>
+                                            </p:txEl>
+                                          </p:spTgt>
+                                        </p:tgtEl>
+                                        <p:attrNameLst>
+                                          <p:attrName>style.visibility</p:attrName>
+                                        </p:attrNameLst>
+                                      </p:cBhvr>
+                                      <p:to>
+                                        <p:strVal val="visible"/>
+                                      </p:to>
+                                    </p:set>
+                                    <p:animEffect transition="in" filter="fade">
+                                      <p:cBhvr>
+                                        <p:cTn id="17" dur="500"/>
+                                        <p:tgtEl>
+                                          <p:spTgt spid="3">
+                                            <p:txEl>
+                                              <p:pRg st="2" end="2"/>
+                                            </p:txEl>
+                                          </p:spTgt>
+                                        </p:tgtEl>
+                                      </p:cBhvr>
+                                    </p:animEffect>
+                                  </p:childTnLst>
+                                </p:cTn>
+                              </p:par>
+                            </p:childTnLst>
+                          </p:cTn>
+                        </p:par>
+                      </p:childTnLst>
+                    </p:cTn>
+                  </p:par>
+                  <p:par>
+                    <p:cTn id="18" fill="hold">
+                      <p:stCondLst>
+                        <p:cond delay="indefinite"/>
+                      </p:stCondLst>
+                      <p:childTnLst>
+                        <p:par>
+                          <p:cTn id="19" fill="hold">
+                            <p:stCondLst>
+                              <p:cond delay="0"/>
+                            </p:stCondLst>
+                            <p:childTnLst>
+                              <p:par>
+                                <p:cTn id="20" presetID="10" presetClass="entr" presetSubtype="0" fill="hold" grpId="0" nodeType="clickEffect">
+                                  <p:stCondLst>
+                                    <p:cond delay="0"/>
+                                  </p:stCondLst>
+                                  <p:childTnLst>
+                                    <p:set>
+                                      <p:cBhvr>
+                                        <p:cTn id="21" dur="1" fill="hold">
+                                          <p:stCondLst>
+                                            <p:cond delay="0"/>
+                                          </p:stCondLst>
+                                        </p:cTn>
+                                        <p:tgtEl>
+                                          <p:spTgt spid="3">
+                                            <p:txEl>
+                                              <p:pRg st="3" end="3"/>
+                                            </p:txEl>
+                                          </p:spTgt>
+                                        </p:tgtEl>
+                                        <p:attrNameLst>
+                                          <p:attrName>style.visibility</p:attrName>
+                                        </p:attrNameLst>
+                                      </p:cBhvr>
+                                      <p:to>
+                                        <p:strVal val="visible"/>
+                                      </p:to>
+                                    </p:set>
+                                    <p:animEffect transition="in" filter="fade">
+                                      <p:cBhvr>
+                                        <p:cTn id="22" dur="500"/>
+                                        <p:tgtEl>
+                                          <p:spTgt spid="3">
+                                            <p:txEl>
+                                              <p:pRg st="3" end="3"/>
+                                            </p:txEl>
+                                          </p:spTgt>
+                                        </p:tgtEl>
+                                      </p:cBhvr>
+                                    </p:animEffect>
+                                  </p:childTnLst>
+                                </p:cTn>
+                              </p:par>
+                            </p:childTnLst>
+                          </p:cTn>
+                        </p:par>
+                      </p:childTnLst>
+                    </p:cTn>
+                  </p:par>
+                  <p:par>
+                    <p:cTn id="23" fill="hold">
+                      <p:stCondLst>
+                        <p:cond delay="indefinite"/>
+                      </p:stCondLst>
+                      <p:childTnLst>
+                        <p:par>
+                          <p:cTn id="24" fill="hold">
+                            <p:stCondLst>
+                              <p:cond delay="0"/>
+                            </p:stCondLst>
+                            <p:childTnLst>
+                              <p:par>
+                                <p:cTn id="25" presetID="10" presetClass="entr" presetSubtype="0" fill="hold" grpId="0" nodeType="clickEffect">
+                                  <p:stCondLst>
+                                    <p:cond delay="0"/>
+                                  </p:stCondLst>
+                                  <p:childTnLst>
+                                    <p:set>
+                                      <p:cBhvr>
+                                        <p:cTn id="26" dur="1" fill="hold">
+                                          <p:stCondLst>
+                                            <p:cond delay="0"/>
+                                          </p:stCondLst>
+                                        </p:cTn>
+                                        <p:tgtEl>
+                                          <p:spTgt spid="3">
+                                            <p:txEl>
+                                              <p:pRg st="4" end="4"/>
+                                            </p:txEl>
+                                          </p:spTgt>
+                                        </p:tgtEl>
+                                        <p:attrNameLst>
+                                          <p:attrName>style.visibility</p:attrName>
+                                        </p:attrNameLst>
+                                      </p:cBhvr>
+                                      <p:to>
+                                        <p:strVal val="visible"/>
+                                      </p:to>
+                                    </p:set>
+                                    <p:animEffect transition="in" filter="fade">
+                                      <p:cBhvr>
+                                        <p:cTn id="27" dur="500"/>
+                                        <p:tgtEl>
+                                          <p:spTgt spid="3">
+                                            <p:txEl>
+                                              <p:pRg st="4" end="4"/>
+                                            </p:txEl>
+                                          </p:spTgt>
+                                        </p:tgtEl>
+                                      </p:cBhvr>
+                                    </p:animEffect>
+                                  </p:childTnLst>
+                                </p:cTn>
+                              </p:par>
+                            </p:childTnLst>
+                          </p:cTn>
+                        </p:par>
+                      </p:childTnLst>
+                    </p:cTn>
+                  </p:par>
+                  <p:par>
+                    <p:cTn id="28" fill="hold">
+                      <p:stCondLst>
+                        <p:cond delay="indefinite"/>
+                      </p:stCondLst>
+                      <p:childTnLst>
+                        <p:par>
+                          <p:cTn id="29" fill="hold">
+                            <p:stCondLst>
+                              <p:cond delay="0"/>
+                            </p:stCondLst>
+                            <p:childTnLst>
+                              <p:par>
+                                <p:cTn id="30" presetID="10" presetClass="entr" presetSubtype="0" fill="hold" grpId="0" nodeType="clickEffect">
+                                  <p:stCondLst>
+                                    <p:cond delay="0"/>
+                                  </p:stCondLst>
+                                  <p:childTnLst>
+                                    <p:set>
+                                      <p:cBhvr>
+                                        <p:cTn id="31" dur="1" fill="hold">
+                                          <p:stCondLst>
+                                            <p:cond delay="0"/>
+                                          </p:stCondLst>
+                                        </p:cTn>
+                                        <p:tgtEl>
+                                          <p:spTgt spid="3">
+                                            <p:txEl>
+                                              <p:pRg st="5" end="5"/>
+                                            </p:txEl>
+                                          </p:spTgt>
+                                        </p:tgtEl>
+                                        <p:attrNameLst>
+                                          <p:attrName>style.visibility</p:attrName>
+                                        </p:attrNameLst>
+                                      </p:cBhvr>
+                                      <p:to>
+                                        <p:strVal val="visible"/>
+                                      </p:to>
+                                    </p:set>
+                                    <p:animEffect transition="in" filter="fade">
+                                      <p:cBhvr>
+                                        <p:cTn id="32" dur="500"/>
+                                        <p:tgtEl>
+                                          <p:spTgt spid="3">
+                                            <p:txEl>
+                                              <p:pRg st="5" end="5"/>
+                                            </p:txEl>
+                                          </p:spTgt>
+                                        </p:tgtEl>
+                                      </p:cBhvr>
+                                    </p:animEffect>
+                                  </p:childTnLst>
+                                </p:cTn>
+                              </p:par>
+                            </p:childTnLst>
+                          </p:cTn>
+                        </p:par>
+                      </p:childTnLst>
+                    </p:cTn>
+                  </p:par>
+                </p:childTnLst>
+              </p:cTn>
+              <p:prevCondLst>
+                <p:cond evt="onPrev" delay="0">
+                  <p:tgtEl>
+                    <p:sldTgt/>
+                  </p:tgtEl>
+                </p:cond>
+              </p:prevCondLst>
+              <p:nextCondLst>
+                <p:cond evt="onNext" delay="0">
+                  <p:tgtEl>
+                    <p:sldTgt/>
+                  </p:tgtEl>
+                </p:cond>
+              </p:nextCondLst>
+            </p:seq>
+          </p:childTnLst>
+        </p:cTn>
+      </p:par>
+    </p:tnLst>
+    <p:bldLst>
+      <p:bldP spid="3" grpId="0" build="p"/>
+    </p:bldLst>
+  </p:timing>
+</p:sld>
+</file>
+
 <file path=ppt/slides/slide3.xml><?xml version="1.0" encoding="utf-8"?>
 <p:sld xmlns:a="http://schemas.openxmlformats.org/drawingml/2006/main" xmlns:r="http://schemas.openxmlformats.org/officeDocument/2006/relationships" xmlns:p="http://schemas.openxmlformats.org/presentationml/2006/main">
   <p:cSld>
@@ -28714,7 +28807,7 @@
         <p:spPr/>
         <p:txBody>
           <a:bodyPr>
-            <a:normAutofit fontScale="85000" lnSpcReduction="20000"/>
+            <a:normAutofit fontScale="77500" lnSpcReduction="20000"/>
           </a:bodyPr>
           <a:lstStyle/>
           <a:p>
@@ -29291,571 +29384,6 @@
           <p:cNvPr id="2" name="Title 1">
             <a:extLst>
               <a:ext uri="{FF2B5EF4-FFF2-40B4-BE49-F238E27FC236}">
-                <a16:creationId xmlns:a16="http://schemas.microsoft.com/office/drawing/2014/main" id="{26AFA8D6-8CF9-4D6D-AC30-A5504074897A}"/>
-              </a:ext>
-            </a:extLst>
-          </p:cNvPr>
-          <p:cNvSpPr>
-            <a:spLocks noGrp="1"/>
-          </p:cNvSpPr>
-          <p:nvPr>
-            <p:ph type="title"/>
-          </p:nvPr>
-        </p:nvSpPr>
-        <p:spPr/>
-        <p:txBody>
-          <a:bodyPr/>
-          <a:lstStyle/>
-          <a:p>
-            <a:pPr>
-              <a:lnSpc>
-                <a:spcPct val="200000"/>
-              </a:lnSpc>
-            </a:pPr>
-            <a:r>
-              <a:rPr lang="en-US" dirty="0"/>
-              <a:t>Containers and Operations</a:t>
-            </a:r>
-          </a:p>
-        </p:txBody>
-      </p:sp>
-      <p:sp>
-        <p:nvSpPr>
-          <p:cNvPr id="3" name="Content Placeholder 2">
-            <a:extLst>
-              <a:ext uri="{FF2B5EF4-FFF2-40B4-BE49-F238E27FC236}">
-                <a16:creationId xmlns:a16="http://schemas.microsoft.com/office/drawing/2014/main" id="{51892F45-8456-4EAF-BC73-F78EF9921B1C}"/>
-              </a:ext>
-            </a:extLst>
-          </p:cNvPr>
-          <p:cNvSpPr>
-            <a:spLocks noGrp="1"/>
-          </p:cNvSpPr>
-          <p:nvPr>
-            <p:ph idx="1"/>
-          </p:nvPr>
-        </p:nvSpPr>
-        <p:spPr>
-          <a:xfrm>
-            <a:off x="581192" y="2180496"/>
-            <a:ext cx="11029615" cy="4161938"/>
-          </a:xfrm>
-        </p:spPr>
-        <p:txBody>
-          <a:bodyPr>
-            <a:normAutofit/>
-          </a:bodyPr>
-          <a:lstStyle/>
-          <a:p>
-            <a:pPr>
-              <a:lnSpc>
-                <a:spcPct val="200000"/>
-              </a:lnSpc>
-            </a:pPr>
-            <a:r>
-              <a:rPr lang="en-US" dirty="0"/>
-              <a:t>Reduced infrastructure cost</a:t>
-            </a:r>
-          </a:p>
-          <a:p>
-            <a:pPr>
-              <a:lnSpc>
-                <a:spcPct val="200000"/>
-              </a:lnSpc>
-            </a:pPr>
-            <a:r>
-              <a:rPr lang="en-US" dirty="0"/>
-              <a:t>Tight control of container images</a:t>
-            </a:r>
-          </a:p>
-          <a:p>
-            <a:pPr>
-              <a:lnSpc>
-                <a:spcPct val="200000"/>
-              </a:lnSpc>
-            </a:pPr>
-            <a:r>
-              <a:rPr lang="en-US" dirty="0"/>
-              <a:t>Security auditing</a:t>
-            </a:r>
-          </a:p>
-          <a:p>
-            <a:pPr>
-              <a:lnSpc>
-                <a:spcPct val="200000"/>
-              </a:lnSpc>
-            </a:pPr>
-            <a:r>
-              <a:rPr lang="en-US" dirty="0"/>
-              <a:t>Required certification of applications</a:t>
-            </a:r>
-          </a:p>
-          <a:p>
-            <a:pPr>
-              <a:lnSpc>
-                <a:spcPct val="200000"/>
-              </a:lnSpc>
-            </a:pPr>
-            <a:r>
-              <a:rPr lang="en-US" dirty="0"/>
-              <a:t>Excellent tools for automatic scaling</a:t>
-            </a:r>
-          </a:p>
-          <a:p>
-            <a:pPr>
-              <a:lnSpc>
-                <a:spcPct val="200000"/>
-              </a:lnSpc>
-            </a:pPr>
-            <a:r>
-              <a:rPr lang="en-US" dirty="0"/>
-              <a:t>Reduced maintenance burden</a:t>
-            </a:r>
-          </a:p>
-          <a:p>
-            <a:pPr>
-              <a:lnSpc>
-                <a:spcPct val="200000"/>
-              </a:lnSpc>
-            </a:pPr>
-            <a:endParaRPr lang="en-US" dirty="0"/>
-          </a:p>
-        </p:txBody>
-      </p:sp>
-    </p:spTree>
-    <p:extLst>
-      <p:ext uri="{BB962C8B-B14F-4D97-AF65-F5344CB8AC3E}">
-        <p14:creationId xmlns:p14="http://schemas.microsoft.com/office/powerpoint/2010/main" val="3648727292"/>
-      </p:ext>
-    </p:extLst>
-  </p:cSld>
-  <p:clrMapOvr>
-    <a:masterClrMapping/>
-  </p:clrMapOvr>
-  <p:timing>
-    <p:tnLst>
-      <p:par>
-        <p:cTn id="1" dur="indefinite" restart="never" nodeType="tmRoot">
-          <p:childTnLst>
-            <p:seq concurrent="1" nextAc="seek">
-              <p:cTn id="2" dur="indefinite" nodeType="mainSeq">
-                <p:childTnLst>
-                  <p:par>
-                    <p:cTn id="3" fill="hold">
-                      <p:stCondLst>
-                        <p:cond delay="indefinite"/>
-                      </p:stCondLst>
-                      <p:childTnLst>
-                        <p:par>
-                          <p:cTn id="4" fill="hold">
-                            <p:stCondLst>
-                              <p:cond delay="0"/>
-                            </p:stCondLst>
-                            <p:childTnLst>
-                              <p:par>
-                                <p:cTn id="5" presetID="10" presetClass="entr" presetSubtype="0" fill="hold" grpId="0" nodeType="clickEffect">
-                                  <p:stCondLst>
-                                    <p:cond delay="0"/>
-                                  </p:stCondLst>
-                                  <p:childTnLst>
-                                    <p:set>
-                                      <p:cBhvr>
-                                        <p:cTn id="6" dur="1" fill="hold">
-                                          <p:stCondLst>
-                                            <p:cond delay="0"/>
-                                          </p:stCondLst>
-                                        </p:cTn>
-                                        <p:tgtEl>
-                                          <p:spTgt spid="3">
-                                            <p:txEl>
-                                              <p:pRg st="0" end="0"/>
-                                            </p:txEl>
-                                          </p:spTgt>
-                                        </p:tgtEl>
-                                        <p:attrNameLst>
-                                          <p:attrName>style.visibility</p:attrName>
-                                        </p:attrNameLst>
-                                      </p:cBhvr>
-                                      <p:to>
-                                        <p:strVal val="visible"/>
-                                      </p:to>
-                                    </p:set>
-                                    <p:animEffect transition="in" filter="fade">
-                                      <p:cBhvr>
-                                        <p:cTn id="7" dur="500"/>
-                                        <p:tgtEl>
-                                          <p:spTgt spid="3">
-                                            <p:txEl>
-                                              <p:pRg st="0" end="0"/>
-                                            </p:txEl>
-                                          </p:spTgt>
-                                        </p:tgtEl>
-                                      </p:cBhvr>
-                                    </p:animEffect>
-                                  </p:childTnLst>
-                                </p:cTn>
-                              </p:par>
-                            </p:childTnLst>
-                          </p:cTn>
-                        </p:par>
-                      </p:childTnLst>
-                    </p:cTn>
-                  </p:par>
-                  <p:par>
-                    <p:cTn id="8" fill="hold">
-                      <p:stCondLst>
-                        <p:cond delay="indefinite"/>
-                      </p:stCondLst>
-                      <p:childTnLst>
-                        <p:par>
-                          <p:cTn id="9" fill="hold">
-                            <p:stCondLst>
-                              <p:cond delay="0"/>
-                            </p:stCondLst>
-                            <p:childTnLst>
-                              <p:par>
-                                <p:cTn id="10" presetID="10" presetClass="entr" presetSubtype="0" fill="hold" grpId="0" nodeType="clickEffect">
-                                  <p:stCondLst>
-                                    <p:cond delay="0"/>
-                                  </p:stCondLst>
-                                  <p:childTnLst>
-                                    <p:set>
-                                      <p:cBhvr>
-                                        <p:cTn id="11" dur="1" fill="hold">
-                                          <p:stCondLst>
-                                            <p:cond delay="0"/>
-                                          </p:stCondLst>
-                                        </p:cTn>
-                                        <p:tgtEl>
-                                          <p:spTgt spid="3">
-                                            <p:txEl>
-                                              <p:pRg st="1" end="1"/>
-                                            </p:txEl>
-                                          </p:spTgt>
-                                        </p:tgtEl>
-                                        <p:attrNameLst>
-                                          <p:attrName>style.visibility</p:attrName>
-                                        </p:attrNameLst>
-                                      </p:cBhvr>
-                                      <p:to>
-                                        <p:strVal val="visible"/>
-                                      </p:to>
-                                    </p:set>
-                                    <p:animEffect transition="in" filter="fade">
-                                      <p:cBhvr>
-                                        <p:cTn id="12" dur="500"/>
-                                        <p:tgtEl>
-                                          <p:spTgt spid="3">
-                                            <p:txEl>
-                                              <p:pRg st="1" end="1"/>
-                                            </p:txEl>
-                                          </p:spTgt>
-                                        </p:tgtEl>
-                                      </p:cBhvr>
-                                    </p:animEffect>
-                                  </p:childTnLst>
-                                </p:cTn>
-                              </p:par>
-                            </p:childTnLst>
-                          </p:cTn>
-                        </p:par>
-                      </p:childTnLst>
-                    </p:cTn>
-                  </p:par>
-                  <p:par>
-                    <p:cTn id="13" fill="hold">
-                      <p:stCondLst>
-                        <p:cond delay="indefinite"/>
-                      </p:stCondLst>
-                      <p:childTnLst>
-                        <p:par>
-                          <p:cTn id="14" fill="hold">
-                            <p:stCondLst>
-                              <p:cond delay="0"/>
-                            </p:stCondLst>
-                            <p:childTnLst>
-                              <p:par>
-                                <p:cTn id="15" presetID="10" presetClass="entr" presetSubtype="0" fill="hold" grpId="0" nodeType="clickEffect">
-                                  <p:stCondLst>
-                                    <p:cond delay="0"/>
-                                  </p:stCondLst>
-                                  <p:childTnLst>
-                                    <p:set>
-                                      <p:cBhvr>
-                                        <p:cTn id="16" dur="1" fill="hold">
-                                          <p:stCondLst>
-                                            <p:cond delay="0"/>
-                                          </p:stCondLst>
-                                        </p:cTn>
-                                        <p:tgtEl>
-                                          <p:spTgt spid="3">
-                                            <p:txEl>
-                                              <p:pRg st="2" end="2"/>
-                                            </p:txEl>
-                                          </p:spTgt>
-                                        </p:tgtEl>
-                                        <p:attrNameLst>
-                                          <p:attrName>style.visibility</p:attrName>
-                                        </p:attrNameLst>
-                                      </p:cBhvr>
-                                      <p:to>
-                                        <p:strVal val="visible"/>
-                                      </p:to>
-                                    </p:set>
-                                    <p:animEffect transition="in" filter="fade">
-                                      <p:cBhvr>
-                                        <p:cTn id="17" dur="500"/>
-                                        <p:tgtEl>
-                                          <p:spTgt spid="3">
-                                            <p:txEl>
-                                              <p:pRg st="2" end="2"/>
-                                            </p:txEl>
-                                          </p:spTgt>
-                                        </p:tgtEl>
-                                      </p:cBhvr>
-                                    </p:animEffect>
-                                  </p:childTnLst>
-                                </p:cTn>
-                              </p:par>
-                            </p:childTnLst>
-                          </p:cTn>
-                        </p:par>
-                      </p:childTnLst>
-                    </p:cTn>
-                  </p:par>
-                  <p:par>
-                    <p:cTn id="18" fill="hold">
-                      <p:stCondLst>
-                        <p:cond delay="indefinite"/>
-                      </p:stCondLst>
-                      <p:childTnLst>
-                        <p:par>
-                          <p:cTn id="19" fill="hold">
-                            <p:stCondLst>
-                              <p:cond delay="0"/>
-                            </p:stCondLst>
-                            <p:childTnLst>
-                              <p:par>
-                                <p:cTn id="20" presetID="10" presetClass="entr" presetSubtype="0" fill="hold" grpId="0" nodeType="clickEffect">
-                                  <p:stCondLst>
-                                    <p:cond delay="0"/>
-                                  </p:stCondLst>
-                                  <p:childTnLst>
-                                    <p:set>
-                                      <p:cBhvr>
-                                        <p:cTn id="21" dur="1" fill="hold">
-                                          <p:stCondLst>
-                                            <p:cond delay="0"/>
-                                          </p:stCondLst>
-                                        </p:cTn>
-                                        <p:tgtEl>
-                                          <p:spTgt spid="3">
-                                            <p:txEl>
-                                              <p:pRg st="3" end="3"/>
-                                            </p:txEl>
-                                          </p:spTgt>
-                                        </p:tgtEl>
-                                        <p:attrNameLst>
-                                          <p:attrName>style.visibility</p:attrName>
-                                        </p:attrNameLst>
-                                      </p:cBhvr>
-                                      <p:to>
-                                        <p:strVal val="visible"/>
-                                      </p:to>
-                                    </p:set>
-                                    <p:animEffect transition="in" filter="fade">
-                                      <p:cBhvr>
-                                        <p:cTn id="22" dur="500"/>
-                                        <p:tgtEl>
-                                          <p:spTgt spid="3">
-                                            <p:txEl>
-                                              <p:pRg st="3" end="3"/>
-                                            </p:txEl>
-                                          </p:spTgt>
-                                        </p:tgtEl>
-                                      </p:cBhvr>
-                                    </p:animEffect>
-                                  </p:childTnLst>
-                                </p:cTn>
-                              </p:par>
-                            </p:childTnLst>
-                          </p:cTn>
-                        </p:par>
-                      </p:childTnLst>
-                    </p:cTn>
-                  </p:par>
-                  <p:par>
-                    <p:cTn id="23" fill="hold">
-                      <p:stCondLst>
-                        <p:cond delay="indefinite"/>
-                      </p:stCondLst>
-                      <p:childTnLst>
-                        <p:par>
-                          <p:cTn id="24" fill="hold">
-                            <p:stCondLst>
-                              <p:cond delay="0"/>
-                            </p:stCondLst>
-                            <p:childTnLst>
-                              <p:par>
-                                <p:cTn id="25" presetID="10" presetClass="entr" presetSubtype="0" fill="hold" grpId="0" nodeType="clickEffect">
-                                  <p:stCondLst>
-                                    <p:cond delay="0"/>
-                                  </p:stCondLst>
-                                  <p:childTnLst>
-                                    <p:set>
-                                      <p:cBhvr>
-                                        <p:cTn id="26" dur="1" fill="hold">
-                                          <p:stCondLst>
-                                            <p:cond delay="0"/>
-                                          </p:stCondLst>
-                                        </p:cTn>
-                                        <p:tgtEl>
-                                          <p:spTgt spid="3">
-                                            <p:txEl>
-                                              <p:pRg st="4" end="4"/>
-                                            </p:txEl>
-                                          </p:spTgt>
-                                        </p:tgtEl>
-                                        <p:attrNameLst>
-                                          <p:attrName>style.visibility</p:attrName>
-                                        </p:attrNameLst>
-                                      </p:cBhvr>
-                                      <p:to>
-                                        <p:strVal val="visible"/>
-                                      </p:to>
-                                    </p:set>
-                                    <p:animEffect transition="in" filter="fade">
-                                      <p:cBhvr>
-                                        <p:cTn id="27" dur="500"/>
-                                        <p:tgtEl>
-                                          <p:spTgt spid="3">
-                                            <p:txEl>
-                                              <p:pRg st="4" end="4"/>
-                                            </p:txEl>
-                                          </p:spTgt>
-                                        </p:tgtEl>
-                                      </p:cBhvr>
-                                    </p:animEffect>
-                                  </p:childTnLst>
-                                </p:cTn>
-                              </p:par>
-                            </p:childTnLst>
-                          </p:cTn>
-                        </p:par>
-                      </p:childTnLst>
-                    </p:cTn>
-                  </p:par>
-                  <p:par>
-                    <p:cTn id="28" fill="hold">
-                      <p:stCondLst>
-                        <p:cond delay="indefinite"/>
-                      </p:stCondLst>
-                      <p:childTnLst>
-                        <p:par>
-                          <p:cTn id="29" fill="hold">
-                            <p:stCondLst>
-                              <p:cond delay="0"/>
-                            </p:stCondLst>
-                            <p:childTnLst>
-                              <p:par>
-                                <p:cTn id="30" presetID="10" presetClass="entr" presetSubtype="0" fill="hold" grpId="0" nodeType="clickEffect">
-                                  <p:stCondLst>
-                                    <p:cond delay="0"/>
-                                  </p:stCondLst>
-                                  <p:childTnLst>
-                                    <p:set>
-                                      <p:cBhvr>
-                                        <p:cTn id="31" dur="1" fill="hold">
-                                          <p:stCondLst>
-                                            <p:cond delay="0"/>
-                                          </p:stCondLst>
-                                        </p:cTn>
-                                        <p:tgtEl>
-                                          <p:spTgt spid="3">
-                                            <p:txEl>
-                                              <p:pRg st="5" end="5"/>
-                                            </p:txEl>
-                                          </p:spTgt>
-                                        </p:tgtEl>
-                                        <p:attrNameLst>
-                                          <p:attrName>style.visibility</p:attrName>
-                                        </p:attrNameLst>
-                                      </p:cBhvr>
-                                      <p:to>
-                                        <p:strVal val="visible"/>
-                                      </p:to>
-                                    </p:set>
-                                    <p:animEffect transition="in" filter="fade">
-                                      <p:cBhvr>
-                                        <p:cTn id="32" dur="500"/>
-                                        <p:tgtEl>
-                                          <p:spTgt spid="3">
-                                            <p:txEl>
-                                              <p:pRg st="5" end="5"/>
-                                            </p:txEl>
-                                          </p:spTgt>
-                                        </p:tgtEl>
-                                      </p:cBhvr>
-                                    </p:animEffect>
-                                  </p:childTnLst>
-                                </p:cTn>
-                              </p:par>
-                            </p:childTnLst>
-                          </p:cTn>
-                        </p:par>
-                      </p:childTnLst>
-                    </p:cTn>
-                  </p:par>
-                </p:childTnLst>
-              </p:cTn>
-              <p:prevCondLst>
-                <p:cond evt="onPrev" delay="0">
-                  <p:tgtEl>
-                    <p:sldTgt/>
-                  </p:tgtEl>
-                </p:cond>
-              </p:prevCondLst>
-              <p:nextCondLst>
-                <p:cond evt="onNext" delay="0">
-                  <p:tgtEl>
-                    <p:sldTgt/>
-                  </p:tgtEl>
-                </p:cond>
-              </p:nextCondLst>
-            </p:seq>
-          </p:childTnLst>
-        </p:cTn>
-      </p:par>
-    </p:tnLst>
-    <p:bldLst>
-      <p:bldP spid="3" grpId="0" build="p"/>
-    </p:bldLst>
-  </p:timing>
-</p:sld>
-</file>
-
-<file path=ppt/slides/slide31.xml><?xml version="1.0" encoding="utf-8"?>
-<p:sld xmlns:a="http://schemas.openxmlformats.org/drawingml/2006/main" xmlns:r="http://schemas.openxmlformats.org/officeDocument/2006/relationships" xmlns:p="http://schemas.openxmlformats.org/presentationml/2006/main">
-  <p:cSld>
-    <p:spTree>
-      <p:nvGrpSpPr>
-        <p:cNvPr id="1" name=""/>
-        <p:cNvGrpSpPr/>
-        <p:nvPr/>
-      </p:nvGrpSpPr>
-      <p:grpSpPr>
-        <a:xfrm>
-          <a:off x="0" y="0"/>
-          <a:ext cx="0" cy="0"/>
-          <a:chOff x="0" y="0"/>
-          <a:chExt cx="0" cy="0"/>
-        </a:xfrm>
-      </p:grpSpPr>
-      <p:sp>
-        <p:nvSpPr>
-          <p:cNvPr id="2" name="Title 1">
-            <a:extLst>
-              <a:ext uri="{FF2B5EF4-FFF2-40B4-BE49-F238E27FC236}">
                 <a16:creationId xmlns:a16="http://schemas.microsoft.com/office/drawing/2014/main" id="{849F7CAF-26B9-4F39-9397-1EDAFA8E164F}"/>
               </a:ext>
             </a:extLst>
@@ -29908,7 +29436,7 @@
         </p:spPr>
         <p:txBody>
           <a:bodyPr>
-            <a:normAutofit lnSpcReduction="10000"/>
+            <a:normAutofit fontScale="92500"/>
           </a:bodyPr>
           <a:lstStyle/>
           <a:p>
@@ -30604,7 +30132,7 @@
 </p:sld>
 </file>
 
-<file path=ppt/slides/slide32.xml><?xml version="1.0" encoding="utf-8"?>
+<file path=ppt/slides/slide31.xml><?xml version="1.0" encoding="utf-8"?>
 <p:sld xmlns:a="http://schemas.openxmlformats.org/drawingml/2006/main" xmlns:r="http://schemas.openxmlformats.org/officeDocument/2006/relationships" xmlns:p="http://schemas.openxmlformats.org/presentationml/2006/main">
   <p:cSld>
     <p:spTree>
@@ -30690,7 +30218,7 @@
 </p:sld>
 </file>
 
-<file path=ppt/slides/slide33.xml><?xml version="1.0" encoding="utf-8"?>
+<file path=ppt/slides/slide32.xml><?xml version="1.0" encoding="utf-8"?>
 <p:sld xmlns:a="http://schemas.openxmlformats.org/drawingml/2006/main" xmlns:r="http://schemas.openxmlformats.org/officeDocument/2006/relationships" xmlns:p="http://schemas.openxmlformats.org/presentationml/2006/main">
   <p:cSld>
     <p:spTree>
@@ -30729,9 +30257,10 @@
           <a:lstStyle/>
           <a:p>
             <a:r>
-              <a:rPr lang="en-US" dirty="0"/>
-              <a:t>You Have An Awesome Staff!</a:t>
-            </a:r>
+              <a:rPr lang="en-US" dirty="0" smtClean="0"/>
+              <a:t>Stuff We Already Know How to Do…</a:t>
+            </a:r>
+            <a:endParaRPr lang="en-US" dirty="0"/>
           </a:p>
         </p:txBody>
       </p:sp>
@@ -30759,60 +30288,45 @@
           <a:lstStyle/>
           <a:p>
             <a:r>
+              <a:rPr lang="en-US" dirty="0" smtClean="0"/>
+              <a:t>Application </a:t>
+            </a:r>
+            <a:r>
               <a:rPr lang="en-US" dirty="0"/>
-              <a:t>I wanted to do a proof of concept for the developer story with docker…</a:t>
-            </a:r>
-          </a:p>
-          <a:p>
-            <a:r>
-              <a:rPr lang="en-US" dirty="0"/>
-              <a:t>These guys already know how to handle:</a:t>
-            </a:r>
-          </a:p>
-          <a:p>
-            <a:pPr lvl="1"/>
-            <a:r>
-              <a:rPr lang="en-US" dirty="0"/>
-              <a:t>Application monitoring</a:t>
-            </a:r>
-          </a:p>
-          <a:p>
-            <a:pPr lvl="1"/>
+              <a:t>monitoring</a:t>
+            </a:r>
+          </a:p>
+          <a:p>
             <a:r>
               <a:rPr lang="en-US" dirty="0"/>
               <a:t>Application isolation</a:t>
             </a:r>
           </a:p>
           <a:p>
-            <a:pPr lvl="1"/>
             <a:r>
               <a:rPr lang="en-US" dirty="0"/>
               <a:t>License auditing and control</a:t>
             </a:r>
           </a:p>
           <a:p>
-            <a:pPr lvl="1"/>
             <a:r>
               <a:rPr lang="en-US" dirty="0"/>
               <a:t>Patching and scheduling patches</a:t>
             </a:r>
           </a:p>
           <a:p>
-            <a:pPr lvl="1"/>
             <a:r>
               <a:rPr lang="en-US" dirty="0"/>
               <a:t>Disaster recovery</a:t>
             </a:r>
           </a:p>
           <a:p>
-            <a:pPr lvl="1"/>
             <a:r>
               <a:rPr lang="en-US" dirty="0"/>
               <a:t>Resource allocation</a:t>
             </a:r>
           </a:p>
           <a:p>
-            <a:pPr lvl="1"/>
             <a:r>
               <a:rPr lang="en-US" dirty="0" err="1"/>
               <a:t>Etc</a:t>
@@ -30823,7 +30337,6 @@
             </a:r>
           </a:p>
           <a:p>
-            <a:pPr lvl="1"/>
             <a:endParaRPr lang="en-US" dirty="0"/>
           </a:p>
         </p:txBody>
@@ -31273,128 +30786,6 @@
                       </p:childTnLst>
                     </p:cTn>
                   </p:par>
-                  <p:par>
-                    <p:cTn id="38" fill="hold">
-                      <p:stCondLst>
-                        <p:cond delay="indefinite"/>
-                      </p:stCondLst>
-                      <p:childTnLst>
-                        <p:par>
-                          <p:cTn id="39" fill="hold">
-                            <p:stCondLst>
-                              <p:cond delay="0"/>
-                            </p:stCondLst>
-                            <p:childTnLst>
-                              <p:par>
-                                <p:cTn id="40" presetID="10" presetClass="entr" presetSubtype="0" fill="hold" grpId="0" nodeType="clickEffect">
-                                  <p:stCondLst>
-                                    <p:cond delay="0"/>
-                                  </p:stCondLst>
-                                  <p:childTnLst>
-                                    <p:set>
-                                      <p:cBhvr>
-                                        <p:cTn id="41" dur="1" fill="hold">
-                                          <p:stCondLst>
-                                            <p:cond delay="0"/>
-                                          </p:stCondLst>
-                                        </p:cTn>
-                                        <p:tgtEl>
-                                          <p:spTgt spid="3">
-                                            <p:txEl>
-                                              <p:pRg st="7" end="7"/>
-                                            </p:txEl>
-                                          </p:spTgt>
-                                        </p:tgtEl>
-                                        <p:attrNameLst>
-                                          <p:attrName>style.visibility</p:attrName>
-                                        </p:attrNameLst>
-                                      </p:cBhvr>
-                                      <p:to>
-                                        <p:strVal val="visible"/>
-                                      </p:to>
-                                    </p:set>
-                                    <p:animEffect transition="in" filter="fade">
-                                      <p:cBhvr>
-                                        <p:cTn id="42" dur="500"/>
-                                        <p:tgtEl>
-                                          <p:spTgt spid="3">
-                                            <p:txEl>
-                                              <p:pRg st="7" end="7"/>
-                                            </p:txEl>
-                                          </p:spTgt>
-                                        </p:tgtEl>
-                                      </p:cBhvr>
-                                    </p:animEffect>
-                                  </p:childTnLst>
-                                </p:cTn>
-                              </p:par>
-                            </p:childTnLst>
-                          </p:cTn>
-                        </p:par>
-                      </p:childTnLst>
-                    </p:cTn>
-                  </p:par>
-                  <p:par>
-                    <p:cTn id="43" fill="hold">
-                      <p:stCondLst>
-                        <p:cond delay="indefinite"/>
-                      </p:stCondLst>
-                      <p:childTnLst>
-                        <p:par>
-                          <p:cTn id="44" fill="hold">
-                            <p:stCondLst>
-                              <p:cond delay="0"/>
-                            </p:stCondLst>
-                            <p:childTnLst>
-                              <p:par>
-                                <p:cTn id="45" presetID="10" presetClass="entr" presetSubtype="0" fill="hold" grpId="0" nodeType="clickEffect">
-                                  <p:stCondLst>
-                                    <p:cond delay="0"/>
-                                  </p:stCondLst>
-                                  <p:childTnLst>
-                                    <p:set>
-                                      <p:cBhvr>
-                                        <p:cTn id="46" dur="1" fill="hold">
-                                          <p:stCondLst>
-                                            <p:cond delay="0"/>
-                                          </p:stCondLst>
-                                        </p:cTn>
-                                        <p:tgtEl>
-                                          <p:spTgt spid="3">
-                                            <p:txEl>
-                                              <p:pRg st="8" end="8"/>
-                                            </p:txEl>
-                                          </p:spTgt>
-                                        </p:tgtEl>
-                                        <p:attrNameLst>
-                                          <p:attrName>style.visibility</p:attrName>
-                                        </p:attrNameLst>
-                                      </p:cBhvr>
-                                      <p:to>
-                                        <p:strVal val="visible"/>
-                                      </p:to>
-                                    </p:set>
-                                    <p:animEffect transition="in" filter="fade">
-                                      <p:cBhvr>
-                                        <p:cTn id="47" dur="500"/>
-                                        <p:tgtEl>
-                                          <p:spTgt spid="3">
-                                            <p:txEl>
-                                              <p:pRg st="8" end="8"/>
-                                            </p:txEl>
-                                          </p:spTgt>
-                                        </p:tgtEl>
-                                      </p:cBhvr>
-                                    </p:animEffect>
-                                  </p:childTnLst>
-                                </p:cTn>
-                              </p:par>
-                            </p:childTnLst>
-                          </p:cTn>
-                        </p:par>
-                      </p:childTnLst>
-                    </p:cTn>
-                  </p:par>
                 </p:childTnLst>
               </p:cTn>
               <p:prevCondLst>
@@ -31423,7 +30814,7 @@
 </p:sld>
 </file>
 
-<file path=ppt/slides/slide34.xml><?xml version="1.0" encoding="utf-8"?>
+<file path=ppt/slides/slide33.xml><?xml version="1.0" encoding="utf-8"?>
 <p:sld xmlns:a="http://schemas.openxmlformats.org/drawingml/2006/main" xmlns:r="http://schemas.openxmlformats.org/officeDocument/2006/relationships" xmlns:p="http://schemas.openxmlformats.org/presentationml/2006/main">
   <p:cSld>
     <p:spTree>
@@ -31987,7 +31378,7 @@
 </p:sld>
 </file>
 
-<file path=ppt/slides/slide35.xml><?xml version="1.0" encoding="utf-8"?>
+<file path=ppt/slides/slide34.xml><?xml version="1.0" encoding="utf-8"?>
 <p:sld xmlns:a="http://schemas.openxmlformats.org/drawingml/2006/main" xmlns:r="http://schemas.openxmlformats.org/officeDocument/2006/relationships" xmlns:p="http://schemas.openxmlformats.org/presentationml/2006/main">
   <p:cSld>
     <p:spTree>
@@ -32816,7 +32207,7 @@
 </p:sld>
 </file>
 
-<file path=ppt/slides/slide36.xml><?xml version="1.0" encoding="utf-8"?>
+<file path=ppt/slides/slide35.xml><?xml version="1.0" encoding="utf-8"?>
 <p:sld xmlns:a="http://schemas.openxmlformats.org/drawingml/2006/main" xmlns:r="http://schemas.openxmlformats.org/officeDocument/2006/relationships" xmlns:p="http://schemas.openxmlformats.org/presentationml/2006/main">
   <p:cSld>
     <p:spTree>
@@ -32902,7 +32293,7 @@
 </p:sld>
 </file>
 
-<file path=ppt/slides/slide37.xml><?xml version="1.0" encoding="utf-8"?>
+<file path=ppt/slides/slide36.xml><?xml version="1.0" encoding="utf-8"?>
 <p:sld xmlns:a="http://schemas.openxmlformats.org/drawingml/2006/main" xmlns:r="http://schemas.openxmlformats.org/officeDocument/2006/relationships" xmlns:p="http://schemas.openxmlformats.org/presentationml/2006/main">
   <p:cSld>
     <p:spTree>
@@ -33478,7 +32869,7 @@
 </p:sld>
 </file>
 
-<file path=ppt/slides/slide38.xml><?xml version="1.0" encoding="utf-8"?>
+<file path=ppt/slides/slide37.xml><?xml version="1.0" encoding="utf-8"?>
 <p:sld xmlns:a="http://schemas.openxmlformats.org/drawingml/2006/main" xmlns:r="http://schemas.openxmlformats.org/officeDocument/2006/relationships" xmlns:p="http://schemas.openxmlformats.org/presentationml/2006/main">
   <p:cSld>
     <p:spTree>
@@ -34198,7 +33589,7 @@
 </p:sld>
 </file>
 
-<file path=ppt/slides/slide39.xml><?xml version="1.0" encoding="utf-8"?>
+<file path=ppt/slides/slide38.xml><?xml version="1.0" encoding="utf-8"?>
 <p:sld xmlns:a="http://schemas.openxmlformats.org/drawingml/2006/main" xmlns:r="http://schemas.openxmlformats.org/officeDocument/2006/relationships" xmlns:p="http://schemas.openxmlformats.org/presentationml/2006/main">
   <p:cSld>
     <p:spTree>
@@ -34931,266 +34322,7 @@
 </p:sld>
 </file>
 
-<file path=ppt/slides/slide4.xml><?xml version="1.0" encoding="utf-8"?>
-<p:sld xmlns:a="http://schemas.openxmlformats.org/drawingml/2006/main" xmlns:r="http://schemas.openxmlformats.org/officeDocument/2006/relationships" xmlns:p="http://schemas.openxmlformats.org/presentationml/2006/main">
-  <p:cSld>
-    <p:spTree>
-      <p:nvGrpSpPr>
-        <p:cNvPr id="1" name=""/>
-        <p:cNvGrpSpPr/>
-        <p:nvPr/>
-      </p:nvGrpSpPr>
-      <p:grpSpPr>
-        <a:xfrm>
-          <a:off x="0" y="0"/>
-          <a:ext cx="0" cy="0"/>
-          <a:chOff x="0" y="0"/>
-          <a:chExt cx="0" cy="0"/>
-        </a:xfrm>
-      </p:grpSpPr>
-      <p:sp>
-        <p:nvSpPr>
-          <p:cNvPr id="2" name="Title 1">
-            <a:extLst>
-              <a:ext uri="{FF2B5EF4-FFF2-40B4-BE49-F238E27FC236}">
-                <a16:creationId xmlns:a16="http://schemas.microsoft.com/office/drawing/2014/main" id="{4203C5A5-9815-40B7-B6A3-11624AD5D70B}"/>
-              </a:ext>
-            </a:extLst>
-          </p:cNvPr>
-          <p:cNvSpPr>
-            <a:spLocks noGrp="1"/>
-          </p:cNvSpPr>
-          <p:nvPr>
-            <p:ph type="title"/>
-          </p:nvPr>
-        </p:nvSpPr>
-        <p:spPr/>
-        <p:txBody>
-          <a:bodyPr/>
-          <a:lstStyle/>
-          <a:p>
-            <a:r>
-              <a:rPr lang="en-US" dirty="0"/>
-              <a:t>Beginning of a Super-Quick Demo</a:t>
-            </a:r>
-          </a:p>
-        </p:txBody>
-      </p:sp>
-      <p:sp>
-        <p:nvSpPr>
-          <p:cNvPr id="3" name="Content Placeholder 2">
-            <a:extLst>
-              <a:ext uri="{FF2B5EF4-FFF2-40B4-BE49-F238E27FC236}">
-                <a16:creationId xmlns:a16="http://schemas.microsoft.com/office/drawing/2014/main" id="{D3CB0566-8F38-499D-952E-09A2A91495B7}"/>
-              </a:ext>
-            </a:extLst>
-          </p:cNvPr>
-          <p:cNvSpPr>
-            <a:spLocks noGrp="1"/>
-          </p:cNvSpPr>
-          <p:nvPr>
-            <p:ph idx="1"/>
-          </p:nvPr>
-        </p:nvSpPr>
-        <p:spPr/>
-        <p:txBody>
-          <a:bodyPr>
-            <a:normAutofit/>
-          </a:bodyPr>
-          <a:lstStyle/>
-          <a:p>
-            <a:pPr>
-              <a:lnSpc>
-                <a:spcPct val="200000"/>
-              </a:lnSpc>
-            </a:pPr>
-            <a:r>
-              <a:rPr lang="en-US" dirty="0"/>
-              <a:t>Show SQL Server is not installed</a:t>
-            </a:r>
-          </a:p>
-          <a:p>
-            <a:pPr>
-              <a:lnSpc>
-                <a:spcPct val="200000"/>
-              </a:lnSpc>
-            </a:pPr>
-            <a:r>
-              <a:rPr lang="en-US" dirty="0"/>
-              <a:t>Use docker to configure SQL Server, no installation or admin intervention required</a:t>
-            </a:r>
-          </a:p>
-        </p:txBody>
-      </p:sp>
-    </p:spTree>
-    <p:extLst>
-      <p:ext uri="{BB962C8B-B14F-4D97-AF65-F5344CB8AC3E}">
-        <p14:creationId xmlns:p14="http://schemas.microsoft.com/office/powerpoint/2010/main" val="1031436550"/>
-      </p:ext>
-    </p:extLst>
-  </p:cSld>
-  <p:clrMapOvr>
-    <a:masterClrMapping/>
-  </p:clrMapOvr>
-  <p:timing>
-    <p:tnLst>
-      <p:par>
-        <p:cTn id="1" dur="indefinite" restart="never" nodeType="tmRoot">
-          <p:childTnLst>
-            <p:seq concurrent="1" nextAc="seek">
-              <p:cTn id="2" dur="indefinite" nodeType="mainSeq">
-                <p:childTnLst>
-                  <p:par>
-                    <p:cTn id="3" fill="hold">
-                      <p:stCondLst>
-                        <p:cond delay="indefinite"/>
-                      </p:stCondLst>
-                      <p:childTnLst>
-                        <p:par>
-                          <p:cTn id="4" fill="hold">
-                            <p:stCondLst>
-                              <p:cond delay="0"/>
-                            </p:stCondLst>
-                            <p:childTnLst>
-                              <p:par>
-                                <p:cTn id="5" presetID="10" presetClass="entr" presetSubtype="0" fill="hold" grpId="0" nodeType="clickEffect">
-                                  <p:stCondLst>
-                                    <p:cond delay="0"/>
-                                  </p:stCondLst>
-                                  <p:childTnLst>
-                                    <p:set>
-                                      <p:cBhvr>
-                                        <p:cTn id="6" dur="1" fill="hold">
-                                          <p:stCondLst>
-                                            <p:cond delay="0"/>
-                                          </p:stCondLst>
-                                        </p:cTn>
-                                        <p:tgtEl>
-                                          <p:spTgt spid="3">
-                                            <p:txEl>
-                                              <p:pRg st="0" end="0"/>
-                                            </p:txEl>
-                                          </p:spTgt>
-                                        </p:tgtEl>
-                                        <p:attrNameLst>
-                                          <p:attrName>style.visibility</p:attrName>
-                                        </p:attrNameLst>
-                                      </p:cBhvr>
-                                      <p:to>
-                                        <p:strVal val="visible"/>
-                                      </p:to>
-                                    </p:set>
-                                    <p:animEffect transition="in" filter="fade">
-                                      <p:cBhvr>
-                                        <p:cTn id="7" dur="500"/>
-                                        <p:tgtEl>
-                                          <p:spTgt spid="3">
-                                            <p:txEl>
-                                              <p:pRg st="0" end="0"/>
-                                            </p:txEl>
-                                          </p:spTgt>
-                                        </p:tgtEl>
-                                      </p:cBhvr>
-                                    </p:animEffect>
-                                  </p:childTnLst>
-                                </p:cTn>
-                              </p:par>
-                            </p:childTnLst>
-                          </p:cTn>
-                        </p:par>
-                      </p:childTnLst>
-                    </p:cTn>
-                  </p:par>
-                  <p:par>
-                    <p:cTn id="8" fill="hold">
-                      <p:stCondLst>
-                        <p:cond delay="indefinite"/>
-                      </p:stCondLst>
-                      <p:childTnLst>
-                        <p:par>
-                          <p:cTn id="9" fill="hold">
-                            <p:stCondLst>
-                              <p:cond delay="0"/>
-                            </p:stCondLst>
-                            <p:childTnLst>
-                              <p:par>
-                                <p:cTn id="10" presetID="10" presetClass="entr" presetSubtype="0" fill="hold" grpId="0" nodeType="clickEffect">
-                                  <p:stCondLst>
-                                    <p:cond delay="0"/>
-                                  </p:stCondLst>
-                                  <p:childTnLst>
-                                    <p:set>
-                                      <p:cBhvr>
-                                        <p:cTn id="11" dur="1" fill="hold">
-                                          <p:stCondLst>
-                                            <p:cond delay="0"/>
-                                          </p:stCondLst>
-                                        </p:cTn>
-                                        <p:tgtEl>
-                                          <p:spTgt spid="3">
-                                            <p:txEl>
-                                              <p:pRg st="1" end="1"/>
-                                            </p:txEl>
-                                          </p:spTgt>
-                                        </p:tgtEl>
-                                        <p:attrNameLst>
-                                          <p:attrName>style.visibility</p:attrName>
-                                        </p:attrNameLst>
-                                      </p:cBhvr>
-                                      <p:to>
-                                        <p:strVal val="visible"/>
-                                      </p:to>
-                                    </p:set>
-                                    <p:animEffect transition="in" filter="fade">
-                                      <p:cBhvr>
-                                        <p:cTn id="12" dur="500"/>
-                                        <p:tgtEl>
-                                          <p:spTgt spid="3">
-                                            <p:txEl>
-                                              <p:pRg st="1" end="1"/>
-                                            </p:txEl>
-                                          </p:spTgt>
-                                        </p:tgtEl>
-                                      </p:cBhvr>
-                                    </p:animEffect>
-                                  </p:childTnLst>
-                                </p:cTn>
-                              </p:par>
-                            </p:childTnLst>
-                          </p:cTn>
-                        </p:par>
-                      </p:childTnLst>
-                    </p:cTn>
-                  </p:par>
-                </p:childTnLst>
-              </p:cTn>
-              <p:prevCondLst>
-                <p:cond evt="onPrev" delay="0">
-                  <p:tgtEl>
-                    <p:sldTgt/>
-                  </p:tgtEl>
-                </p:cond>
-              </p:prevCondLst>
-              <p:nextCondLst>
-                <p:cond evt="onNext" delay="0">
-                  <p:tgtEl>
-                    <p:sldTgt/>
-                  </p:tgtEl>
-                </p:cond>
-              </p:nextCondLst>
-            </p:seq>
-          </p:childTnLst>
-        </p:cTn>
-      </p:par>
-    </p:tnLst>
-    <p:bldLst>
-      <p:bldP spid="3" grpId="0" build="p"/>
-    </p:bldLst>
-  </p:timing>
-</p:sld>
-</file>
-
-<file path=ppt/slides/slide40.xml><?xml version="1.0" encoding="utf-8"?>
+<file path=ppt/slides/slide39.xml><?xml version="1.0" encoding="utf-8"?>
 <p:sld xmlns:a="http://schemas.openxmlformats.org/drawingml/2006/main" xmlns:r="http://schemas.openxmlformats.org/officeDocument/2006/relationships" xmlns:p="http://schemas.openxmlformats.org/presentationml/2006/main">
   <p:cSld>
     <p:spTree>
@@ -35900,7 +35032,93 @@
 </p:sld>
 </file>
 
-<file path=ppt/slides/slide41.xml><?xml version="1.0" encoding="utf-8"?>
+<file path=ppt/slides/slide4.xml><?xml version="1.0" encoding="utf-8"?>
+<p:sld xmlns:a="http://schemas.openxmlformats.org/drawingml/2006/main" xmlns:r="http://schemas.openxmlformats.org/officeDocument/2006/relationships" xmlns:p="http://schemas.openxmlformats.org/presentationml/2006/main">
+  <p:cSld>
+    <p:spTree>
+      <p:nvGrpSpPr>
+        <p:cNvPr id="1" name=""/>
+        <p:cNvGrpSpPr/>
+        <p:nvPr/>
+      </p:nvGrpSpPr>
+      <p:grpSpPr>
+        <a:xfrm>
+          <a:off x="0" y="0"/>
+          <a:ext cx="0" cy="0"/>
+          <a:chOff x="0" y="0"/>
+          <a:chExt cx="0" cy="0"/>
+        </a:xfrm>
+      </p:grpSpPr>
+      <p:sp>
+        <p:nvSpPr>
+          <p:cNvPr id="2" name="Title 1">
+            <a:extLst>
+              <a:ext uri="{FF2B5EF4-FFF2-40B4-BE49-F238E27FC236}">
+                <a16:creationId xmlns:a16="http://schemas.microsoft.com/office/drawing/2014/main" id="{AD0EF887-B521-4A7D-B159-25C51A913FFC}"/>
+              </a:ext>
+            </a:extLst>
+          </p:cNvPr>
+          <p:cNvSpPr>
+            <a:spLocks noGrp="1"/>
+          </p:cNvSpPr>
+          <p:nvPr>
+            <p:ph type="title"/>
+          </p:nvPr>
+        </p:nvSpPr>
+        <p:spPr/>
+        <p:txBody>
+          <a:bodyPr/>
+          <a:lstStyle/>
+          <a:p>
+            <a:r>
+              <a:rPr lang="en-US" dirty="0"/>
+              <a:t>A Problem Statement</a:t>
+            </a:r>
+          </a:p>
+        </p:txBody>
+      </p:sp>
+      <p:sp>
+        <p:nvSpPr>
+          <p:cNvPr id="3" name="Text Placeholder 2">
+            <a:extLst>
+              <a:ext uri="{FF2B5EF4-FFF2-40B4-BE49-F238E27FC236}">
+                <a16:creationId xmlns:a16="http://schemas.microsoft.com/office/drawing/2014/main" id="{40F93536-9D2E-4485-A099-5ABD38646551}"/>
+              </a:ext>
+            </a:extLst>
+          </p:cNvPr>
+          <p:cNvSpPr>
+            <a:spLocks noGrp="1"/>
+          </p:cNvSpPr>
+          <p:nvPr>
+            <p:ph type="body" idx="1"/>
+          </p:nvPr>
+        </p:nvSpPr>
+        <p:spPr/>
+        <p:txBody>
+          <a:bodyPr/>
+          <a:lstStyle/>
+          <a:p>
+            <a:r>
+              <a:rPr lang="en-US" dirty="0"/>
+              <a:t>The Part Where I tell you what you already know</a:t>
+            </a:r>
+          </a:p>
+        </p:txBody>
+      </p:sp>
+    </p:spTree>
+    <p:extLst>
+      <p:ext uri="{BB962C8B-B14F-4D97-AF65-F5344CB8AC3E}">
+        <p14:creationId xmlns:p14="http://schemas.microsoft.com/office/powerpoint/2010/main" val="1835612889"/>
+      </p:ext>
+    </p:extLst>
+  </p:cSld>
+  <p:clrMapOvr>
+    <a:masterClrMapping/>
+  </p:clrMapOvr>
+</p:sld>
+</file>
+
+<file path=ppt/slides/slide40.xml><?xml version="1.0" encoding="utf-8"?>
 <p:sld xmlns:a="http://schemas.openxmlformats.org/drawingml/2006/main" xmlns:r="http://schemas.openxmlformats.org/officeDocument/2006/relationships" xmlns:p="http://schemas.openxmlformats.org/presentationml/2006/main">
   <p:cSld>
     <p:spTree>
@@ -35964,7 +35182,7 @@
         <p:spPr/>
         <p:txBody>
           <a:bodyPr>
-            <a:normAutofit fontScale="92500" lnSpcReduction="20000"/>
+            <a:normAutofit fontScale="85000" lnSpcReduction="10000"/>
           </a:bodyPr>
           <a:lstStyle/>
           <a:p>
@@ -36390,271 +35608,7 @@
 </p:sld>
 </file>
 
-<file path=ppt/slides/slide42.xml><?xml version="1.0" encoding="utf-8"?>
-<p:sld xmlns:a="http://schemas.openxmlformats.org/drawingml/2006/main" xmlns:r="http://schemas.openxmlformats.org/officeDocument/2006/relationships" xmlns:p="http://schemas.openxmlformats.org/presentationml/2006/main">
-  <p:cSld>
-    <p:spTree>
-      <p:nvGrpSpPr>
-        <p:cNvPr id="1" name=""/>
-        <p:cNvGrpSpPr/>
-        <p:nvPr/>
-      </p:nvGrpSpPr>
-      <p:grpSpPr>
-        <a:xfrm>
-          <a:off x="0" y="0"/>
-          <a:ext cx="0" cy="0"/>
-          <a:chOff x="0" y="0"/>
-          <a:chExt cx="0" cy="0"/>
-        </a:xfrm>
-      </p:grpSpPr>
-      <p:sp>
-        <p:nvSpPr>
-          <p:cNvPr id="2" name="Title 1">
-            <a:extLst>
-              <a:ext uri="{FF2B5EF4-FFF2-40B4-BE49-F238E27FC236}">
-                <a16:creationId xmlns:a16="http://schemas.microsoft.com/office/drawing/2014/main" id="{4203C5A5-9815-40B7-B6A3-11624AD5D70B}"/>
-              </a:ext>
-            </a:extLst>
-          </p:cNvPr>
-          <p:cNvSpPr>
-            <a:spLocks noGrp="1"/>
-          </p:cNvSpPr>
-          <p:nvPr>
-            <p:ph type="title"/>
-          </p:nvPr>
-        </p:nvSpPr>
-        <p:spPr/>
-        <p:txBody>
-          <a:bodyPr/>
-          <a:lstStyle/>
-          <a:p>
-            <a:r>
-              <a:rPr lang="en-US" dirty="0"/>
-              <a:t>Ending of a Super-Quick Demo</a:t>
-            </a:r>
-          </a:p>
-        </p:txBody>
-      </p:sp>
-      <p:sp>
-        <p:nvSpPr>
-          <p:cNvPr id="3" name="Content Placeholder 2">
-            <a:extLst>
-              <a:ext uri="{FF2B5EF4-FFF2-40B4-BE49-F238E27FC236}">
-                <a16:creationId xmlns:a16="http://schemas.microsoft.com/office/drawing/2014/main" id="{D3CB0566-8F38-499D-952E-09A2A91495B7}"/>
-              </a:ext>
-            </a:extLst>
-          </p:cNvPr>
-          <p:cNvSpPr>
-            <a:spLocks noGrp="1"/>
-          </p:cNvSpPr>
-          <p:nvPr>
-            <p:ph idx="1"/>
-          </p:nvPr>
-        </p:nvSpPr>
-        <p:spPr/>
-        <p:txBody>
-          <a:bodyPr>
-            <a:normAutofit/>
-          </a:bodyPr>
-          <a:lstStyle/>
-          <a:p>
-            <a:pPr>
-              <a:lnSpc>
-                <a:spcPct val="200000"/>
-              </a:lnSpc>
-            </a:pPr>
-            <a:r>
-              <a:rPr lang="en-US" dirty="0"/>
-              <a:t>Start SQL Server</a:t>
-            </a:r>
-          </a:p>
-          <a:p>
-            <a:pPr>
-              <a:lnSpc>
-                <a:spcPct val="200000"/>
-              </a:lnSpc>
-            </a:pPr>
-            <a:r>
-              <a:rPr lang="en-US" dirty="0"/>
-              <a:t>Demonstrate </a:t>
-            </a:r>
-            <a:r>
-              <a:rPr lang="en-US"/>
-              <a:t>a connection</a:t>
-            </a:r>
-            <a:endParaRPr lang="en-US" dirty="0"/>
-          </a:p>
-        </p:txBody>
-      </p:sp>
-    </p:spTree>
-    <p:extLst>
-      <p:ext uri="{BB962C8B-B14F-4D97-AF65-F5344CB8AC3E}">
-        <p14:creationId xmlns:p14="http://schemas.microsoft.com/office/powerpoint/2010/main" val="3152235299"/>
-      </p:ext>
-    </p:extLst>
-  </p:cSld>
-  <p:clrMapOvr>
-    <a:masterClrMapping/>
-  </p:clrMapOvr>
-  <p:timing>
-    <p:tnLst>
-      <p:par>
-        <p:cTn id="1" dur="indefinite" restart="never" nodeType="tmRoot">
-          <p:childTnLst>
-            <p:seq concurrent="1" nextAc="seek">
-              <p:cTn id="2" dur="indefinite" nodeType="mainSeq">
-                <p:childTnLst>
-                  <p:par>
-                    <p:cTn id="3" fill="hold">
-                      <p:stCondLst>
-                        <p:cond delay="indefinite"/>
-                      </p:stCondLst>
-                      <p:childTnLst>
-                        <p:par>
-                          <p:cTn id="4" fill="hold">
-                            <p:stCondLst>
-                              <p:cond delay="0"/>
-                            </p:stCondLst>
-                            <p:childTnLst>
-                              <p:par>
-                                <p:cTn id="5" presetID="10" presetClass="entr" presetSubtype="0" fill="hold" grpId="0" nodeType="clickEffect">
-                                  <p:stCondLst>
-                                    <p:cond delay="0"/>
-                                  </p:stCondLst>
-                                  <p:childTnLst>
-                                    <p:set>
-                                      <p:cBhvr>
-                                        <p:cTn id="6" dur="1" fill="hold">
-                                          <p:stCondLst>
-                                            <p:cond delay="0"/>
-                                          </p:stCondLst>
-                                        </p:cTn>
-                                        <p:tgtEl>
-                                          <p:spTgt spid="3">
-                                            <p:txEl>
-                                              <p:pRg st="0" end="0"/>
-                                            </p:txEl>
-                                          </p:spTgt>
-                                        </p:tgtEl>
-                                        <p:attrNameLst>
-                                          <p:attrName>style.visibility</p:attrName>
-                                        </p:attrNameLst>
-                                      </p:cBhvr>
-                                      <p:to>
-                                        <p:strVal val="visible"/>
-                                      </p:to>
-                                    </p:set>
-                                    <p:animEffect transition="in" filter="fade">
-                                      <p:cBhvr>
-                                        <p:cTn id="7" dur="500"/>
-                                        <p:tgtEl>
-                                          <p:spTgt spid="3">
-                                            <p:txEl>
-                                              <p:pRg st="0" end="0"/>
-                                            </p:txEl>
-                                          </p:spTgt>
-                                        </p:tgtEl>
-                                      </p:cBhvr>
-                                    </p:animEffect>
-                                  </p:childTnLst>
-                                </p:cTn>
-                              </p:par>
-                            </p:childTnLst>
-                          </p:cTn>
-                        </p:par>
-                      </p:childTnLst>
-                    </p:cTn>
-                  </p:par>
-                  <p:par>
-                    <p:cTn id="8" fill="hold">
-                      <p:stCondLst>
-                        <p:cond delay="indefinite"/>
-                      </p:stCondLst>
-                      <p:childTnLst>
-                        <p:par>
-                          <p:cTn id="9" fill="hold">
-                            <p:stCondLst>
-                              <p:cond delay="0"/>
-                            </p:stCondLst>
-                            <p:childTnLst>
-                              <p:par>
-                                <p:cTn id="10" presetID="10" presetClass="entr" presetSubtype="0" fill="hold" grpId="0" nodeType="clickEffect">
-                                  <p:stCondLst>
-                                    <p:cond delay="0"/>
-                                  </p:stCondLst>
-                                  <p:childTnLst>
-                                    <p:set>
-                                      <p:cBhvr>
-                                        <p:cTn id="11" dur="1" fill="hold">
-                                          <p:stCondLst>
-                                            <p:cond delay="0"/>
-                                          </p:stCondLst>
-                                        </p:cTn>
-                                        <p:tgtEl>
-                                          <p:spTgt spid="3">
-                                            <p:txEl>
-                                              <p:pRg st="1" end="1"/>
-                                            </p:txEl>
-                                          </p:spTgt>
-                                        </p:tgtEl>
-                                        <p:attrNameLst>
-                                          <p:attrName>style.visibility</p:attrName>
-                                        </p:attrNameLst>
-                                      </p:cBhvr>
-                                      <p:to>
-                                        <p:strVal val="visible"/>
-                                      </p:to>
-                                    </p:set>
-                                    <p:animEffect transition="in" filter="fade">
-                                      <p:cBhvr>
-                                        <p:cTn id="12" dur="500"/>
-                                        <p:tgtEl>
-                                          <p:spTgt spid="3">
-                                            <p:txEl>
-                                              <p:pRg st="1" end="1"/>
-                                            </p:txEl>
-                                          </p:spTgt>
-                                        </p:tgtEl>
-                                      </p:cBhvr>
-                                    </p:animEffect>
-                                  </p:childTnLst>
-                                </p:cTn>
-                              </p:par>
-                            </p:childTnLst>
-                          </p:cTn>
-                        </p:par>
-                      </p:childTnLst>
-                    </p:cTn>
-                  </p:par>
-                </p:childTnLst>
-              </p:cTn>
-              <p:prevCondLst>
-                <p:cond evt="onPrev" delay="0">
-                  <p:tgtEl>
-                    <p:sldTgt/>
-                  </p:tgtEl>
-                </p:cond>
-              </p:prevCondLst>
-              <p:nextCondLst>
-                <p:cond evt="onNext" delay="0">
-                  <p:tgtEl>
-                    <p:sldTgt/>
-                  </p:tgtEl>
-                </p:cond>
-              </p:nextCondLst>
-            </p:seq>
-          </p:childTnLst>
-        </p:cTn>
-      </p:par>
-    </p:tnLst>
-    <p:bldLst>
-      <p:bldP spid="3" grpId="0" build="p"/>
-    </p:bldLst>
-  </p:timing>
-</p:sld>
-</file>
-
-<file path=ppt/slides/slide43.xml><?xml version="1.0" encoding="utf-8"?>
+<file path=ppt/slides/slide41.xml><?xml version="1.0" encoding="utf-8"?>
 <p:sld xmlns:a="http://schemas.openxmlformats.org/drawingml/2006/main" xmlns:r="http://schemas.openxmlformats.org/officeDocument/2006/relationships" xmlns:p="http://schemas.openxmlformats.org/presentationml/2006/main">
   <p:cSld>
     <p:spTree>
@@ -36742,92 +35696,6 @@
 </file>
 
 <file path=ppt/slides/slide5.xml><?xml version="1.0" encoding="utf-8"?>
-<p:sld xmlns:a="http://schemas.openxmlformats.org/drawingml/2006/main" xmlns:r="http://schemas.openxmlformats.org/officeDocument/2006/relationships" xmlns:p="http://schemas.openxmlformats.org/presentationml/2006/main">
-  <p:cSld>
-    <p:spTree>
-      <p:nvGrpSpPr>
-        <p:cNvPr id="1" name=""/>
-        <p:cNvGrpSpPr/>
-        <p:nvPr/>
-      </p:nvGrpSpPr>
-      <p:grpSpPr>
-        <a:xfrm>
-          <a:off x="0" y="0"/>
-          <a:ext cx="0" cy="0"/>
-          <a:chOff x="0" y="0"/>
-          <a:chExt cx="0" cy="0"/>
-        </a:xfrm>
-      </p:grpSpPr>
-      <p:sp>
-        <p:nvSpPr>
-          <p:cNvPr id="2" name="Title 1">
-            <a:extLst>
-              <a:ext uri="{FF2B5EF4-FFF2-40B4-BE49-F238E27FC236}">
-                <a16:creationId xmlns:a16="http://schemas.microsoft.com/office/drawing/2014/main" id="{AD0EF887-B521-4A7D-B159-25C51A913FFC}"/>
-              </a:ext>
-            </a:extLst>
-          </p:cNvPr>
-          <p:cNvSpPr>
-            <a:spLocks noGrp="1"/>
-          </p:cNvSpPr>
-          <p:nvPr>
-            <p:ph type="title"/>
-          </p:nvPr>
-        </p:nvSpPr>
-        <p:spPr/>
-        <p:txBody>
-          <a:bodyPr/>
-          <a:lstStyle/>
-          <a:p>
-            <a:r>
-              <a:rPr lang="en-US" dirty="0"/>
-              <a:t>A Problem Statement</a:t>
-            </a:r>
-          </a:p>
-        </p:txBody>
-      </p:sp>
-      <p:sp>
-        <p:nvSpPr>
-          <p:cNvPr id="3" name="Text Placeholder 2">
-            <a:extLst>
-              <a:ext uri="{FF2B5EF4-FFF2-40B4-BE49-F238E27FC236}">
-                <a16:creationId xmlns:a16="http://schemas.microsoft.com/office/drawing/2014/main" id="{40F93536-9D2E-4485-A099-5ABD38646551}"/>
-              </a:ext>
-            </a:extLst>
-          </p:cNvPr>
-          <p:cNvSpPr>
-            <a:spLocks noGrp="1"/>
-          </p:cNvSpPr>
-          <p:nvPr>
-            <p:ph type="body" idx="1"/>
-          </p:nvPr>
-        </p:nvSpPr>
-        <p:spPr/>
-        <p:txBody>
-          <a:bodyPr/>
-          <a:lstStyle/>
-          <a:p>
-            <a:r>
-              <a:rPr lang="en-US" dirty="0"/>
-              <a:t>The Part Where I tell you what you already know</a:t>
-            </a:r>
-          </a:p>
-        </p:txBody>
-      </p:sp>
-    </p:spTree>
-    <p:extLst>
-      <p:ext uri="{BB962C8B-B14F-4D97-AF65-F5344CB8AC3E}">
-        <p14:creationId xmlns:p14="http://schemas.microsoft.com/office/powerpoint/2010/main" val="1835612889"/>
-      </p:ext>
-    </p:extLst>
-  </p:cSld>
-  <p:clrMapOvr>
-    <a:masterClrMapping/>
-  </p:clrMapOvr>
-</p:sld>
-</file>
-
-<file path=ppt/slides/slide6.xml><?xml version="1.0" encoding="utf-8"?>
 <p:sld xmlns:a="http://schemas.openxmlformats.org/drawingml/2006/main" xmlns:r="http://schemas.openxmlformats.org/officeDocument/2006/relationships" xmlns:p="http://schemas.openxmlformats.org/presentationml/2006/main">
   <p:cSld>
     <p:spTree>
@@ -37153,7 +36021,7 @@
 </p:sld>
 </file>
 
-<file path=ppt/slides/slide7.xml><?xml version="1.0" encoding="utf-8"?>
+<file path=ppt/slides/slide6.xml><?xml version="1.0" encoding="utf-8"?>
 <p:sld xmlns:a="http://schemas.openxmlformats.org/drawingml/2006/main" xmlns:r="http://schemas.openxmlformats.org/officeDocument/2006/relationships" xmlns:p="http://schemas.openxmlformats.org/presentationml/2006/main">
   <p:cSld>
     <p:spTree>
@@ -37227,7 +36095,7 @@
 </p:sld>
 </file>
 
-<file path=ppt/slides/slide8.xml><?xml version="1.0" encoding="utf-8"?>
+<file path=ppt/slides/slide7.xml><?xml version="1.0" encoding="utf-8"?>
 <p:sld xmlns:a="http://schemas.openxmlformats.org/drawingml/2006/main" xmlns:r="http://schemas.openxmlformats.org/officeDocument/2006/relationships" xmlns:p="http://schemas.openxmlformats.org/presentationml/2006/main">
   <p:cSld>
     <p:spTree>
@@ -37551,7 +36419,7 @@
 </p:sld>
 </file>
 
-<file path=ppt/slides/slide9.xml><?xml version="1.0" encoding="utf-8"?>
+<file path=ppt/slides/slide8.xml><?xml version="1.0" encoding="utf-8"?>
 <p:sld xmlns:a="http://schemas.openxmlformats.org/drawingml/2006/main" xmlns:r="http://schemas.openxmlformats.org/officeDocument/2006/relationships" xmlns:p="http://schemas.openxmlformats.org/presentationml/2006/main">
   <p:cSld>
     <p:spTree>
@@ -38461,6 +37329,474 @@
     <p:bldLst>
       <p:bldP spid="3" grpId="0" uiExpand="1" build="p"/>
       <p:bldP spid="5" grpId="0" animBg="1"/>
+    </p:bldLst>
+  </p:timing>
+</p:sld>
+</file>
+
+<file path=ppt/slides/slide9.xml><?xml version="1.0" encoding="utf-8"?>
+<p:sld xmlns:a="http://schemas.openxmlformats.org/drawingml/2006/main" xmlns:r="http://schemas.openxmlformats.org/officeDocument/2006/relationships" xmlns:p="http://schemas.openxmlformats.org/presentationml/2006/main">
+  <p:cSld>
+    <p:spTree>
+      <p:nvGrpSpPr>
+        <p:cNvPr id="1" name=""/>
+        <p:cNvGrpSpPr/>
+        <p:nvPr/>
+      </p:nvGrpSpPr>
+      <p:grpSpPr>
+        <a:xfrm>
+          <a:off x="0" y="0"/>
+          <a:ext cx="0" cy="0"/>
+          <a:chOff x="0" y="0"/>
+          <a:chExt cx="0" cy="0"/>
+        </a:xfrm>
+      </p:grpSpPr>
+      <p:sp>
+        <p:nvSpPr>
+          <p:cNvPr id="2" name="Title 1"/>
+          <p:cNvSpPr>
+            <a:spLocks noGrp="1"/>
+          </p:cNvSpPr>
+          <p:nvPr>
+            <p:ph type="title"/>
+          </p:nvPr>
+        </p:nvSpPr>
+        <p:spPr/>
+        <p:txBody>
+          <a:bodyPr/>
+          <a:lstStyle/>
+          <a:p>
+            <a:r>
+              <a:rPr lang="en-US" dirty="0"/>
+              <a:t>Hello Hypervisor!</a:t>
+            </a:r>
+          </a:p>
+        </p:txBody>
+      </p:sp>
+      <p:sp>
+        <p:nvSpPr>
+          <p:cNvPr id="3" name="Content Placeholder 2"/>
+          <p:cNvSpPr>
+            <a:spLocks noGrp="1"/>
+          </p:cNvSpPr>
+          <p:nvPr>
+            <p:ph idx="1"/>
+          </p:nvPr>
+        </p:nvSpPr>
+        <p:spPr/>
+        <p:txBody>
+          <a:bodyPr>
+            <a:normAutofit fontScale="85000" lnSpcReduction="10000"/>
+          </a:bodyPr>
+          <a:lstStyle/>
+          <a:p>
+            <a:pPr>
+              <a:lnSpc>
+                <a:spcPct val="270000"/>
+              </a:lnSpc>
+            </a:pPr>
+            <a:r>
+              <a:rPr lang="en-US" dirty="0"/>
+              <a:t>Along came Hypervisors</a:t>
+            </a:r>
+          </a:p>
+          <a:p>
+            <a:pPr>
+              <a:lnSpc>
+                <a:spcPct val="270000"/>
+              </a:lnSpc>
+            </a:pPr>
+            <a:r>
+              <a:rPr lang="en-US" dirty="0"/>
+              <a:t>We can now squeeze more out of physical servers</a:t>
+            </a:r>
+          </a:p>
+          <a:p>
+            <a:pPr>
+              <a:lnSpc>
+                <a:spcPct val="270000"/>
+              </a:lnSpc>
+            </a:pPr>
+            <a:r>
+              <a:rPr lang="en-US" dirty="0"/>
+              <a:t>We can still isolate an application to an OS</a:t>
+            </a:r>
+          </a:p>
+          <a:p>
+            <a:pPr>
+              <a:lnSpc>
+                <a:spcPct val="270000"/>
+              </a:lnSpc>
+            </a:pPr>
+            <a:r>
+              <a:rPr lang="en-US" dirty="0"/>
+              <a:t>Yay for VMWare!</a:t>
+            </a:r>
+          </a:p>
+          <a:p>
+            <a:pPr>
+              <a:lnSpc>
+                <a:spcPct val="270000"/>
+              </a:lnSpc>
+            </a:pPr>
+            <a:r>
+              <a:rPr lang="en-US" dirty="0"/>
+              <a:t>But there are some </a:t>
+            </a:r>
+            <a:r>
+              <a:rPr lang="en-US" dirty="0" err="1"/>
+              <a:t>VMWarts</a:t>
+            </a:r>
+            <a:endParaRPr lang="en-US" dirty="0"/>
+          </a:p>
+        </p:txBody>
+      </p:sp>
+    </p:spTree>
+    <p:extLst>
+      <p:ext uri="{BB962C8B-B14F-4D97-AF65-F5344CB8AC3E}">
+        <p14:creationId xmlns:p14="http://schemas.microsoft.com/office/powerpoint/2010/main" val="1446593834"/>
+      </p:ext>
+    </p:extLst>
+  </p:cSld>
+  <p:clrMapOvr>
+    <a:masterClrMapping/>
+  </p:clrMapOvr>
+  <p:timing>
+    <p:tnLst>
+      <p:par>
+        <p:cTn id="1" dur="indefinite" restart="never" nodeType="tmRoot">
+          <p:childTnLst>
+            <p:seq concurrent="1" nextAc="seek">
+              <p:cTn id="2" dur="indefinite" nodeType="mainSeq">
+                <p:childTnLst>
+                  <p:par>
+                    <p:cTn id="3" fill="hold">
+                      <p:stCondLst>
+                        <p:cond delay="indefinite"/>
+                      </p:stCondLst>
+                      <p:childTnLst>
+                        <p:par>
+                          <p:cTn id="4" fill="hold">
+                            <p:stCondLst>
+                              <p:cond delay="0"/>
+                            </p:stCondLst>
+                            <p:childTnLst>
+                              <p:par>
+                                <p:cTn id="5" presetID="10" presetClass="entr" presetSubtype="0" fill="hold" grpId="0" nodeType="clickEffect">
+                                  <p:stCondLst>
+                                    <p:cond delay="0"/>
+                                  </p:stCondLst>
+                                  <p:childTnLst>
+                                    <p:set>
+                                      <p:cBhvr>
+                                        <p:cTn id="6" dur="1" fill="hold">
+                                          <p:stCondLst>
+                                            <p:cond delay="0"/>
+                                          </p:stCondLst>
+                                        </p:cTn>
+                                        <p:tgtEl>
+                                          <p:spTgt spid="3">
+                                            <p:txEl>
+                                              <p:pRg st="0" end="0"/>
+                                            </p:txEl>
+                                          </p:spTgt>
+                                        </p:tgtEl>
+                                        <p:attrNameLst>
+                                          <p:attrName>style.visibility</p:attrName>
+                                        </p:attrNameLst>
+                                      </p:cBhvr>
+                                      <p:to>
+                                        <p:strVal val="visible"/>
+                                      </p:to>
+                                    </p:set>
+                                    <p:animEffect transition="in" filter="fade">
+                                      <p:cBhvr>
+                                        <p:cTn id="7" dur="500"/>
+                                        <p:tgtEl>
+                                          <p:spTgt spid="3">
+                                            <p:txEl>
+                                              <p:pRg st="0" end="0"/>
+                                            </p:txEl>
+                                          </p:spTgt>
+                                        </p:tgtEl>
+                                      </p:cBhvr>
+                                    </p:animEffect>
+                                  </p:childTnLst>
+                                </p:cTn>
+                              </p:par>
+                            </p:childTnLst>
+                          </p:cTn>
+                        </p:par>
+                      </p:childTnLst>
+                    </p:cTn>
+                  </p:par>
+                  <p:par>
+                    <p:cTn id="8" fill="hold">
+                      <p:stCondLst>
+                        <p:cond delay="indefinite"/>
+                      </p:stCondLst>
+                      <p:childTnLst>
+                        <p:par>
+                          <p:cTn id="9" fill="hold">
+                            <p:stCondLst>
+                              <p:cond delay="0"/>
+                            </p:stCondLst>
+                            <p:childTnLst>
+                              <p:par>
+                                <p:cTn id="10" presetID="10" presetClass="entr" presetSubtype="0" fill="hold" grpId="0" nodeType="clickEffect">
+                                  <p:stCondLst>
+                                    <p:cond delay="0"/>
+                                  </p:stCondLst>
+                                  <p:childTnLst>
+                                    <p:set>
+                                      <p:cBhvr>
+                                        <p:cTn id="11" dur="1" fill="hold">
+                                          <p:stCondLst>
+                                            <p:cond delay="0"/>
+                                          </p:stCondLst>
+                                        </p:cTn>
+                                        <p:tgtEl>
+                                          <p:spTgt spid="3">
+                                            <p:txEl>
+                                              <p:pRg st="1" end="1"/>
+                                            </p:txEl>
+                                          </p:spTgt>
+                                        </p:tgtEl>
+                                        <p:attrNameLst>
+                                          <p:attrName>style.visibility</p:attrName>
+                                        </p:attrNameLst>
+                                      </p:cBhvr>
+                                      <p:to>
+                                        <p:strVal val="visible"/>
+                                      </p:to>
+                                    </p:set>
+                                    <p:animEffect transition="in" filter="fade">
+                                      <p:cBhvr>
+                                        <p:cTn id="12" dur="500"/>
+                                        <p:tgtEl>
+                                          <p:spTgt spid="3">
+                                            <p:txEl>
+                                              <p:pRg st="1" end="1"/>
+                                            </p:txEl>
+                                          </p:spTgt>
+                                        </p:tgtEl>
+                                      </p:cBhvr>
+                                    </p:animEffect>
+                                  </p:childTnLst>
+                                </p:cTn>
+                              </p:par>
+                            </p:childTnLst>
+                          </p:cTn>
+                        </p:par>
+                      </p:childTnLst>
+                    </p:cTn>
+                  </p:par>
+                  <p:par>
+                    <p:cTn id="13" fill="hold">
+                      <p:stCondLst>
+                        <p:cond delay="indefinite"/>
+                      </p:stCondLst>
+                      <p:childTnLst>
+                        <p:par>
+                          <p:cTn id="14" fill="hold">
+                            <p:stCondLst>
+                              <p:cond delay="0"/>
+                            </p:stCondLst>
+                            <p:childTnLst>
+                              <p:par>
+                                <p:cTn id="15" presetID="10" presetClass="entr" presetSubtype="0" fill="hold" grpId="0" nodeType="clickEffect">
+                                  <p:stCondLst>
+                                    <p:cond delay="0"/>
+                                  </p:stCondLst>
+                                  <p:childTnLst>
+                                    <p:set>
+                                      <p:cBhvr>
+                                        <p:cTn id="16" dur="1" fill="hold">
+                                          <p:stCondLst>
+                                            <p:cond delay="0"/>
+                                          </p:stCondLst>
+                                        </p:cTn>
+                                        <p:tgtEl>
+                                          <p:spTgt spid="3">
+                                            <p:txEl>
+                                              <p:pRg st="2" end="2"/>
+                                            </p:txEl>
+                                          </p:spTgt>
+                                        </p:tgtEl>
+                                        <p:attrNameLst>
+                                          <p:attrName>style.visibility</p:attrName>
+                                        </p:attrNameLst>
+                                      </p:cBhvr>
+                                      <p:to>
+                                        <p:strVal val="visible"/>
+                                      </p:to>
+                                    </p:set>
+                                    <p:animEffect transition="in" filter="fade">
+                                      <p:cBhvr>
+                                        <p:cTn id="17" dur="500"/>
+                                        <p:tgtEl>
+                                          <p:spTgt spid="3">
+                                            <p:txEl>
+                                              <p:pRg st="2" end="2"/>
+                                            </p:txEl>
+                                          </p:spTgt>
+                                        </p:tgtEl>
+                                      </p:cBhvr>
+                                    </p:animEffect>
+                                  </p:childTnLst>
+                                </p:cTn>
+                              </p:par>
+                            </p:childTnLst>
+                          </p:cTn>
+                        </p:par>
+                      </p:childTnLst>
+                    </p:cTn>
+                  </p:par>
+                  <p:par>
+                    <p:cTn id="18" fill="hold">
+                      <p:stCondLst>
+                        <p:cond delay="indefinite"/>
+                      </p:stCondLst>
+                      <p:childTnLst>
+                        <p:par>
+                          <p:cTn id="19" fill="hold">
+                            <p:stCondLst>
+                              <p:cond delay="0"/>
+                            </p:stCondLst>
+                            <p:childTnLst>
+                              <p:par>
+                                <p:cTn id="20" presetID="10" presetClass="entr" presetSubtype="0" fill="hold" grpId="0" nodeType="clickEffect">
+                                  <p:stCondLst>
+                                    <p:cond delay="0"/>
+                                  </p:stCondLst>
+                                  <p:childTnLst>
+                                    <p:set>
+                                      <p:cBhvr>
+                                        <p:cTn id="21" dur="1" fill="hold">
+                                          <p:stCondLst>
+                                            <p:cond delay="0"/>
+                                          </p:stCondLst>
+                                        </p:cTn>
+                                        <p:tgtEl>
+                                          <p:spTgt spid="3">
+                                            <p:txEl>
+                                              <p:pRg st="3" end="3"/>
+                                            </p:txEl>
+                                          </p:spTgt>
+                                        </p:tgtEl>
+                                        <p:attrNameLst>
+                                          <p:attrName>style.visibility</p:attrName>
+                                        </p:attrNameLst>
+                                      </p:cBhvr>
+                                      <p:to>
+                                        <p:strVal val="visible"/>
+                                      </p:to>
+                                    </p:set>
+                                    <p:animEffect transition="in" filter="fade">
+                                      <p:cBhvr>
+                                        <p:cTn id="22" dur="500"/>
+                                        <p:tgtEl>
+                                          <p:spTgt spid="3">
+                                            <p:txEl>
+                                              <p:pRg st="3" end="3"/>
+                                            </p:txEl>
+                                          </p:spTgt>
+                                        </p:tgtEl>
+                                      </p:cBhvr>
+                                    </p:animEffect>
+                                  </p:childTnLst>
+                                </p:cTn>
+                              </p:par>
+                            </p:childTnLst>
+                          </p:cTn>
+                        </p:par>
+                      </p:childTnLst>
+                    </p:cTn>
+                  </p:par>
+                  <p:par>
+                    <p:cTn id="23" fill="hold">
+                      <p:stCondLst>
+                        <p:cond delay="indefinite"/>
+                      </p:stCondLst>
+                      <p:childTnLst>
+                        <p:par>
+                          <p:cTn id="24" fill="hold">
+                            <p:stCondLst>
+                              <p:cond delay="0"/>
+                            </p:stCondLst>
+                            <p:childTnLst>
+                              <p:par>
+                                <p:cTn id="25" presetID="10" presetClass="entr" presetSubtype="0" fill="hold" grpId="0" nodeType="clickEffect">
+                                  <p:stCondLst>
+                                    <p:cond delay="0"/>
+                                  </p:stCondLst>
+                                  <p:childTnLst>
+                                    <p:set>
+                                      <p:cBhvr>
+                                        <p:cTn id="26" dur="1" fill="hold">
+                                          <p:stCondLst>
+                                            <p:cond delay="0"/>
+                                          </p:stCondLst>
+                                        </p:cTn>
+                                        <p:tgtEl>
+                                          <p:spTgt spid="3">
+                                            <p:txEl>
+                                              <p:pRg st="4" end="4"/>
+                                            </p:txEl>
+                                          </p:spTgt>
+                                        </p:tgtEl>
+                                        <p:attrNameLst>
+                                          <p:attrName>style.visibility</p:attrName>
+                                        </p:attrNameLst>
+                                      </p:cBhvr>
+                                      <p:to>
+                                        <p:strVal val="visible"/>
+                                      </p:to>
+                                    </p:set>
+                                    <p:animEffect transition="in" filter="fade">
+                                      <p:cBhvr>
+                                        <p:cTn id="27" dur="500"/>
+                                        <p:tgtEl>
+                                          <p:spTgt spid="3">
+                                            <p:txEl>
+                                              <p:pRg st="4" end="4"/>
+                                            </p:txEl>
+                                          </p:spTgt>
+                                        </p:tgtEl>
+                                      </p:cBhvr>
+                                    </p:animEffect>
+                                  </p:childTnLst>
+                                </p:cTn>
+                              </p:par>
+                            </p:childTnLst>
+                          </p:cTn>
+                        </p:par>
+                      </p:childTnLst>
+                    </p:cTn>
+                  </p:par>
+                </p:childTnLst>
+              </p:cTn>
+              <p:prevCondLst>
+                <p:cond evt="onPrev" delay="0">
+                  <p:tgtEl>
+                    <p:sldTgt/>
+                  </p:tgtEl>
+                </p:cond>
+              </p:prevCondLst>
+              <p:nextCondLst>
+                <p:cond evt="onNext" delay="0">
+                  <p:tgtEl>
+                    <p:sldTgt/>
+                  </p:tgtEl>
+                </p:cond>
+              </p:nextCondLst>
+            </p:seq>
+          </p:childTnLst>
+        </p:cTn>
+      </p:par>
+    </p:tnLst>
+    <p:bldLst>
+      <p:bldP spid="3" grpId="0" build="p"/>
     </p:bldLst>
   </p:timing>
 </p:sld>

</xml_diff>